<commit_message>
figure 2: panel tags to uppercase, made the "bright landscapes" label a bit darker
</commit_message>
<xml_diff>
--- a/Results/Figures/figure_02.pptx
+++ b/Results/Figures/figure_02.pptx
@@ -123,14 +123,6 @@
 </p:presentation>
 </file>
 
-<file path=ppt/revisionInfo.xml><?xml version="1.0" encoding="utf-8"?>
-<p1510:revInfo xmlns:a="http://schemas.openxmlformats.org/drawingml/2006/main" xmlns:r="http://schemas.openxmlformats.org/officeDocument/2006/relationships" xmlns:p1510="http://schemas.microsoft.com/office/powerpoint/2015/10/main">
-  <p1510:revLst>
-    <p1510:client id="{BFDB9BAC-7AC1-4B77-8B85-CA2E7A00C51F}" v="80" dt="2024-11-20T20:52:41.460"/>
-  </p1510:revLst>
-</p1510:revInfo>
-</file>
-
 <file path=ppt/changesInfos/changesInfo1.xml><?xml version="1.0" encoding="utf-8"?>
 <pc:chgInfo xmlns:a="http://schemas.openxmlformats.org/drawingml/2006/main" xmlns:r="http://schemas.openxmlformats.org/officeDocument/2006/relationships" xmlns:ac="http://schemas.microsoft.com/office/drawing/2013/main/command" xmlns:pc="http://schemas.microsoft.com/office/powerpoint/2013/main/command">
   <pc:docChgLst>
@@ -146,334 +138,6 @@
           <pc:docMk/>
           <pc:sldMk cId="2285614971" sldId="256"/>
         </pc:sldMkLst>
-        <pc:spChg chg="add mod topLvl">
-          <ac:chgData name="Gilbert, Neil" userId="37be9f5c-8f28-415b-96d6-624acf93bb3f" providerId="ADAL" clId="{BFDB9BAC-7AC1-4B77-8B85-CA2E7A00C51F}" dt="2024-11-06T18:22:28.779" v="714" actId="164"/>
-          <ac:spMkLst>
-            <pc:docMk/>
-            <pc:sldMk cId="2285614971" sldId="256"/>
-            <ac:spMk id="2" creationId="{1F4BEDF8-FA5A-1B5A-2C4E-69C73CE5B547}"/>
-          </ac:spMkLst>
-        </pc:spChg>
-        <pc:spChg chg="add del">
-          <ac:chgData name="Gilbert, Neil" userId="37be9f5c-8f28-415b-96d6-624acf93bb3f" providerId="ADAL" clId="{BFDB9BAC-7AC1-4B77-8B85-CA2E7A00C51F}" dt="2024-11-14T19:54:39.167" v="809" actId="11529"/>
-          <ac:spMkLst>
-            <pc:docMk/>
-            <pc:sldMk cId="2285614971" sldId="256"/>
-            <ac:spMk id="2" creationId="{3418BE5A-8B90-A1BF-E7F8-C6AE80B06EAB}"/>
-          </ac:spMkLst>
-        </pc:spChg>
-        <pc:spChg chg="add mod topLvl">
-          <ac:chgData name="Gilbert, Neil" userId="37be9f5c-8f28-415b-96d6-624acf93bb3f" providerId="ADAL" clId="{BFDB9BAC-7AC1-4B77-8B85-CA2E7A00C51F}" dt="2024-11-06T18:22:28.779" v="714" actId="164"/>
-          <ac:spMkLst>
-            <pc:docMk/>
-            <pc:sldMk cId="2285614971" sldId="256"/>
-            <ac:spMk id="3" creationId="{0DB05E49-117D-538A-0C75-667BFFB2682A}"/>
-          </ac:spMkLst>
-        </pc:spChg>
-        <pc:spChg chg="add del">
-          <ac:chgData name="Gilbert, Neil" userId="37be9f5c-8f28-415b-96d6-624acf93bb3f" providerId="ADAL" clId="{BFDB9BAC-7AC1-4B77-8B85-CA2E7A00C51F}" dt="2024-11-14T19:55:45.756" v="812" actId="478"/>
-          <ac:spMkLst>
-            <pc:docMk/>
-            <pc:sldMk cId="2285614971" sldId="256"/>
-            <ac:spMk id="3" creationId="{468D5BD5-CEF3-CB1E-A44C-3BCA6DB7DD8B}"/>
-          </ac:spMkLst>
-        </pc:spChg>
-        <pc:spChg chg="add del mod">
-          <ac:chgData name="Gilbert, Neil" userId="37be9f5c-8f28-415b-96d6-624acf93bb3f" providerId="ADAL" clId="{BFDB9BAC-7AC1-4B77-8B85-CA2E7A00C51F}" dt="2024-11-14T19:57:08.192" v="820" actId="478"/>
-          <ac:spMkLst>
-            <pc:docMk/>
-            <pc:sldMk cId="2285614971" sldId="256"/>
-            <ac:spMk id="4" creationId="{78B9163C-77A1-8172-E390-ABBB9A8413CE}"/>
-          </ac:spMkLst>
-        </pc:spChg>
-        <pc:spChg chg="add mod topLvl">
-          <ac:chgData name="Gilbert, Neil" userId="37be9f5c-8f28-415b-96d6-624acf93bb3f" providerId="ADAL" clId="{BFDB9BAC-7AC1-4B77-8B85-CA2E7A00C51F}" dt="2024-11-06T18:22:28.779" v="714" actId="164"/>
-          <ac:spMkLst>
-            <pc:docMk/>
-            <pc:sldMk cId="2285614971" sldId="256"/>
-            <ac:spMk id="4" creationId="{B1040277-1F46-26E9-C162-7A262F2FDB17}"/>
-          </ac:spMkLst>
-        </pc:spChg>
-        <pc:spChg chg="add del">
-          <ac:chgData name="Gilbert, Neil" userId="37be9f5c-8f28-415b-96d6-624acf93bb3f" providerId="ADAL" clId="{BFDB9BAC-7AC1-4B77-8B85-CA2E7A00C51F}" dt="2024-11-14T19:56:12.677" v="815" actId="11529"/>
-          <ac:spMkLst>
-            <pc:docMk/>
-            <pc:sldMk cId="2285614971" sldId="256"/>
-            <ac:spMk id="5" creationId="{01EF47A1-7D6D-9907-9910-42D2C348065E}"/>
-          </ac:spMkLst>
-        </pc:spChg>
-        <pc:spChg chg="add mod ord topLvl">
-          <ac:chgData name="Gilbert, Neil" userId="37be9f5c-8f28-415b-96d6-624acf93bb3f" providerId="ADAL" clId="{BFDB9BAC-7AC1-4B77-8B85-CA2E7A00C51F}" dt="2024-11-06T18:22:28.779" v="714" actId="164"/>
-          <ac:spMkLst>
-            <pc:docMk/>
-            <pc:sldMk cId="2285614971" sldId="256"/>
-            <ac:spMk id="5" creationId="{D4FE6136-1522-8560-4BBC-2F06F9BDC6D7}"/>
-          </ac:spMkLst>
-        </pc:spChg>
-        <pc:spChg chg="add del">
-          <ac:chgData name="Gilbert, Neil" userId="37be9f5c-8f28-415b-96d6-624acf93bb3f" providerId="ADAL" clId="{BFDB9BAC-7AC1-4B77-8B85-CA2E7A00C51F}" dt="2024-11-14T19:56:31.572" v="817" actId="11529"/>
-          <ac:spMkLst>
-            <pc:docMk/>
-            <pc:sldMk cId="2285614971" sldId="256"/>
-            <ac:spMk id="6" creationId="{02B1CA9F-D2AC-CBCA-2FF6-EFC702859402}"/>
-          </ac:spMkLst>
-        </pc:spChg>
-        <pc:spChg chg="add del">
-          <ac:chgData name="Gilbert, Neil" userId="37be9f5c-8f28-415b-96d6-624acf93bb3f" providerId="ADAL" clId="{BFDB9BAC-7AC1-4B77-8B85-CA2E7A00C51F}" dt="2024-11-14T19:57:06.918" v="819" actId="478"/>
-          <ac:spMkLst>
-            <pc:docMk/>
-            <pc:sldMk cId="2285614971" sldId="256"/>
-            <ac:spMk id="7" creationId="{22C159CB-464A-BBD6-11D9-40C4213A9406}"/>
-          </ac:spMkLst>
-        </pc:spChg>
-        <pc:spChg chg="add mod ord topLvl">
-          <ac:chgData name="Gilbert, Neil" userId="37be9f5c-8f28-415b-96d6-624acf93bb3f" providerId="ADAL" clId="{BFDB9BAC-7AC1-4B77-8B85-CA2E7A00C51F}" dt="2024-11-06T18:22:28.779" v="714" actId="164"/>
-          <ac:spMkLst>
-            <pc:docMk/>
-            <pc:sldMk cId="2285614971" sldId="256"/>
-            <ac:spMk id="8" creationId="{3933E569-1727-EB25-B730-A8538487E3D6}"/>
-          </ac:spMkLst>
-        </pc:spChg>
-        <pc:spChg chg="add mod ord topLvl">
-          <ac:chgData name="Gilbert, Neil" userId="37be9f5c-8f28-415b-96d6-624acf93bb3f" providerId="ADAL" clId="{BFDB9BAC-7AC1-4B77-8B85-CA2E7A00C51F}" dt="2024-11-06T18:22:28.779" v="714" actId="164"/>
-          <ac:spMkLst>
-            <pc:docMk/>
-            <pc:sldMk cId="2285614971" sldId="256"/>
-            <ac:spMk id="13" creationId="{37340C50-EBCF-47B5-D113-F9237E3BAE9E}"/>
-          </ac:spMkLst>
-        </pc:spChg>
-        <pc:spChg chg="mod ord topLvl">
-          <ac:chgData name="Gilbert, Neil" userId="37be9f5c-8f28-415b-96d6-624acf93bb3f" providerId="ADAL" clId="{BFDB9BAC-7AC1-4B77-8B85-CA2E7A00C51F}" dt="2024-11-06T18:22:28.779" v="714" actId="164"/>
-          <ac:spMkLst>
-            <pc:docMk/>
-            <pc:sldMk cId="2285614971" sldId="256"/>
-            <ac:spMk id="20" creationId="{9B09FEE0-B817-5238-BFAF-25952BA0B238}"/>
-          </ac:spMkLst>
-        </pc:spChg>
-        <pc:spChg chg="mod ord topLvl">
-          <ac:chgData name="Gilbert, Neil" userId="37be9f5c-8f28-415b-96d6-624acf93bb3f" providerId="ADAL" clId="{BFDB9BAC-7AC1-4B77-8B85-CA2E7A00C51F}" dt="2024-11-06T18:22:28.779" v="714" actId="164"/>
-          <ac:spMkLst>
-            <pc:docMk/>
-            <pc:sldMk cId="2285614971" sldId="256"/>
-            <ac:spMk id="21" creationId="{B6295314-0558-088E-B76E-26225A04402F}"/>
-          </ac:spMkLst>
-        </pc:spChg>
-        <pc:spChg chg="mod ord topLvl">
-          <ac:chgData name="Gilbert, Neil" userId="37be9f5c-8f28-415b-96d6-624acf93bb3f" providerId="ADAL" clId="{BFDB9BAC-7AC1-4B77-8B85-CA2E7A00C51F}" dt="2024-11-06T18:22:28.779" v="714" actId="164"/>
-          <ac:spMkLst>
-            <pc:docMk/>
-            <pc:sldMk cId="2285614971" sldId="256"/>
-            <ac:spMk id="22" creationId="{0F944584-22C4-18EF-5F1C-D75A84720551}"/>
-          </ac:spMkLst>
-        </pc:spChg>
-        <pc:spChg chg="mod ord topLvl">
-          <ac:chgData name="Gilbert, Neil" userId="37be9f5c-8f28-415b-96d6-624acf93bb3f" providerId="ADAL" clId="{BFDB9BAC-7AC1-4B77-8B85-CA2E7A00C51F}" dt="2024-11-06T18:22:28.779" v="714" actId="164"/>
-          <ac:spMkLst>
-            <pc:docMk/>
-            <pc:sldMk cId="2285614971" sldId="256"/>
-            <ac:spMk id="24" creationId="{BAA7BA02-0507-4778-EE94-5F61D2EB490A}"/>
-          </ac:spMkLst>
-        </pc:spChg>
-        <pc:spChg chg="add del mod topLvl">
-          <ac:chgData name="Gilbert, Neil" userId="37be9f5c-8f28-415b-96d6-624acf93bb3f" providerId="ADAL" clId="{BFDB9BAC-7AC1-4B77-8B85-CA2E7A00C51F}" dt="2024-11-06T18:22:28.779" v="714" actId="164"/>
-          <ac:spMkLst>
-            <pc:docMk/>
-            <pc:sldMk cId="2285614971" sldId="256"/>
-            <ac:spMk id="25" creationId="{4321748A-3B29-9708-220C-DF93B8764EDC}"/>
-          </ac:spMkLst>
-        </pc:spChg>
-        <pc:spChg chg="del mod topLvl">
-          <ac:chgData name="Gilbert, Neil" userId="37be9f5c-8f28-415b-96d6-624acf93bb3f" providerId="ADAL" clId="{BFDB9BAC-7AC1-4B77-8B85-CA2E7A00C51F}" dt="2024-11-06T18:17:50.577" v="634" actId="478"/>
-          <ac:spMkLst>
-            <pc:docMk/>
-            <pc:sldMk cId="2285614971" sldId="256"/>
-            <ac:spMk id="26" creationId="{8335BBEE-F886-2D35-6393-B83E545A07CB}"/>
-          </ac:spMkLst>
-        </pc:spChg>
-        <pc:spChg chg="del mod topLvl">
-          <ac:chgData name="Gilbert, Neil" userId="37be9f5c-8f28-415b-96d6-624acf93bb3f" providerId="ADAL" clId="{BFDB9BAC-7AC1-4B77-8B85-CA2E7A00C51F}" dt="2024-11-06T18:00:52.917" v="422" actId="478"/>
-          <ac:spMkLst>
-            <pc:docMk/>
-            <pc:sldMk cId="2285614971" sldId="256"/>
-            <ac:spMk id="27" creationId="{92154E2B-8DA6-C616-C313-9BFBA5ADC082}"/>
-          </ac:spMkLst>
-        </pc:spChg>
-        <pc:spChg chg="mod ord topLvl">
-          <ac:chgData name="Gilbert, Neil" userId="37be9f5c-8f28-415b-96d6-624acf93bb3f" providerId="ADAL" clId="{BFDB9BAC-7AC1-4B77-8B85-CA2E7A00C51F}" dt="2024-11-06T18:22:28.779" v="714" actId="164"/>
-          <ac:spMkLst>
-            <pc:docMk/>
-            <pc:sldMk cId="2285614971" sldId="256"/>
-            <ac:spMk id="32" creationId="{26FB3674-FE46-4300-7C19-CDDA729F0230}"/>
-          </ac:spMkLst>
-        </pc:spChg>
-        <pc:spChg chg="mod topLvl">
-          <ac:chgData name="Gilbert, Neil" userId="37be9f5c-8f28-415b-96d6-624acf93bb3f" providerId="ADAL" clId="{BFDB9BAC-7AC1-4B77-8B85-CA2E7A00C51F}" dt="2024-11-06T18:22:28.779" v="714" actId="164"/>
-          <ac:spMkLst>
-            <pc:docMk/>
-            <pc:sldMk cId="2285614971" sldId="256"/>
-            <ac:spMk id="43" creationId="{3F00A7C3-ACDD-46D9-71D3-298651C90033}"/>
-          </ac:spMkLst>
-        </pc:spChg>
-        <pc:spChg chg="mod topLvl">
-          <ac:chgData name="Gilbert, Neil" userId="37be9f5c-8f28-415b-96d6-624acf93bb3f" providerId="ADAL" clId="{BFDB9BAC-7AC1-4B77-8B85-CA2E7A00C51F}" dt="2024-11-06T18:22:28.779" v="714" actId="164"/>
-          <ac:spMkLst>
-            <pc:docMk/>
-            <pc:sldMk cId="2285614971" sldId="256"/>
-            <ac:spMk id="44" creationId="{4376EE0B-ED62-B1FB-3E1C-90CF93D5A3AA}"/>
-          </ac:spMkLst>
-        </pc:spChg>
-        <pc:spChg chg="add mod topLvl">
-          <ac:chgData name="Gilbert, Neil" userId="37be9f5c-8f28-415b-96d6-624acf93bb3f" providerId="ADAL" clId="{BFDB9BAC-7AC1-4B77-8B85-CA2E7A00C51F}" dt="2024-11-06T18:22:28.779" v="714" actId="164"/>
-          <ac:spMkLst>
-            <pc:docMk/>
-            <pc:sldMk cId="2285614971" sldId="256"/>
-            <ac:spMk id="62" creationId="{FFDBEE1C-F456-EE0A-79D1-FB58B5B98AB9}"/>
-          </ac:spMkLst>
-        </pc:spChg>
-        <pc:spChg chg="add del mod">
-          <ac:chgData name="Gilbert, Neil" userId="37be9f5c-8f28-415b-96d6-624acf93bb3f" providerId="ADAL" clId="{BFDB9BAC-7AC1-4B77-8B85-CA2E7A00C51F}" dt="2024-11-06T18:00:26.628" v="418" actId="478"/>
-          <ac:spMkLst>
-            <pc:docMk/>
-            <pc:sldMk cId="2285614971" sldId="256"/>
-            <ac:spMk id="68" creationId="{D91BA014-809F-C816-6D79-7D310474F8B9}"/>
-          </ac:spMkLst>
-        </pc:spChg>
-        <pc:spChg chg="add mod">
-          <ac:chgData name="Gilbert, Neil" userId="37be9f5c-8f28-415b-96d6-624acf93bb3f" providerId="ADAL" clId="{BFDB9BAC-7AC1-4B77-8B85-CA2E7A00C51F}" dt="2024-11-06T18:02:46.044" v="437"/>
-          <ac:spMkLst>
-            <pc:docMk/>
-            <pc:sldMk cId="2285614971" sldId="256"/>
-            <ac:spMk id="73" creationId="{D7EE2C81-B464-078D-F7EF-2DE8F4A5C4F2}"/>
-          </ac:spMkLst>
-        </pc:spChg>
-        <pc:spChg chg="add mod">
-          <ac:chgData name="Gilbert, Neil" userId="37be9f5c-8f28-415b-96d6-624acf93bb3f" providerId="ADAL" clId="{BFDB9BAC-7AC1-4B77-8B85-CA2E7A00C51F}" dt="2024-11-06T18:03:05.688" v="440"/>
-          <ac:spMkLst>
-            <pc:docMk/>
-            <pc:sldMk cId="2285614971" sldId="256"/>
-            <ac:spMk id="75" creationId="{4321748A-3B29-9708-220C-DF93B8764EDC}"/>
-          </ac:spMkLst>
-        </pc:spChg>
-        <pc:spChg chg="mod">
-          <ac:chgData name="Gilbert, Neil" userId="37be9f5c-8f28-415b-96d6-624acf93bb3f" providerId="ADAL" clId="{BFDB9BAC-7AC1-4B77-8B85-CA2E7A00C51F}" dt="2024-11-06T18:03:16.607" v="443"/>
-          <ac:spMkLst>
-            <pc:docMk/>
-            <pc:sldMk cId="2285614971" sldId="256"/>
-            <ac:spMk id="80" creationId="{929E8CFD-85A2-E9DB-D0D7-E7F432D5B880}"/>
-          </ac:spMkLst>
-        </pc:spChg>
-        <pc:spChg chg="mod">
-          <ac:chgData name="Gilbert, Neil" userId="37be9f5c-8f28-415b-96d6-624acf93bb3f" providerId="ADAL" clId="{BFDB9BAC-7AC1-4B77-8B85-CA2E7A00C51F}" dt="2024-11-06T18:03:16.607" v="443"/>
-          <ac:spMkLst>
-            <pc:docMk/>
-            <pc:sldMk cId="2285614971" sldId="256"/>
-            <ac:spMk id="81" creationId="{599CA1C0-E781-18F8-812F-441B6CCCB506}"/>
-          </ac:spMkLst>
-        </pc:spChg>
-        <pc:spChg chg="mod">
-          <ac:chgData name="Gilbert, Neil" userId="37be9f5c-8f28-415b-96d6-624acf93bb3f" providerId="ADAL" clId="{BFDB9BAC-7AC1-4B77-8B85-CA2E7A00C51F}" dt="2024-11-06T18:03:16.607" v="443"/>
-          <ac:spMkLst>
-            <pc:docMk/>
-            <pc:sldMk cId="2285614971" sldId="256"/>
-            <ac:spMk id="82" creationId="{BB797AFA-BAC8-A7AD-D269-CBDD3E5D96F4}"/>
-          </ac:spMkLst>
-        </pc:spChg>
-        <pc:spChg chg="mod">
-          <ac:chgData name="Gilbert, Neil" userId="37be9f5c-8f28-415b-96d6-624acf93bb3f" providerId="ADAL" clId="{BFDB9BAC-7AC1-4B77-8B85-CA2E7A00C51F}" dt="2024-11-06T18:03:17.335" v="444"/>
-          <ac:spMkLst>
-            <pc:docMk/>
-            <pc:sldMk cId="2285614971" sldId="256"/>
-            <ac:spMk id="93" creationId="{60EFAF33-0ED9-7A0F-0E70-905050286498}"/>
-          </ac:spMkLst>
-        </pc:spChg>
-        <pc:spChg chg="mod">
-          <ac:chgData name="Gilbert, Neil" userId="37be9f5c-8f28-415b-96d6-624acf93bb3f" providerId="ADAL" clId="{BFDB9BAC-7AC1-4B77-8B85-CA2E7A00C51F}" dt="2024-11-06T18:03:17.335" v="444"/>
-          <ac:spMkLst>
-            <pc:docMk/>
-            <pc:sldMk cId="2285614971" sldId="256"/>
-            <ac:spMk id="94" creationId="{1CC8F02A-45E9-EA70-9E0D-5978F32192F7}"/>
-          </ac:spMkLst>
-        </pc:spChg>
-        <pc:spChg chg="mod">
-          <ac:chgData name="Gilbert, Neil" userId="37be9f5c-8f28-415b-96d6-624acf93bb3f" providerId="ADAL" clId="{BFDB9BAC-7AC1-4B77-8B85-CA2E7A00C51F}" dt="2024-11-06T18:03:17.335" v="444"/>
-          <ac:spMkLst>
-            <pc:docMk/>
-            <pc:sldMk cId="2285614971" sldId="256"/>
-            <ac:spMk id="95" creationId="{B1D0CC65-D256-DC57-3663-4A4B00BE27FC}"/>
-          </ac:spMkLst>
-        </pc:spChg>
-        <pc:spChg chg="mod">
-          <ac:chgData name="Gilbert, Neil" userId="37be9f5c-8f28-415b-96d6-624acf93bb3f" providerId="ADAL" clId="{BFDB9BAC-7AC1-4B77-8B85-CA2E7A00C51F}" dt="2024-11-06T18:03:17.832" v="445"/>
-          <ac:spMkLst>
-            <pc:docMk/>
-            <pc:sldMk cId="2285614971" sldId="256"/>
-            <ac:spMk id="106" creationId="{D280BAA4-677D-A8D2-F896-F4C00F0FBD64}"/>
-          </ac:spMkLst>
-        </pc:spChg>
-        <pc:spChg chg="mod">
-          <ac:chgData name="Gilbert, Neil" userId="37be9f5c-8f28-415b-96d6-624acf93bb3f" providerId="ADAL" clId="{BFDB9BAC-7AC1-4B77-8B85-CA2E7A00C51F}" dt="2024-11-06T18:03:17.832" v="445"/>
-          <ac:spMkLst>
-            <pc:docMk/>
-            <pc:sldMk cId="2285614971" sldId="256"/>
-            <ac:spMk id="107" creationId="{ED3E629F-D0CE-2C46-82F0-110EE7057B22}"/>
-          </ac:spMkLst>
-        </pc:spChg>
-        <pc:spChg chg="mod">
-          <ac:chgData name="Gilbert, Neil" userId="37be9f5c-8f28-415b-96d6-624acf93bb3f" providerId="ADAL" clId="{BFDB9BAC-7AC1-4B77-8B85-CA2E7A00C51F}" dt="2024-11-06T18:03:17.832" v="445"/>
-          <ac:spMkLst>
-            <pc:docMk/>
-            <pc:sldMk cId="2285614971" sldId="256"/>
-            <ac:spMk id="108" creationId="{31D57221-A5DD-66E3-62FC-560A6A4561F3}"/>
-          </ac:spMkLst>
-        </pc:spChg>
-        <pc:spChg chg="mod ord topLvl">
-          <ac:chgData name="Gilbert, Neil" userId="37be9f5c-8f28-415b-96d6-624acf93bb3f" providerId="ADAL" clId="{BFDB9BAC-7AC1-4B77-8B85-CA2E7A00C51F}" dt="2024-11-06T18:22:28.779" v="714" actId="164"/>
-          <ac:spMkLst>
-            <pc:docMk/>
-            <pc:sldMk cId="2285614971" sldId="256"/>
-            <ac:spMk id="119" creationId="{FB10D0CE-A40F-364A-FAB9-1CA8DE74656D}"/>
-          </ac:spMkLst>
-        </pc:spChg>
-        <pc:spChg chg="mod ord topLvl">
-          <ac:chgData name="Gilbert, Neil" userId="37be9f5c-8f28-415b-96d6-624acf93bb3f" providerId="ADAL" clId="{BFDB9BAC-7AC1-4B77-8B85-CA2E7A00C51F}" dt="2024-11-06T18:22:28.779" v="714" actId="164"/>
-          <ac:spMkLst>
-            <pc:docMk/>
-            <pc:sldMk cId="2285614971" sldId="256"/>
-            <ac:spMk id="120" creationId="{442C39E8-F06C-A9AE-594A-B6FDAF28A25A}"/>
-          </ac:spMkLst>
-        </pc:spChg>
-        <pc:spChg chg="mod ord topLvl">
-          <ac:chgData name="Gilbert, Neil" userId="37be9f5c-8f28-415b-96d6-624acf93bb3f" providerId="ADAL" clId="{BFDB9BAC-7AC1-4B77-8B85-CA2E7A00C51F}" dt="2024-11-06T18:22:28.779" v="714" actId="164"/>
-          <ac:spMkLst>
-            <pc:docMk/>
-            <pc:sldMk cId="2285614971" sldId="256"/>
-            <ac:spMk id="121" creationId="{2BADAB18-E642-C78F-5345-1762A49A3A65}"/>
-          </ac:spMkLst>
-        </pc:spChg>
-        <pc:spChg chg="add mod">
-          <ac:chgData name="Gilbert, Neil" userId="37be9f5c-8f28-415b-96d6-624acf93bb3f" providerId="ADAL" clId="{BFDB9BAC-7AC1-4B77-8B85-CA2E7A00C51F}" dt="2024-11-06T18:22:28.779" v="714" actId="164"/>
-          <ac:spMkLst>
-            <pc:docMk/>
-            <pc:sldMk cId="2285614971" sldId="256"/>
-            <ac:spMk id="137" creationId="{56E40366-6E4B-10B3-C81D-52524A318F08}"/>
-          </ac:spMkLst>
-        </pc:spChg>
-        <pc:spChg chg="add mod">
-          <ac:chgData name="Gilbert, Neil" userId="37be9f5c-8f28-415b-96d6-624acf93bb3f" providerId="ADAL" clId="{BFDB9BAC-7AC1-4B77-8B85-CA2E7A00C51F}" dt="2024-11-06T18:22:28.779" v="714" actId="164"/>
-          <ac:spMkLst>
-            <pc:docMk/>
-            <pc:sldMk cId="2285614971" sldId="256"/>
-            <ac:spMk id="138" creationId="{3080F696-CFCB-CE92-F1A5-E20D98F98F4E}"/>
-          </ac:spMkLst>
-        </pc:spChg>
-        <pc:spChg chg="add mod">
-          <ac:chgData name="Gilbert, Neil" userId="37be9f5c-8f28-415b-96d6-624acf93bb3f" providerId="ADAL" clId="{BFDB9BAC-7AC1-4B77-8B85-CA2E7A00C51F}" dt="2024-11-06T18:22:28.779" v="714" actId="164"/>
-          <ac:spMkLst>
-            <pc:docMk/>
-            <pc:sldMk cId="2285614971" sldId="256"/>
-            <ac:spMk id="140" creationId="{DB740122-2878-08AB-2A0F-E2229BA9C12B}"/>
-          </ac:spMkLst>
-        </pc:spChg>
         <pc:spChg chg="mod topLvl">
           <ac:chgData name="Gilbert, Neil" userId="37be9f5c-8f28-415b-96d6-624acf93bb3f" providerId="ADAL" clId="{BFDB9BAC-7AC1-4B77-8B85-CA2E7A00C51F}" dt="2024-11-20T20:49:56.130" v="841" actId="165"/>
           <ac:spMkLst>
@@ -520,14 +184,6 @@
             <pc:docMk/>
             <pc:sldMk cId="2285614971" sldId="256"/>
             <ac:spMk id="154" creationId="{4321748A-3B29-9708-220C-DF93B8764EDC}"/>
-          </ac:spMkLst>
-        </pc:spChg>
-        <pc:spChg chg="del mod">
-          <ac:chgData name="Gilbert, Neil" userId="37be9f5c-8f28-415b-96d6-624acf93bb3f" providerId="ADAL" clId="{BFDB9BAC-7AC1-4B77-8B85-CA2E7A00C51F}" dt="2024-11-20T20:46:25.184" v="827" actId="478"/>
-          <ac:spMkLst>
-            <pc:docMk/>
-            <pc:sldMk cId="2285614971" sldId="256"/>
-            <ac:spMk id="156" creationId="{3F00A7C3-ACDD-46D9-71D3-298651C90033}"/>
           </ac:spMkLst>
         </pc:spChg>
         <pc:spChg chg="mod topLvl">
@@ -642,230 +298,6 @@
             <ac:spMk id="184" creationId="{DB740122-2878-08AB-2A0F-E2229BA9C12B}"/>
           </ac:spMkLst>
         </pc:spChg>
-        <pc:spChg chg="add del">
-          <ac:chgData name="Gilbert, Neil" userId="37be9f5c-8f28-415b-96d6-624acf93bb3f" providerId="ADAL" clId="{BFDB9BAC-7AC1-4B77-8B85-CA2E7A00C51F}" dt="2024-11-06T18:32:29.279" v="725" actId="22"/>
-          <ac:spMkLst>
-            <pc:docMk/>
-            <pc:sldMk cId="2285614971" sldId="256"/>
-            <ac:spMk id="198" creationId="{AA71D433-7BE6-29D8-D099-E66A77AD21DB}"/>
-          </ac:spMkLst>
-        </pc:spChg>
-        <pc:grpChg chg="add del mod">
-          <ac:chgData name="Gilbert, Neil" userId="37be9f5c-8f28-415b-96d6-624acf93bb3f" providerId="ADAL" clId="{BFDB9BAC-7AC1-4B77-8B85-CA2E7A00C51F}" dt="2024-11-06T17:36:30.889" v="97" actId="165"/>
-          <ac:grpSpMkLst>
-            <pc:docMk/>
-            <pc:sldMk cId="2285614971" sldId="256"/>
-            <ac:grpSpMk id="17" creationId="{87726833-3990-A8BE-B73E-39387F3C4D9C}"/>
-          </ac:grpSpMkLst>
-        </pc:grpChg>
-        <pc:grpChg chg="del mod topLvl">
-          <ac:chgData name="Gilbert, Neil" userId="37be9f5c-8f28-415b-96d6-624acf93bb3f" providerId="ADAL" clId="{BFDB9BAC-7AC1-4B77-8B85-CA2E7A00C51F}" dt="2024-11-06T17:36:44.536" v="100" actId="165"/>
-          <ac:grpSpMkLst>
-            <pc:docMk/>
-            <pc:sldMk cId="2285614971" sldId="256"/>
-            <ac:grpSpMk id="18" creationId="{FD46E84F-30CB-AF3A-5AC7-5496A3393B4E}"/>
-          </ac:grpSpMkLst>
-        </pc:grpChg>
-        <pc:grpChg chg="del mod topLvl">
-          <ac:chgData name="Gilbert, Neil" userId="37be9f5c-8f28-415b-96d6-624acf93bb3f" providerId="ADAL" clId="{BFDB9BAC-7AC1-4B77-8B85-CA2E7A00C51F}" dt="2024-11-06T17:36:39.495" v="99" actId="165"/>
-          <ac:grpSpMkLst>
-            <pc:docMk/>
-            <pc:sldMk cId="2285614971" sldId="256"/>
-            <ac:grpSpMk id="45" creationId="{1944A939-BF39-202B-6AEE-2D10BFC195BA}"/>
-          </ac:grpSpMkLst>
-        </pc:grpChg>
-        <pc:grpChg chg="add mod topLvl">
-          <ac:chgData name="Gilbert, Neil" userId="37be9f5c-8f28-415b-96d6-624acf93bb3f" providerId="ADAL" clId="{BFDB9BAC-7AC1-4B77-8B85-CA2E7A00C51F}" dt="2024-11-06T18:22:28.779" v="714" actId="164"/>
-          <ac:grpSpMkLst>
-            <pc:docMk/>
-            <pc:sldMk cId="2285614971" sldId="256"/>
-            <ac:grpSpMk id="57" creationId="{189C055D-1A02-B252-66AF-3F915A0C839A}"/>
-          </ac:grpSpMkLst>
-        </pc:grpChg>
-        <pc:grpChg chg="add mod topLvl">
-          <ac:chgData name="Gilbert, Neil" userId="37be9f5c-8f28-415b-96d6-624acf93bb3f" providerId="ADAL" clId="{BFDB9BAC-7AC1-4B77-8B85-CA2E7A00C51F}" dt="2024-11-06T18:22:28.779" v="714" actId="164"/>
-          <ac:grpSpMkLst>
-            <pc:docMk/>
-            <pc:sldMk cId="2285614971" sldId="256"/>
-            <ac:grpSpMk id="58" creationId="{91FB7F19-7D82-89AC-4AD8-EE3374D435A3}"/>
-          </ac:grpSpMkLst>
-        </pc:grpChg>
-        <pc:grpChg chg="add mod">
-          <ac:chgData name="Gilbert, Neil" userId="37be9f5c-8f28-415b-96d6-624acf93bb3f" providerId="ADAL" clId="{BFDB9BAC-7AC1-4B77-8B85-CA2E7A00C51F}" dt="2024-11-06T17:56:53.531" v="377" actId="571"/>
-          <ac:grpSpMkLst>
-            <pc:docMk/>
-            <pc:sldMk cId="2285614971" sldId="256"/>
-            <ac:grpSpMk id="64" creationId="{A704557F-F242-816C-F8A8-C74D915CDE36}"/>
-          </ac:grpSpMkLst>
-        </pc:grpChg>
-        <pc:grpChg chg="add del mod topLvl">
-          <ac:chgData name="Gilbert, Neil" userId="37be9f5c-8f28-415b-96d6-624acf93bb3f" providerId="ADAL" clId="{BFDB9BAC-7AC1-4B77-8B85-CA2E7A00C51F}" dt="2024-11-06T18:01:59.456" v="435" actId="165"/>
-          <ac:grpSpMkLst>
-            <pc:docMk/>
-            <pc:sldMk cId="2285614971" sldId="256"/>
-            <ac:grpSpMk id="67" creationId="{0F63B89F-76AD-4961-4FFD-2AFD08FE5FFA}"/>
-          </ac:grpSpMkLst>
-        </pc:grpChg>
-        <pc:grpChg chg="add del mod ord">
-          <ac:chgData name="Gilbert, Neil" userId="37be9f5c-8f28-415b-96d6-624acf93bb3f" providerId="ADAL" clId="{BFDB9BAC-7AC1-4B77-8B85-CA2E7A00C51F}" dt="2024-11-06T18:01:33.452" v="433" actId="165"/>
-          <ac:grpSpMkLst>
-            <pc:docMk/>
-            <pc:sldMk cId="2285614971" sldId="256"/>
-            <ac:grpSpMk id="72" creationId="{52B9CCF9-934B-1D95-54AC-B1B3D3E575B0}"/>
-          </ac:grpSpMkLst>
-        </pc:grpChg>
-        <pc:grpChg chg="add mod">
-          <ac:chgData name="Gilbert, Neil" userId="37be9f5c-8f28-415b-96d6-624acf93bb3f" providerId="ADAL" clId="{BFDB9BAC-7AC1-4B77-8B85-CA2E7A00C51F}" dt="2024-11-06T18:03:20.715" v="447" actId="164"/>
-          <ac:grpSpMkLst>
-            <pc:docMk/>
-            <pc:sldMk cId="2285614971" sldId="256"/>
-            <ac:grpSpMk id="74" creationId="{C19B67F6-7E5B-02A5-7A28-C24BF0DA69A7}"/>
-          </ac:grpSpMkLst>
-        </pc:grpChg>
-        <pc:grpChg chg="add mod">
-          <ac:chgData name="Gilbert, Neil" userId="37be9f5c-8f28-415b-96d6-624acf93bb3f" providerId="ADAL" clId="{BFDB9BAC-7AC1-4B77-8B85-CA2E7A00C51F}" dt="2024-11-06T18:03:16.607" v="443"/>
-          <ac:grpSpMkLst>
-            <pc:docMk/>
-            <pc:sldMk cId="2285614971" sldId="256"/>
-            <ac:grpSpMk id="76" creationId="{8F86DCA5-D09F-8B69-2DE0-049A464AC3D9}"/>
-          </ac:grpSpMkLst>
-        </pc:grpChg>
-        <pc:grpChg chg="mod">
-          <ac:chgData name="Gilbert, Neil" userId="37be9f5c-8f28-415b-96d6-624acf93bb3f" providerId="ADAL" clId="{BFDB9BAC-7AC1-4B77-8B85-CA2E7A00C51F}" dt="2024-11-06T18:03:16.607" v="443"/>
-          <ac:grpSpMkLst>
-            <pc:docMk/>
-            <pc:sldMk cId="2285614971" sldId="256"/>
-            <ac:grpSpMk id="78" creationId="{8BEA45FA-74E5-B4E9-7D34-D907A3368349}"/>
-          </ac:grpSpMkLst>
-        </pc:grpChg>
-        <pc:grpChg chg="mod">
-          <ac:chgData name="Gilbert, Neil" userId="37be9f5c-8f28-415b-96d6-624acf93bb3f" providerId="ADAL" clId="{BFDB9BAC-7AC1-4B77-8B85-CA2E7A00C51F}" dt="2024-11-06T18:03:16.607" v="443"/>
-          <ac:grpSpMkLst>
-            <pc:docMk/>
-            <pc:sldMk cId="2285614971" sldId="256"/>
-            <ac:grpSpMk id="79" creationId="{48BA2CC5-A512-E93A-E163-120A7012E192}"/>
-          </ac:grpSpMkLst>
-        </pc:grpChg>
-        <pc:grpChg chg="add mod">
-          <ac:chgData name="Gilbert, Neil" userId="37be9f5c-8f28-415b-96d6-624acf93bb3f" providerId="ADAL" clId="{BFDB9BAC-7AC1-4B77-8B85-CA2E7A00C51F}" dt="2024-11-06T18:03:17.335" v="444"/>
-          <ac:grpSpMkLst>
-            <pc:docMk/>
-            <pc:sldMk cId="2285614971" sldId="256"/>
-            <ac:grpSpMk id="89" creationId="{29AD37DD-8DA8-7EBB-316A-2557F213653A}"/>
-          </ac:grpSpMkLst>
-        </pc:grpChg>
-        <pc:grpChg chg="mod">
-          <ac:chgData name="Gilbert, Neil" userId="37be9f5c-8f28-415b-96d6-624acf93bb3f" providerId="ADAL" clId="{BFDB9BAC-7AC1-4B77-8B85-CA2E7A00C51F}" dt="2024-11-06T18:03:17.335" v="444"/>
-          <ac:grpSpMkLst>
-            <pc:docMk/>
-            <pc:sldMk cId="2285614971" sldId="256"/>
-            <ac:grpSpMk id="91" creationId="{BF779909-5672-310F-D954-DDD594819CC4}"/>
-          </ac:grpSpMkLst>
-        </pc:grpChg>
-        <pc:grpChg chg="mod">
-          <ac:chgData name="Gilbert, Neil" userId="37be9f5c-8f28-415b-96d6-624acf93bb3f" providerId="ADAL" clId="{BFDB9BAC-7AC1-4B77-8B85-CA2E7A00C51F}" dt="2024-11-06T18:03:17.335" v="444"/>
-          <ac:grpSpMkLst>
-            <pc:docMk/>
-            <pc:sldMk cId="2285614971" sldId="256"/>
-            <ac:grpSpMk id="92" creationId="{68EF85B9-8323-A5ED-5604-D2AB4451D7DF}"/>
-          </ac:grpSpMkLst>
-        </pc:grpChg>
-        <pc:grpChg chg="add mod">
-          <ac:chgData name="Gilbert, Neil" userId="37be9f5c-8f28-415b-96d6-624acf93bb3f" providerId="ADAL" clId="{BFDB9BAC-7AC1-4B77-8B85-CA2E7A00C51F}" dt="2024-11-06T18:03:17.832" v="445"/>
-          <ac:grpSpMkLst>
-            <pc:docMk/>
-            <pc:sldMk cId="2285614971" sldId="256"/>
-            <ac:grpSpMk id="102" creationId="{04613BDA-3109-0B45-148C-87CAE62D51FC}"/>
-          </ac:grpSpMkLst>
-        </pc:grpChg>
-        <pc:grpChg chg="mod">
-          <ac:chgData name="Gilbert, Neil" userId="37be9f5c-8f28-415b-96d6-624acf93bb3f" providerId="ADAL" clId="{BFDB9BAC-7AC1-4B77-8B85-CA2E7A00C51F}" dt="2024-11-06T18:03:17.832" v="445"/>
-          <ac:grpSpMkLst>
-            <pc:docMk/>
-            <pc:sldMk cId="2285614971" sldId="256"/>
-            <ac:grpSpMk id="104" creationId="{AECDEE60-82C7-8C7E-9B66-D726A14300E4}"/>
-          </ac:grpSpMkLst>
-        </pc:grpChg>
-        <pc:grpChg chg="mod">
-          <ac:chgData name="Gilbert, Neil" userId="37be9f5c-8f28-415b-96d6-624acf93bb3f" providerId="ADAL" clId="{BFDB9BAC-7AC1-4B77-8B85-CA2E7A00C51F}" dt="2024-11-06T18:03:17.832" v="445"/>
-          <ac:grpSpMkLst>
-            <pc:docMk/>
-            <pc:sldMk cId="2285614971" sldId="256"/>
-            <ac:grpSpMk id="105" creationId="{2D9EF646-044D-4DCE-7F9C-DB70DE520B17}"/>
-          </ac:grpSpMkLst>
-        </pc:grpChg>
-        <pc:grpChg chg="add del mod">
-          <ac:chgData name="Gilbert, Neil" userId="37be9f5c-8f28-415b-96d6-624acf93bb3f" providerId="ADAL" clId="{BFDB9BAC-7AC1-4B77-8B85-CA2E7A00C51F}" dt="2024-11-06T18:04:10.861" v="463" actId="165"/>
-          <ac:grpSpMkLst>
-            <pc:docMk/>
-            <pc:sldMk cId="2285614971" sldId="256"/>
-            <ac:grpSpMk id="115" creationId="{382D5206-1721-C099-81B5-30A42D67EB7F}"/>
-          </ac:grpSpMkLst>
-        </pc:grpChg>
-        <pc:grpChg chg="mod ord topLvl">
-          <ac:chgData name="Gilbert, Neil" userId="37be9f5c-8f28-415b-96d6-624acf93bb3f" providerId="ADAL" clId="{BFDB9BAC-7AC1-4B77-8B85-CA2E7A00C51F}" dt="2024-11-06T18:22:28.779" v="714" actId="164"/>
-          <ac:grpSpMkLst>
-            <pc:docMk/>
-            <pc:sldMk cId="2285614971" sldId="256"/>
-            <ac:grpSpMk id="117" creationId="{A866FFF5-B59B-A8F0-361C-C0F06C9E22D3}"/>
-          </ac:grpSpMkLst>
-        </pc:grpChg>
-        <pc:grpChg chg="mod ord topLvl">
-          <ac:chgData name="Gilbert, Neil" userId="37be9f5c-8f28-415b-96d6-624acf93bb3f" providerId="ADAL" clId="{BFDB9BAC-7AC1-4B77-8B85-CA2E7A00C51F}" dt="2024-11-06T18:22:28.779" v="714" actId="164"/>
-          <ac:grpSpMkLst>
-            <pc:docMk/>
-            <pc:sldMk cId="2285614971" sldId="256"/>
-            <ac:grpSpMk id="118" creationId="{A24C37EC-CCCF-FFEE-4CEE-49DCD373A6E7}"/>
-          </ac:grpSpMkLst>
-        </pc:grpChg>
-        <pc:grpChg chg="add del mod topLvl">
-          <ac:chgData name="Gilbert, Neil" userId="37be9f5c-8f28-415b-96d6-624acf93bb3f" providerId="ADAL" clId="{BFDB9BAC-7AC1-4B77-8B85-CA2E7A00C51F}" dt="2024-11-06T18:09:18.632" v="550" actId="165"/>
-          <ac:grpSpMkLst>
-            <pc:docMk/>
-            <pc:sldMk cId="2285614971" sldId="256"/>
-            <ac:grpSpMk id="128" creationId="{E4B79032-D977-B30C-362C-E25CC1D08696}"/>
-          </ac:grpSpMkLst>
-        </pc:grpChg>
-        <pc:grpChg chg="add del mod ord">
-          <ac:chgData name="Gilbert, Neil" userId="37be9f5c-8f28-415b-96d6-624acf93bb3f" providerId="ADAL" clId="{BFDB9BAC-7AC1-4B77-8B85-CA2E7A00C51F}" dt="2024-11-06T18:09:02.976" v="547" actId="165"/>
-          <ac:grpSpMkLst>
-            <pc:docMk/>
-            <pc:sldMk cId="2285614971" sldId="256"/>
-            <ac:grpSpMk id="129" creationId="{4697A391-1DCC-B48B-3312-394AB4BF0B15}"/>
-          </ac:grpSpMkLst>
-        </pc:grpChg>
-        <pc:grpChg chg="add del mod">
-          <ac:chgData name="Gilbert, Neil" userId="37be9f5c-8f28-415b-96d6-624acf93bb3f" providerId="ADAL" clId="{BFDB9BAC-7AC1-4B77-8B85-CA2E7A00C51F}" dt="2024-11-06T18:20:40.388" v="659" actId="165"/>
-          <ac:grpSpMkLst>
-            <pc:docMk/>
-            <pc:sldMk cId="2285614971" sldId="256"/>
-            <ac:grpSpMk id="136" creationId="{8926E846-455E-ED15-1ABB-3DE2E314DA26}"/>
-          </ac:grpSpMkLst>
-        </pc:grpChg>
-        <pc:grpChg chg="add mod">
-          <ac:chgData name="Gilbert, Neil" userId="37be9f5c-8f28-415b-96d6-624acf93bb3f" providerId="ADAL" clId="{BFDB9BAC-7AC1-4B77-8B85-CA2E7A00C51F}" dt="2024-11-06T18:22:28.779" v="714" actId="164"/>
-          <ac:grpSpMkLst>
-            <pc:docMk/>
-            <pc:sldMk cId="2285614971" sldId="256"/>
-            <ac:grpSpMk id="139" creationId="{FFF2867D-5E2F-F39C-3EBC-71EEA28CE4B1}"/>
-          </ac:grpSpMkLst>
-        </pc:grpChg>
-        <pc:grpChg chg="add del mod">
-          <ac:chgData name="Gilbert, Neil" userId="37be9f5c-8f28-415b-96d6-624acf93bb3f" providerId="ADAL" clId="{BFDB9BAC-7AC1-4B77-8B85-CA2E7A00C51F}" dt="2024-11-06T18:26:57.403" v="721" actId="21"/>
-          <ac:grpSpMkLst>
-            <pc:docMk/>
-            <pc:sldMk cId="2285614971" sldId="256"/>
-            <ac:grpSpMk id="141" creationId="{898B890C-5EFA-EE24-53A6-239998BA7006}"/>
-          </ac:grpSpMkLst>
-        </pc:grpChg>
-        <pc:grpChg chg="add del mod">
-          <ac:chgData name="Gilbert, Neil" userId="37be9f5c-8f28-415b-96d6-624acf93bb3f" providerId="ADAL" clId="{BFDB9BAC-7AC1-4B77-8B85-CA2E7A00C51F}" dt="2024-11-20T20:49:56.130" v="841" actId="165"/>
-          <ac:grpSpMkLst>
-            <pc:docMk/>
-            <pc:sldMk cId="2285614971" sldId="256"/>
-            <ac:grpSpMk id="142" creationId="{898B890C-5EFA-EE24-53A6-239998BA7006}"/>
-          </ac:grpSpMkLst>
-        </pc:grpChg>
         <pc:grpChg chg="mod topLvl">
           <ac:chgData name="Gilbert, Neil" userId="37be9f5c-8f28-415b-96d6-624acf93bb3f" providerId="ADAL" clId="{BFDB9BAC-7AC1-4B77-8B85-CA2E7A00C51F}" dt="2024-11-20T20:49:56.130" v="841" actId="165"/>
           <ac:grpSpMkLst>
@@ -914,68 +346,12 @@
             <ac:picMk id="3" creationId="{19794FE7-34CF-25F6-A90A-927CA02B1264}"/>
           </ac:picMkLst>
         </pc:picChg>
-        <pc:picChg chg="add del mod">
-          <ac:chgData name="Gilbert, Neil" userId="37be9f5c-8f28-415b-96d6-624acf93bb3f" providerId="ADAL" clId="{BFDB9BAC-7AC1-4B77-8B85-CA2E7A00C51F}" dt="2024-11-05T21:45:44.552" v="12" actId="478"/>
-          <ac:picMkLst>
-            <pc:docMk/>
-            <pc:sldMk cId="2285614971" sldId="256"/>
-            <ac:picMk id="3" creationId="{746F1703-B255-F31F-88E8-16FC3296C3BC}"/>
-          </ac:picMkLst>
-        </pc:picChg>
-        <pc:picChg chg="add del mod">
-          <ac:chgData name="Gilbert, Neil" userId="37be9f5c-8f28-415b-96d6-624acf93bb3f" providerId="ADAL" clId="{BFDB9BAC-7AC1-4B77-8B85-CA2E7A00C51F}" dt="2024-11-05T21:46:26.849" v="18" actId="478"/>
-          <ac:picMkLst>
-            <pc:docMk/>
-            <pc:sldMk cId="2285614971" sldId="256"/>
-            <ac:picMk id="5" creationId="{3CB43120-022D-6A0D-B8FD-B56C8507CF9E}"/>
-          </ac:picMkLst>
-        </pc:picChg>
-        <pc:picChg chg="add del mod">
-          <ac:chgData name="Gilbert, Neil" userId="37be9f5c-8f28-415b-96d6-624acf93bb3f" providerId="ADAL" clId="{BFDB9BAC-7AC1-4B77-8B85-CA2E7A00C51F}" dt="2024-11-20T20:52:37.356" v="891" actId="478"/>
-          <ac:picMkLst>
-            <pc:docMk/>
-            <pc:sldMk cId="2285614971" sldId="256"/>
-            <ac:picMk id="5" creationId="{F45603A8-7752-0EEF-03C9-389BBBD414C7}"/>
-          </ac:picMkLst>
-        </pc:picChg>
         <pc:picChg chg="add mod">
           <ac:chgData name="Gilbert, Neil" userId="37be9f5c-8f28-415b-96d6-624acf93bb3f" providerId="ADAL" clId="{BFDB9BAC-7AC1-4B77-8B85-CA2E7A00C51F}" dt="2024-11-20T20:52:48.654" v="896" actId="1076"/>
           <ac:picMkLst>
             <pc:docMk/>
             <pc:sldMk cId="2285614971" sldId="256"/>
             <ac:picMk id="7" creationId="{6FDCAFE5-3255-51BB-6BB8-A593F9B8C4EE}"/>
-          </ac:picMkLst>
-        </pc:picChg>
-        <pc:picChg chg="add mod ord topLvl">
-          <ac:chgData name="Gilbert, Neil" userId="37be9f5c-8f28-415b-96d6-624acf93bb3f" providerId="ADAL" clId="{BFDB9BAC-7AC1-4B77-8B85-CA2E7A00C51F}" dt="2024-11-06T18:20:47.009" v="660" actId="164"/>
-          <ac:picMkLst>
-            <pc:docMk/>
-            <pc:sldMk cId="2285614971" sldId="256"/>
-            <ac:picMk id="7" creationId="{7CC7D3A8-5351-2F3A-2D7D-61B33A597917}"/>
-          </ac:picMkLst>
-        </pc:picChg>
-        <pc:picChg chg="add mod ord topLvl">
-          <ac:chgData name="Gilbert, Neil" userId="37be9f5c-8f28-415b-96d6-624acf93bb3f" providerId="ADAL" clId="{BFDB9BAC-7AC1-4B77-8B85-CA2E7A00C51F}" dt="2024-11-06T18:20:47.009" v="660" actId="164"/>
-          <ac:picMkLst>
-            <pc:docMk/>
-            <pc:sldMk cId="2285614971" sldId="256"/>
-            <ac:picMk id="9" creationId="{3F329F53-AAE2-9B68-038D-84A5D53E6942}"/>
-          </ac:picMkLst>
-        </pc:picChg>
-        <pc:picChg chg="del mod">
-          <ac:chgData name="Gilbert, Neil" userId="37be9f5c-8f28-415b-96d6-624acf93bb3f" providerId="ADAL" clId="{BFDB9BAC-7AC1-4B77-8B85-CA2E7A00C51F}" dt="2024-11-20T20:48:45.221" v="831" actId="478"/>
-          <ac:picMkLst>
-            <pc:docMk/>
-            <pc:sldMk cId="2285614971" sldId="256"/>
-            <ac:picMk id="185" creationId="{7CC7D3A8-5351-2F3A-2D7D-61B33A597917}"/>
-          </ac:picMkLst>
-        </pc:picChg>
-        <pc:picChg chg="del mod">
-          <ac:chgData name="Gilbert, Neil" userId="37be9f5c-8f28-415b-96d6-624acf93bb3f" providerId="ADAL" clId="{BFDB9BAC-7AC1-4B77-8B85-CA2E7A00C51F}" dt="2024-11-20T20:49:17.461" v="832" actId="478"/>
-          <ac:picMkLst>
-            <pc:docMk/>
-            <pc:sldMk cId="2285614971" sldId="256"/>
-            <ac:picMk id="186" creationId="{3F329F53-AAE2-9B68-038D-84A5D53E6942}"/>
           </ac:picMkLst>
         </pc:picChg>
         <pc:picChg chg="add mod modCrop">
@@ -986,438 +362,6 @@
             <ac:picMk id="200" creationId="{3BF6928C-B966-F3C2-4EE2-FA0F4110785F}"/>
           </ac:picMkLst>
         </pc:picChg>
-        <pc:cxnChg chg="add mod ord topLvl">
-          <ac:chgData name="Gilbert, Neil" userId="37be9f5c-8f28-415b-96d6-624acf93bb3f" providerId="ADAL" clId="{BFDB9BAC-7AC1-4B77-8B85-CA2E7A00C51F}" dt="2024-11-06T18:22:28.779" v="714" actId="164"/>
-          <ac:cxnSpMkLst>
-            <pc:docMk/>
-            <pc:sldMk cId="2285614971" sldId="256"/>
-            <ac:cxnSpMk id="10" creationId="{ABEFF8FA-058A-3CEC-F656-2A6DA3EE0092}"/>
-          </ac:cxnSpMkLst>
-        </pc:cxnChg>
-        <pc:cxnChg chg="add mod ord topLvl">
-          <ac:chgData name="Gilbert, Neil" userId="37be9f5c-8f28-415b-96d6-624acf93bb3f" providerId="ADAL" clId="{BFDB9BAC-7AC1-4B77-8B85-CA2E7A00C51F}" dt="2024-11-06T18:22:28.779" v="714" actId="164"/>
-          <ac:cxnSpMkLst>
-            <pc:docMk/>
-            <pc:sldMk cId="2285614971" sldId="256"/>
-            <ac:cxnSpMk id="11" creationId="{0AADFC74-E94A-C78C-27E0-0D404FF69DAE}"/>
-          </ac:cxnSpMkLst>
-        </pc:cxnChg>
-        <pc:cxnChg chg="add mod ord topLvl">
-          <ac:chgData name="Gilbert, Neil" userId="37be9f5c-8f28-415b-96d6-624acf93bb3f" providerId="ADAL" clId="{BFDB9BAC-7AC1-4B77-8B85-CA2E7A00C51F}" dt="2024-11-06T18:22:28.779" v="714" actId="164"/>
-          <ac:cxnSpMkLst>
-            <pc:docMk/>
-            <pc:sldMk cId="2285614971" sldId="256"/>
-            <ac:cxnSpMk id="12" creationId="{8D5404AA-3D8E-AB62-C939-287851126F46}"/>
-          </ac:cxnSpMkLst>
-        </pc:cxnChg>
-        <pc:cxnChg chg="add mod topLvl">
-          <ac:chgData name="Gilbert, Neil" userId="37be9f5c-8f28-415b-96d6-624acf93bb3f" providerId="ADAL" clId="{BFDB9BAC-7AC1-4B77-8B85-CA2E7A00C51F}" dt="2024-11-06T18:22:28.779" v="714" actId="164"/>
-          <ac:cxnSpMkLst>
-            <pc:docMk/>
-            <pc:sldMk cId="2285614971" sldId="256"/>
-            <ac:cxnSpMk id="14" creationId="{44D2551E-188B-C0B7-EB79-92B8D01A2155}"/>
-          </ac:cxnSpMkLst>
-        </pc:cxnChg>
-        <pc:cxnChg chg="add mod topLvl">
-          <ac:chgData name="Gilbert, Neil" userId="37be9f5c-8f28-415b-96d6-624acf93bb3f" providerId="ADAL" clId="{BFDB9BAC-7AC1-4B77-8B85-CA2E7A00C51F}" dt="2024-11-06T18:22:28.779" v="714" actId="164"/>
-          <ac:cxnSpMkLst>
-            <pc:docMk/>
-            <pc:sldMk cId="2285614971" sldId="256"/>
-            <ac:cxnSpMk id="15" creationId="{2ABE7146-F454-83F0-95C2-0B2F3BBCE5FA}"/>
-          </ac:cxnSpMkLst>
-        </pc:cxnChg>
-        <pc:cxnChg chg="add del mod">
-          <ac:chgData name="Gilbert, Neil" userId="37be9f5c-8f28-415b-96d6-624acf93bb3f" providerId="ADAL" clId="{BFDB9BAC-7AC1-4B77-8B85-CA2E7A00C51F}" dt="2024-11-06T17:54:16.023" v="347" actId="478"/>
-          <ac:cxnSpMkLst>
-            <pc:docMk/>
-            <pc:sldMk cId="2285614971" sldId="256"/>
-            <ac:cxnSpMk id="19" creationId="{5A4D7190-3131-B41C-CDBD-772C756C6FBE}"/>
-          </ac:cxnSpMkLst>
-        </pc:cxnChg>
-        <pc:cxnChg chg="mod ord topLvl">
-          <ac:chgData name="Gilbert, Neil" userId="37be9f5c-8f28-415b-96d6-624acf93bb3f" providerId="ADAL" clId="{BFDB9BAC-7AC1-4B77-8B85-CA2E7A00C51F}" dt="2024-11-06T18:22:28.779" v="714" actId="164"/>
-          <ac:cxnSpMkLst>
-            <pc:docMk/>
-            <pc:sldMk cId="2285614971" sldId="256"/>
-            <ac:cxnSpMk id="23" creationId="{3D727A4C-679C-A522-31D2-068E1F8B2CB6}"/>
-          </ac:cxnSpMkLst>
-        </pc:cxnChg>
-        <pc:cxnChg chg="mod ord topLvl">
-          <ac:chgData name="Gilbert, Neil" userId="37be9f5c-8f28-415b-96d6-624acf93bb3f" providerId="ADAL" clId="{BFDB9BAC-7AC1-4B77-8B85-CA2E7A00C51F}" dt="2024-11-06T18:22:28.779" v="714" actId="164"/>
-          <ac:cxnSpMkLst>
-            <pc:docMk/>
-            <pc:sldMk cId="2285614971" sldId="256"/>
-            <ac:cxnSpMk id="29" creationId="{F79F486B-2696-818E-5379-BBCFF3A42B89}"/>
-          </ac:cxnSpMkLst>
-        </pc:cxnChg>
-        <pc:cxnChg chg="add mod">
-          <ac:chgData name="Gilbert, Neil" userId="37be9f5c-8f28-415b-96d6-624acf93bb3f" providerId="ADAL" clId="{BFDB9BAC-7AC1-4B77-8B85-CA2E7A00C51F}" dt="2024-11-06T18:20:40.388" v="659" actId="165"/>
-          <ac:cxnSpMkLst>
-            <pc:docMk/>
-            <pc:sldMk cId="2285614971" sldId="256"/>
-            <ac:cxnSpMk id="30" creationId="{83F12579-99B9-2056-A946-F99CDA55613B}"/>
-          </ac:cxnSpMkLst>
-        </pc:cxnChg>
-        <pc:cxnChg chg="mod ord topLvl">
-          <ac:chgData name="Gilbert, Neil" userId="37be9f5c-8f28-415b-96d6-624acf93bb3f" providerId="ADAL" clId="{BFDB9BAC-7AC1-4B77-8B85-CA2E7A00C51F}" dt="2024-11-06T18:22:28.779" v="714" actId="164"/>
-          <ac:cxnSpMkLst>
-            <pc:docMk/>
-            <pc:sldMk cId="2285614971" sldId="256"/>
-            <ac:cxnSpMk id="31" creationId="{2F05BB78-52F8-70D2-A37D-19C96C1A10D6}"/>
-          </ac:cxnSpMkLst>
-        </pc:cxnChg>
-        <pc:cxnChg chg="mod ord topLvl">
-          <ac:chgData name="Gilbert, Neil" userId="37be9f5c-8f28-415b-96d6-624acf93bb3f" providerId="ADAL" clId="{BFDB9BAC-7AC1-4B77-8B85-CA2E7A00C51F}" dt="2024-11-06T18:22:28.779" v="714" actId="164"/>
-          <ac:cxnSpMkLst>
-            <pc:docMk/>
-            <pc:sldMk cId="2285614971" sldId="256"/>
-            <ac:cxnSpMk id="34" creationId="{6605E2DB-6664-5D03-F29D-7C94BB87516A}"/>
-          </ac:cxnSpMkLst>
-        </pc:cxnChg>
-        <pc:cxnChg chg="mod ord topLvl">
-          <ac:chgData name="Gilbert, Neil" userId="37be9f5c-8f28-415b-96d6-624acf93bb3f" providerId="ADAL" clId="{BFDB9BAC-7AC1-4B77-8B85-CA2E7A00C51F}" dt="2024-11-06T18:22:28.779" v="714" actId="164"/>
-          <ac:cxnSpMkLst>
-            <pc:docMk/>
-            <pc:sldMk cId="2285614971" sldId="256"/>
-            <ac:cxnSpMk id="38" creationId="{86505B57-19F7-8D0B-8A25-D2BE1C8A32F1}"/>
-          </ac:cxnSpMkLst>
-        </pc:cxnChg>
-        <pc:cxnChg chg="mod ord topLvl">
-          <ac:chgData name="Gilbert, Neil" userId="37be9f5c-8f28-415b-96d6-624acf93bb3f" providerId="ADAL" clId="{BFDB9BAC-7AC1-4B77-8B85-CA2E7A00C51F}" dt="2024-11-06T18:22:28.779" v="714" actId="164"/>
-          <ac:cxnSpMkLst>
-            <pc:docMk/>
-            <pc:sldMk cId="2285614971" sldId="256"/>
-            <ac:cxnSpMk id="40" creationId="{277066FE-A49D-18F9-0963-B2E23BC9E17A}"/>
-          </ac:cxnSpMkLst>
-        </pc:cxnChg>
-        <pc:cxnChg chg="mod topLvl">
-          <ac:chgData name="Gilbert, Neil" userId="37be9f5c-8f28-415b-96d6-624acf93bb3f" providerId="ADAL" clId="{BFDB9BAC-7AC1-4B77-8B85-CA2E7A00C51F}" dt="2024-11-06T18:22:28.779" v="714" actId="164"/>
-          <ac:cxnSpMkLst>
-            <pc:docMk/>
-            <pc:sldMk cId="2285614971" sldId="256"/>
-            <ac:cxnSpMk id="42" creationId="{E80FE5EA-B068-D763-A2BA-7E83964FFA8E}"/>
-          </ac:cxnSpMkLst>
-        </pc:cxnChg>
-        <pc:cxnChg chg="add mod">
-          <ac:chgData name="Gilbert, Neil" userId="37be9f5c-8f28-415b-96d6-624acf93bb3f" providerId="ADAL" clId="{BFDB9BAC-7AC1-4B77-8B85-CA2E7A00C51F}" dt="2024-11-06T18:20:40.388" v="659" actId="165"/>
-          <ac:cxnSpMkLst>
-            <pc:docMk/>
-            <pc:sldMk cId="2285614971" sldId="256"/>
-            <ac:cxnSpMk id="46" creationId="{9C709318-886B-4317-0EBB-0599F5980B18}"/>
-          </ac:cxnSpMkLst>
-        </pc:cxnChg>
-        <pc:cxnChg chg="add mod">
-          <ac:chgData name="Gilbert, Neil" userId="37be9f5c-8f28-415b-96d6-624acf93bb3f" providerId="ADAL" clId="{BFDB9BAC-7AC1-4B77-8B85-CA2E7A00C51F}" dt="2024-11-06T17:52:52.947" v="310"/>
-          <ac:cxnSpMkLst>
-            <pc:docMk/>
-            <pc:sldMk cId="2285614971" sldId="256"/>
-            <ac:cxnSpMk id="50" creationId="{E73CA81B-9F72-20DE-E96F-DC8F491B5573}"/>
-          </ac:cxnSpMkLst>
-        </pc:cxnChg>
-        <pc:cxnChg chg="add mod">
-          <ac:chgData name="Gilbert, Neil" userId="37be9f5c-8f28-415b-96d6-624acf93bb3f" providerId="ADAL" clId="{BFDB9BAC-7AC1-4B77-8B85-CA2E7A00C51F}" dt="2024-11-06T17:52:52.947" v="310"/>
-          <ac:cxnSpMkLst>
-            <pc:docMk/>
-            <pc:sldMk cId="2285614971" sldId="256"/>
-            <ac:cxnSpMk id="51" creationId="{558A6478-C7FF-C975-DFB4-36A6D16CA52C}"/>
-          </ac:cxnSpMkLst>
-        </pc:cxnChg>
-        <pc:cxnChg chg="add del mod">
-          <ac:chgData name="Gilbert, Neil" userId="37be9f5c-8f28-415b-96d6-624acf93bb3f" providerId="ADAL" clId="{BFDB9BAC-7AC1-4B77-8B85-CA2E7A00C51F}" dt="2024-11-06T17:54:16.697" v="348" actId="478"/>
-          <ac:cxnSpMkLst>
-            <pc:docMk/>
-            <pc:sldMk cId="2285614971" sldId="256"/>
-            <ac:cxnSpMk id="52" creationId="{FD099CB7-7A71-0E25-5E08-971310BC7FA4}"/>
-          </ac:cxnSpMkLst>
-        </pc:cxnChg>
-        <pc:cxnChg chg="mod">
-          <ac:chgData name="Gilbert, Neil" userId="37be9f5c-8f28-415b-96d6-624acf93bb3f" providerId="ADAL" clId="{BFDB9BAC-7AC1-4B77-8B85-CA2E7A00C51F}" dt="2024-11-06T18:20:40.388" v="659" actId="165"/>
-          <ac:cxnSpMkLst>
-            <pc:docMk/>
-            <pc:sldMk cId="2285614971" sldId="256"/>
-            <ac:cxnSpMk id="59" creationId="{8F6BD69C-AC1D-5320-7DFE-F9FE30253B0C}"/>
-          </ac:cxnSpMkLst>
-        </pc:cxnChg>
-        <pc:cxnChg chg="mod">
-          <ac:chgData name="Gilbert, Neil" userId="37be9f5c-8f28-415b-96d6-624acf93bb3f" providerId="ADAL" clId="{BFDB9BAC-7AC1-4B77-8B85-CA2E7A00C51F}" dt="2024-11-06T18:20:40.388" v="659" actId="165"/>
-          <ac:cxnSpMkLst>
-            <pc:docMk/>
-            <pc:sldMk cId="2285614971" sldId="256"/>
-            <ac:cxnSpMk id="60" creationId="{8689201C-C159-74AA-F738-7538A64F9038}"/>
-          </ac:cxnSpMkLst>
-        </pc:cxnChg>
-        <pc:cxnChg chg="add mod">
-          <ac:chgData name="Gilbert, Neil" userId="37be9f5c-8f28-415b-96d6-624acf93bb3f" providerId="ADAL" clId="{BFDB9BAC-7AC1-4B77-8B85-CA2E7A00C51F}" dt="2024-11-06T17:56:53.531" v="377" actId="571"/>
-          <ac:cxnSpMkLst>
-            <pc:docMk/>
-            <pc:sldMk cId="2285614971" sldId="256"/>
-            <ac:cxnSpMk id="63" creationId="{C631AF2E-F5FA-6BDF-F274-8847EDB3779B}"/>
-          </ac:cxnSpMkLst>
-        </pc:cxnChg>
-        <pc:cxnChg chg="mod">
-          <ac:chgData name="Gilbert, Neil" userId="37be9f5c-8f28-415b-96d6-624acf93bb3f" providerId="ADAL" clId="{BFDB9BAC-7AC1-4B77-8B85-CA2E7A00C51F}" dt="2024-11-06T17:56:53.531" v="377" actId="571"/>
-          <ac:cxnSpMkLst>
-            <pc:docMk/>
-            <pc:sldMk cId="2285614971" sldId="256"/>
-            <ac:cxnSpMk id="65" creationId="{C94A05D3-2043-026E-0AA2-322A937BD26E}"/>
-          </ac:cxnSpMkLst>
-        </pc:cxnChg>
-        <pc:cxnChg chg="mod">
-          <ac:chgData name="Gilbert, Neil" userId="37be9f5c-8f28-415b-96d6-624acf93bb3f" providerId="ADAL" clId="{BFDB9BAC-7AC1-4B77-8B85-CA2E7A00C51F}" dt="2024-11-06T17:56:53.531" v="377" actId="571"/>
-          <ac:cxnSpMkLst>
-            <pc:docMk/>
-            <pc:sldMk cId="2285614971" sldId="256"/>
-            <ac:cxnSpMk id="66" creationId="{C87675F0-EEEA-DF05-1587-A666DC226B0C}"/>
-          </ac:cxnSpMkLst>
-        </pc:cxnChg>
-        <pc:cxnChg chg="add mod ord topLvl">
-          <ac:chgData name="Gilbert, Neil" userId="37be9f5c-8f28-415b-96d6-624acf93bb3f" providerId="ADAL" clId="{BFDB9BAC-7AC1-4B77-8B85-CA2E7A00C51F}" dt="2024-11-06T18:22:28.779" v="714" actId="164"/>
-          <ac:cxnSpMkLst>
-            <pc:docMk/>
-            <pc:sldMk cId="2285614971" sldId="256"/>
-            <ac:cxnSpMk id="70" creationId="{A2A61796-95EF-283F-0D93-D61A0E5AA1FD}"/>
-          </ac:cxnSpMkLst>
-        </pc:cxnChg>
-        <pc:cxnChg chg="mod">
-          <ac:chgData name="Gilbert, Neil" userId="37be9f5c-8f28-415b-96d6-624acf93bb3f" providerId="ADAL" clId="{BFDB9BAC-7AC1-4B77-8B85-CA2E7A00C51F}" dt="2024-11-06T18:03:16.607" v="443"/>
-          <ac:cxnSpMkLst>
-            <pc:docMk/>
-            <pc:sldMk cId="2285614971" sldId="256"/>
-            <ac:cxnSpMk id="77" creationId="{8FBF7D77-09A9-7170-2005-9707D78C26AA}"/>
-          </ac:cxnSpMkLst>
-        </pc:cxnChg>
-        <pc:cxnChg chg="mod">
-          <ac:chgData name="Gilbert, Neil" userId="37be9f5c-8f28-415b-96d6-624acf93bb3f" providerId="ADAL" clId="{BFDB9BAC-7AC1-4B77-8B85-CA2E7A00C51F}" dt="2024-11-06T18:03:16.607" v="443"/>
-          <ac:cxnSpMkLst>
-            <pc:docMk/>
-            <pc:sldMk cId="2285614971" sldId="256"/>
-            <ac:cxnSpMk id="83" creationId="{19F7755A-DF02-9371-7A3B-E652DCDF38B3}"/>
-          </ac:cxnSpMkLst>
-        </pc:cxnChg>
-        <pc:cxnChg chg="mod">
-          <ac:chgData name="Gilbert, Neil" userId="37be9f5c-8f28-415b-96d6-624acf93bb3f" providerId="ADAL" clId="{BFDB9BAC-7AC1-4B77-8B85-CA2E7A00C51F}" dt="2024-11-06T18:03:16.607" v="443"/>
-          <ac:cxnSpMkLst>
-            <pc:docMk/>
-            <pc:sldMk cId="2285614971" sldId="256"/>
-            <ac:cxnSpMk id="84" creationId="{56642001-8D1F-1831-1708-AB643CE914E3}"/>
-          </ac:cxnSpMkLst>
-        </pc:cxnChg>
-        <pc:cxnChg chg="mod">
-          <ac:chgData name="Gilbert, Neil" userId="37be9f5c-8f28-415b-96d6-624acf93bb3f" providerId="ADAL" clId="{BFDB9BAC-7AC1-4B77-8B85-CA2E7A00C51F}" dt="2024-11-06T18:03:16.607" v="443"/>
-          <ac:cxnSpMkLst>
-            <pc:docMk/>
-            <pc:sldMk cId="2285614971" sldId="256"/>
-            <ac:cxnSpMk id="85" creationId="{24CFE736-2D04-44D2-02A4-6C10FFB77ED1}"/>
-          </ac:cxnSpMkLst>
-        </pc:cxnChg>
-        <pc:cxnChg chg="mod">
-          <ac:chgData name="Gilbert, Neil" userId="37be9f5c-8f28-415b-96d6-624acf93bb3f" providerId="ADAL" clId="{BFDB9BAC-7AC1-4B77-8B85-CA2E7A00C51F}" dt="2024-11-06T18:03:16.607" v="443"/>
-          <ac:cxnSpMkLst>
-            <pc:docMk/>
-            <pc:sldMk cId="2285614971" sldId="256"/>
-            <ac:cxnSpMk id="86" creationId="{78F53CCA-B08E-DE1E-CB81-E6BF9BE0718D}"/>
-          </ac:cxnSpMkLst>
-        </pc:cxnChg>
-        <pc:cxnChg chg="mod">
-          <ac:chgData name="Gilbert, Neil" userId="37be9f5c-8f28-415b-96d6-624acf93bb3f" providerId="ADAL" clId="{BFDB9BAC-7AC1-4B77-8B85-CA2E7A00C51F}" dt="2024-11-06T18:03:16.607" v="443"/>
-          <ac:cxnSpMkLst>
-            <pc:docMk/>
-            <pc:sldMk cId="2285614971" sldId="256"/>
-            <ac:cxnSpMk id="87" creationId="{6597F02A-A96D-A2ED-E4EE-AA4DBA31FFEA}"/>
-          </ac:cxnSpMkLst>
-        </pc:cxnChg>
-        <pc:cxnChg chg="mod">
-          <ac:chgData name="Gilbert, Neil" userId="37be9f5c-8f28-415b-96d6-624acf93bb3f" providerId="ADAL" clId="{BFDB9BAC-7AC1-4B77-8B85-CA2E7A00C51F}" dt="2024-11-06T18:03:16.607" v="443"/>
-          <ac:cxnSpMkLst>
-            <pc:docMk/>
-            <pc:sldMk cId="2285614971" sldId="256"/>
-            <ac:cxnSpMk id="88" creationId="{1BA23426-195E-37C0-3AEF-6E63F7CB4B19}"/>
-          </ac:cxnSpMkLst>
-        </pc:cxnChg>
-        <pc:cxnChg chg="mod">
-          <ac:chgData name="Gilbert, Neil" userId="37be9f5c-8f28-415b-96d6-624acf93bb3f" providerId="ADAL" clId="{BFDB9BAC-7AC1-4B77-8B85-CA2E7A00C51F}" dt="2024-11-06T18:03:17.335" v="444"/>
-          <ac:cxnSpMkLst>
-            <pc:docMk/>
-            <pc:sldMk cId="2285614971" sldId="256"/>
-            <ac:cxnSpMk id="90" creationId="{42902DD6-E2E3-F007-4F3C-551DD13E7C6F}"/>
-          </ac:cxnSpMkLst>
-        </pc:cxnChg>
-        <pc:cxnChg chg="mod">
-          <ac:chgData name="Gilbert, Neil" userId="37be9f5c-8f28-415b-96d6-624acf93bb3f" providerId="ADAL" clId="{BFDB9BAC-7AC1-4B77-8B85-CA2E7A00C51F}" dt="2024-11-06T18:03:17.335" v="444"/>
-          <ac:cxnSpMkLst>
-            <pc:docMk/>
-            <pc:sldMk cId="2285614971" sldId="256"/>
-            <ac:cxnSpMk id="96" creationId="{90BA65F6-FA79-2DFD-4EA2-748D44B357F4}"/>
-          </ac:cxnSpMkLst>
-        </pc:cxnChg>
-        <pc:cxnChg chg="mod">
-          <ac:chgData name="Gilbert, Neil" userId="37be9f5c-8f28-415b-96d6-624acf93bb3f" providerId="ADAL" clId="{BFDB9BAC-7AC1-4B77-8B85-CA2E7A00C51F}" dt="2024-11-06T18:03:17.335" v="444"/>
-          <ac:cxnSpMkLst>
-            <pc:docMk/>
-            <pc:sldMk cId="2285614971" sldId="256"/>
-            <ac:cxnSpMk id="97" creationId="{18B5CE55-B8E7-787B-665C-74DC705FDCCD}"/>
-          </ac:cxnSpMkLst>
-        </pc:cxnChg>
-        <pc:cxnChg chg="mod">
-          <ac:chgData name="Gilbert, Neil" userId="37be9f5c-8f28-415b-96d6-624acf93bb3f" providerId="ADAL" clId="{BFDB9BAC-7AC1-4B77-8B85-CA2E7A00C51F}" dt="2024-11-06T18:03:17.335" v="444"/>
-          <ac:cxnSpMkLst>
-            <pc:docMk/>
-            <pc:sldMk cId="2285614971" sldId="256"/>
-            <ac:cxnSpMk id="98" creationId="{470614DD-DB6C-F0B3-C2A0-CAA4A729F6AD}"/>
-          </ac:cxnSpMkLst>
-        </pc:cxnChg>
-        <pc:cxnChg chg="mod">
-          <ac:chgData name="Gilbert, Neil" userId="37be9f5c-8f28-415b-96d6-624acf93bb3f" providerId="ADAL" clId="{BFDB9BAC-7AC1-4B77-8B85-CA2E7A00C51F}" dt="2024-11-06T18:03:17.335" v="444"/>
-          <ac:cxnSpMkLst>
-            <pc:docMk/>
-            <pc:sldMk cId="2285614971" sldId="256"/>
-            <ac:cxnSpMk id="99" creationId="{ED3E11CC-F752-9DEE-D96D-ABE14507217D}"/>
-          </ac:cxnSpMkLst>
-        </pc:cxnChg>
-        <pc:cxnChg chg="mod">
-          <ac:chgData name="Gilbert, Neil" userId="37be9f5c-8f28-415b-96d6-624acf93bb3f" providerId="ADAL" clId="{BFDB9BAC-7AC1-4B77-8B85-CA2E7A00C51F}" dt="2024-11-06T18:03:17.335" v="444"/>
-          <ac:cxnSpMkLst>
-            <pc:docMk/>
-            <pc:sldMk cId="2285614971" sldId="256"/>
-            <ac:cxnSpMk id="100" creationId="{7DDBE5ED-7B02-C65D-98B6-71EEB9B91139}"/>
-          </ac:cxnSpMkLst>
-        </pc:cxnChg>
-        <pc:cxnChg chg="mod">
-          <ac:chgData name="Gilbert, Neil" userId="37be9f5c-8f28-415b-96d6-624acf93bb3f" providerId="ADAL" clId="{BFDB9BAC-7AC1-4B77-8B85-CA2E7A00C51F}" dt="2024-11-06T18:03:17.335" v="444"/>
-          <ac:cxnSpMkLst>
-            <pc:docMk/>
-            <pc:sldMk cId="2285614971" sldId="256"/>
-            <ac:cxnSpMk id="101" creationId="{49E50ECB-EBA9-EE58-BA4D-565BAC72EBC2}"/>
-          </ac:cxnSpMkLst>
-        </pc:cxnChg>
-        <pc:cxnChg chg="mod">
-          <ac:chgData name="Gilbert, Neil" userId="37be9f5c-8f28-415b-96d6-624acf93bb3f" providerId="ADAL" clId="{BFDB9BAC-7AC1-4B77-8B85-CA2E7A00C51F}" dt="2024-11-06T18:03:17.832" v="445"/>
-          <ac:cxnSpMkLst>
-            <pc:docMk/>
-            <pc:sldMk cId="2285614971" sldId="256"/>
-            <ac:cxnSpMk id="103" creationId="{5E58A778-1A57-A5D1-9D98-9D03F9E00957}"/>
-          </ac:cxnSpMkLst>
-        </pc:cxnChg>
-        <pc:cxnChg chg="mod">
-          <ac:chgData name="Gilbert, Neil" userId="37be9f5c-8f28-415b-96d6-624acf93bb3f" providerId="ADAL" clId="{BFDB9BAC-7AC1-4B77-8B85-CA2E7A00C51F}" dt="2024-11-06T18:03:17.832" v="445"/>
-          <ac:cxnSpMkLst>
-            <pc:docMk/>
-            <pc:sldMk cId="2285614971" sldId="256"/>
-            <ac:cxnSpMk id="109" creationId="{FC0903C7-843F-8B03-00B1-FEB76046D075}"/>
-          </ac:cxnSpMkLst>
-        </pc:cxnChg>
-        <pc:cxnChg chg="mod">
-          <ac:chgData name="Gilbert, Neil" userId="37be9f5c-8f28-415b-96d6-624acf93bb3f" providerId="ADAL" clId="{BFDB9BAC-7AC1-4B77-8B85-CA2E7A00C51F}" dt="2024-11-06T18:03:17.832" v="445"/>
-          <ac:cxnSpMkLst>
-            <pc:docMk/>
-            <pc:sldMk cId="2285614971" sldId="256"/>
-            <ac:cxnSpMk id="110" creationId="{FB6020F2-DF68-72DC-15C2-43ED16D9F6FA}"/>
-          </ac:cxnSpMkLst>
-        </pc:cxnChg>
-        <pc:cxnChg chg="mod">
-          <ac:chgData name="Gilbert, Neil" userId="37be9f5c-8f28-415b-96d6-624acf93bb3f" providerId="ADAL" clId="{BFDB9BAC-7AC1-4B77-8B85-CA2E7A00C51F}" dt="2024-11-06T18:03:17.832" v="445"/>
-          <ac:cxnSpMkLst>
-            <pc:docMk/>
-            <pc:sldMk cId="2285614971" sldId="256"/>
-            <ac:cxnSpMk id="111" creationId="{4D2DAC1A-6243-ED7C-22AE-684B2F9B8901}"/>
-          </ac:cxnSpMkLst>
-        </pc:cxnChg>
-        <pc:cxnChg chg="mod">
-          <ac:chgData name="Gilbert, Neil" userId="37be9f5c-8f28-415b-96d6-624acf93bb3f" providerId="ADAL" clId="{BFDB9BAC-7AC1-4B77-8B85-CA2E7A00C51F}" dt="2024-11-06T18:03:17.832" v="445"/>
-          <ac:cxnSpMkLst>
-            <pc:docMk/>
-            <pc:sldMk cId="2285614971" sldId="256"/>
-            <ac:cxnSpMk id="112" creationId="{E8865EA9-F03D-6A56-A44F-D189F6B3A3B9}"/>
-          </ac:cxnSpMkLst>
-        </pc:cxnChg>
-        <pc:cxnChg chg="mod">
-          <ac:chgData name="Gilbert, Neil" userId="37be9f5c-8f28-415b-96d6-624acf93bb3f" providerId="ADAL" clId="{BFDB9BAC-7AC1-4B77-8B85-CA2E7A00C51F}" dt="2024-11-06T18:03:17.832" v="445"/>
-          <ac:cxnSpMkLst>
-            <pc:docMk/>
-            <pc:sldMk cId="2285614971" sldId="256"/>
-            <ac:cxnSpMk id="113" creationId="{3670154E-4BFA-9ADA-94B4-C1EE4A6950CA}"/>
-          </ac:cxnSpMkLst>
-        </pc:cxnChg>
-        <pc:cxnChg chg="mod">
-          <ac:chgData name="Gilbert, Neil" userId="37be9f5c-8f28-415b-96d6-624acf93bb3f" providerId="ADAL" clId="{BFDB9BAC-7AC1-4B77-8B85-CA2E7A00C51F}" dt="2024-11-06T18:03:17.832" v="445"/>
-          <ac:cxnSpMkLst>
-            <pc:docMk/>
-            <pc:sldMk cId="2285614971" sldId="256"/>
-            <ac:cxnSpMk id="114" creationId="{A08A01DD-F97F-C67A-7B4C-52C0020AC592}"/>
-          </ac:cxnSpMkLst>
-        </pc:cxnChg>
-        <pc:cxnChg chg="mod ord topLvl">
-          <ac:chgData name="Gilbert, Neil" userId="37be9f5c-8f28-415b-96d6-624acf93bb3f" providerId="ADAL" clId="{BFDB9BAC-7AC1-4B77-8B85-CA2E7A00C51F}" dt="2024-11-06T18:22:28.779" v="714" actId="164"/>
-          <ac:cxnSpMkLst>
-            <pc:docMk/>
-            <pc:sldMk cId="2285614971" sldId="256"/>
-            <ac:cxnSpMk id="116" creationId="{C0DE42C2-B945-689C-0D29-3C9643E03BE5}"/>
-          </ac:cxnSpMkLst>
-        </pc:cxnChg>
-        <pc:cxnChg chg="mod ord topLvl">
-          <ac:chgData name="Gilbert, Neil" userId="37be9f5c-8f28-415b-96d6-624acf93bb3f" providerId="ADAL" clId="{BFDB9BAC-7AC1-4B77-8B85-CA2E7A00C51F}" dt="2024-11-06T18:22:28.779" v="714" actId="164"/>
-          <ac:cxnSpMkLst>
-            <pc:docMk/>
-            <pc:sldMk cId="2285614971" sldId="256"/>
-            <ac:cxnSpMk id="122" creationId="{D5BC7A8F-F63A-BF49-FCC3-257B1F1E716C}"/>
-          </ac:cxnSpMkLst>
-        </pc:cxnChg>
-        <pc:cxnChg chg="mod ord topLvl">
-          <ac:chgData name="Gilbert, Neil" userId="37be9f5c-8f28-415b-96d6-624acf93bb3f" providerId="ADAL" clId="{BFDB9BAC-7AC1-4B77-8B85-CA2E7A00C51F}" dt="2024-11-06T18:22:28.779" v="714" actId="164"/>
-          <ac:cxnSpMkLst>
-            <pc:docMk/>
-            <pc:sldMk cId="2285614971" sldId="256"/>
-            <ac:cxnSpMk id="123" creationId="{BA388B67-597A-2F9D-5F6F-A1531825A236}"/>
-          </ac:cxnSpMkLst>
-        </pc:cxnChg>
-        <pc:cxnChg chg="mod">
-          <ac:chgData name="Gilbert, Neil" userId="37be9f5c-8f28-415b-96d6-624acf93bb3f" providerId="ADAL" clId="{BFDB9BAC-7AC1-4B77-8B85-CA2E7A00C51F}" dt="2024-11-06T18:20:40.388" v="659" actId="165"/>
-          <ac:cxnSpMkLst>
-            <pc:docMk/>
-            <pc:sldMk cId="2285614971" sldId="256"/>
-            <ac:cxnSpMk id="124" creationId="{CDBCE974-006D-C86E-5185-3CB52BB96A35}"/>
-          </ac:cxnSpMkLst>
-        </pc:cxnChg>
-        <pc:cxnChg chg="mod">
-          <ac:chgData name="Gilbert, Neil" userId="37be9f5c-8f28-415b-96d6-624acf93bb3f" providerId="ADAL" clId="{BFDB9BAC-7AC1-4B77-8B85-CA2E7A00C51F}" dt="2024-11-06T18:20:40.388" v="659" actId="165"/>
-          <ac:cxnSpMkLst>
-            <pc:docMk/>
-            <pc:sldMk cId="2285614971" sldId="256"/>
-            <ac:cxnSpMk id="125" creationId="{756B5BD6-59D9-0E74-B13B-89F6CAD670FC}"/>
-          </ac:cxnSpMkLst>
-        </pc:cxnChg>
-        <pc:cxnChg chg="mod">
-          <ac:chgData name="Gilbert, Neil" userId="37be9f5c-8f28-415b-96d6-624acf93bb3f" providerId="ADAL" clId="{BFDB9BAC-7AC1-4B77-8B85-CA2E7A00C51F}" dt="2024-11-06T18:20:40.388" v="659" actId="165"/>
-          <ac:cxnSpMkLst>
-            <pc:docMk/>
-            <pc:sldMk cId="2285614971" sldId="256"/>
-            <ac:cxnSpMk id="126" creationId="{C13F27C8-41EF-5E99-CF70-49C62025876D}"/>
-          </ac:cxnSpMkLst>
-        </pc:cxnChg>
-        <pc:cxnChg chg="mod">
-          <ac:chgData name="Gilbert, Neil" userId="37be9f5c-8f28-415b-96d6-624acf93bb3f" providerId="ADAL" clId="{BFDB9BAC-7AC1-4B77-8B85-CA2E7A00C51F}" dt="2024-11-06T18:20:40.388" v="659" actId="165"/>
-          <ac:cxnSpMkLst>
-            <pc:docMk/>
-            <pc:sldMk cId="2285614971" sldId="256"/>
-            <ac:cxnSpMk id="127" creationId="{2064A4CC-5BD3-66BC-7E3C-E299C0B5FB12}"/>
-          </ac:cxnSpMkLst>
-        </pc:cxnChg>
-        <pc:cxnChg chg="add mod topLvl">
-          <ac:chgData name="Gilbert, Neil" userId="37be9f5c-8f28-415b-96d6-624acf93bb3f" providerId="ADAL" clId="{BFDB9BAC-7AC1-4B77-8B85-CA2E7A00C51F}" dt="2024-11-06T18:20:47.009" v="660" actId="164"/>
-          <ac:cxnSpMkLst>
-            <pc:docMk/>
-            <pc:sldMk cId="2285614971" sldId="256"/>
-            <ac:cxnSpMk id="132" creationId="{9B959068-493F-D57C-3343-9CAEE7E3DC6F}"/>
-          </ac:cxnSpMkLst>
-        </pc:cxnChg>
-        <pc:cxnChg chg="add mod topLvl">
-          <ac:chgData name="Gilbert, Neil" userId="37be9f5c-8f28-415b-96d6-624acf93bb3f" providerId="ADAL" clId="{BFDB9BAC-7AC1-4B77-8B85-CA2E7A00C51F}" dt="2024-11-06T18:20:47.009" v="660" actId="164"/>
-          <ac:cxnSpMkLst>
-            <pc:docMk/>
-            <pc:sldMk cId="2285614971" sldId="256"/>
-            <ac:cxnSpMk id="135" creationId="{E1FE11D0-39CA-DE6A-AFDA-FEFE5506D797}"/>
-          </ac:cxnSpMkLst>
-        </pc:cxnChg>
         <pc:cxnChg chg="mod topLvl">
           <ac:chgData name="Gilbert, Neil" userId="37be9f5c-8f28-415b-96d6-624acf93bb3f" providerId="ADAL" clId="{BFDB9BAC-7AC1-4B77-8B85-CA2E7A00C51F}" dt="2024-11-20T20:49:56.130" v="841" actId="165"/>
           <ac:cxnSpMkLst>
@@ -1432,14 +376,6 @@
             <pc:docMk/>
             <pc:sldMk cId="2285614971" sldId="256"/>
             <ac:cxnSpMk id="148" creationId="{44D2551E-188B-C0B7-EB79-92B8D01A2155}"/>
-          </ac:cxnSpMkLst>
-        </pc:cxnChg>
-        <pc:cxnChg chg="del mod">
-          <ac:chgData name="Gilbert, Neil" userId="37be9f5c-8f28-415b-96d6-624acf93bb3f" providerId="ADAL" clId="{BFDB9BAC-7AC1-4B77-8B85-CA2E7A00C51F}" dt="2024-11-20T20:46:30.627" v="829" actId="478"/>
-          <ac:cxnSpMkLst>
-            <pc:docMk/>
-            <pc:sldMk cId="2285614971" sldId="256"/>
-            <ac:cxnSpMk id="155" creationId="{E80FE5EA-B068-D763-A2BA-7E83964FFA8E}"/>
           </ac:cxnSpMkLst>
         </pc:cxnChg>
         <pc:cxnChg chg="mod topLvl">
@@ -1520,22 +456,6 @@
             <pc:docMk/>
             <pc:sldMk cId="2285614971" sldId="256"/>
             <ac:cxnSpMk id="177" creationId="{3D727A4C-679C-A522-31D2-068E1F8B2CB6}"/>
-          </ac:cxnSpMkLst>
-        </pc:cxnChg>
-        <pc:cxnChg chg="del mod">
-          <ac:chgData name="Gilbert, Neil" userId="37be9f5c-8f28-415b-96d6-624acf93bb3f" providerId="ADAL" clId="{BFDB9BAC-7AC1-4B77-8B85-CA2E7A00C51F}" dt="2024-11-20T20:46:33.096" v="830" actId="478"/>
-          <ac:cxnSpMkLst>
-            <pc:docMk/>
-            <pc:sldMk cId="2285614971" sldId="256"/>
-            <ac:cxnSpMk id="178" creationId="{277066FE-A49D-18F9-0963-B2E23BC9E17A}"/>
-          </ac:cxnSpMkLst>
-        </pc:cxnChg>
-        <pc:cxnChg chg="del mod">
-          <ac:chgData name="Gilbert, Neil" userId="37be9f5c-8f28-415b-96d6-624acf93bb3f" providerId="ADAL" clId="{BFDB9BAC-7AC1-4B77-8B85-CA2E7A00C51F}" dt="2024-11-20T20:46:28.613" v="828" actId="478"/>
-          <ac:cxnSpMkLst>
-            <pc:docMk/>
-            <pc:sldMk cId="2285614971" sldId="256"/>
-            <ac:cxnSpMk id="179" creationId="{86505B57-19F7-8D0B-8A25-D2BE1C8A32F1}"/>
           </ac:cxnSpMkLst>
         </pc:cxnChg>
         <pc:cxnChg chg="mod topLvl">
@@ -1633,110 +553,6 @@
           <pc:docMk/>
           <pc:sldMk cId="1508675758" sldId="257"/>
         </pc:sldMkLst>
-        <pc:spChg chg="mod">
-          <ac:chgData name="Gilbert, Neil" userId="37be9f5c-8f28-415b-96d6-624acf93bb3f" providerId="ADAL" clId="{BFDB9BAC-7AC1-4B77-8B85-CA2E7A00C51F}" dt="2024-11-06T18:03:13.622" v="442"/>
-          <ac:spMkLst>
-            <pc:docMk/>
-            <pc:sldMk cId="1508675758" sldId="257"/>
-            <ac:spMk id="6" creationId="{15EFD470-EEC9-1F39-3F75-9B4BA64DAD4A}"/>
-          </ac:spMkLst>
-        </pc:spChg>
-        <pc:spChg chg="mod">
-          <ac:chgData name="Gilbert, Neil" userId="37be9f5c-8f28-415b-96d6-624acf93bb3f" providerId="ADAL" clId="{BFDB9BAC-7AC1-4B77-8B85-CA2E7A00C51F}" dt="2024-11-06T18:03:13.622" v="442"/>
-          <ac:spMkLst>
-            <pc:docMk/>
-            <pc:sldMk cId="1508675758" sldId="257"/>
-            <ac:spMk id="7" creationId="{3135EBBD-967A-6816-9301-10561A982C24}"/>
-          </ac:spMkLst>
-        </pc:spChg>
-        <pc:spChg chg="mod">
-          <ac:chgData name="Gilbert, Neil" userId="37be9f5c-8f28-415b-96d6-624acf93bb3f" providerId="ADAL" clId="{BFDB9BAC-7AC1-4B77-8B85-CA2E7A00C51F}" dt="2024-11-06T18:03:13.622" v="442"/>
-          <ac:spMkLst>
-            <pc:docMk/>
-            <pc:sldMk cId="1508675758" sldId="257"/>
-            <ac:spMk id="8" creationId="{50CC7C52-416E-2A29-A715-F39106E85CAD}"/>
-          </ac:spMkLst>
-        </pc:spChg>
-        <pc:grpChg chg="add mod">
-          <ac:chgData name="Gilbert, Neil" userId="37be9f5c-8f28-415b-96d6-624acf93bb3f" providerId="ADAL" clId="{BFDB9BAC-7AC1-4B77-8B85-CA2E7A00C51F}" dt="2024-11-06T18:03:13.622" v="442"/>
-          <ac:grpSpMkLst>
-            <pc:docMk/>
-            <pc:sldMk cId="1508675758" sldId="257"/>
-            <ac:grpSpMk id="2" creationId="{B8E645D2-9C45-A269-E0F8-E16FF9C9D15C}"/>
-          </ac:grpSpMkLst>
-        </pc:grpChg>
-        <pc:grpChg chg="mod">
-          <ac:chgData name="Gilbert, Neil" userId="37be9f5c-8f28-415b-96d6-624acf93bb3f" providerId="ADAL" clId="{BFDB9BAC-7AC1-4B77-8B85-CA2E7A00C51F}" dt="2024-11-06T18:03:13.622" v="442"/>
-          <ac:grpSpMkLst>
-            <pc:docMk/>
-            <pc:sldMk cId="1508675758" sldId="257"/>
-            <ac:grpSpMk id="4" creationId="{1FFB56A7-47E8-27A1-B28C-402155249767}"/>
-          </ac:grpSpMkLst>
-        </pc:grpChg>
-        <pc:grpChg chg="mod">
-          <ac:chgData name="Gilbert, Neil" userId="37be9f5c-8f28-415b-96d6-624acf93bb3f" providerId="ADAL" clId="{BFDB9BAC-7AC1-4B77-8B85-CA2E7A00C51F}" dt="2024-11-06T18:03:13.622" v="442"/>
-          <ac:grpSpMkLst>
-            <pc:docMk/>
-            <pc:sldMk cId="1508675758" sldId="257"/>
-            <ac:grpSpMk id="5" creationId="{D91D53FC-7810-AFA0-120D-065945F9ADDF}"/>
-          </ac:grpSpMkLst>
-        </pc:grpChg>
-        <pc:cxnChg chg="mod">
-          <ac:chgData name="Gilbert, Neil" userId="37be9f5c-8f28-415b-96d6-624acf93bb3f" providerId="ADAL" clId="{BFDB9BAC-7AC1-4B77-8B85-CA2E7A00C51F}" dt="2024-11-06T18:03:13.622" v="442"/>
-          <ac:cxnSpMkLst>
-            <pc:docMk/>
-            <pc:sldMk cId="1508675758" sldId="257"/>
-            <ac:cxnSpMk id="3" creationId="{1663DD72-1530-32FA-E727-3D2D246FFCC9}"/>
-          </ac:cxnSpMkLst>
-        </pc:cxnChg>
-        <pc:cxnChg chg="mod">
-          <ac:chgData name="Gilbert, Neil" userId="37be9f5c-8f28-415b-96d6-624acf93bb3f" providerId="ADAL" clId="{BFDB9BAC-7AC1-4B77-8B85-CA2E7A00C51F}" dt="2024-11-06T18:03:13.622" v="442"/>
-          <ac:cxnSpMkLst>
-            <pc:docMk/>
-            <pc:sldMk cId="1508675758" sldId="257"/>
-            <ac:cxnSpMk id="9" creationId="{0F764BE5-D966-8548-E93B-1A9081925116}"/>
-          </ac:cxnSpMkLst>
-        </pc:cxnChg>
-        <pc:cxnChg chg="mod">
-          <ac:chgData name="Gilbert, Neil" userId="37be9f5c-8f28-415b-96d6-624acf93bb3f" providerId="ADAL" clId="{BFDB9BAC-7AC1-4B77-8B85-CA2E7A00C51F}" dt="2024-11-06T18:03:13.622" v="442"/>
-          <ac:cxnSpMkLst>
-            <pc:docMk/>
-            <pc:sldMk cId="1508675758" sldId="257"/>
-            <ac:cxnSpMk id="10" creationId="{2BB057B4-496C-51E1-6208-613EE58EED07}"/>
-          </ac:cxnSpMkLst>
-        </pc:cxnChg>
-        <pc:cxnChg chg="mod">
-          <ac:chgData name="Gilbert, Neil" userId="37be9f5c-8f28-415b-96d6-624acf93bb3f" providerId="ADAL" clId="{BFDB9BAC-7AC1-4B77-8B85-CA2E7A00C51F}" dt="2024-11-06T18:03:13.622" v="442"/>
-          <ac:cxnSpMkLst>
-            <pc:docMk/>
-            <pc:sldMk cId="1508675758" sldId="257"/>
-            <ac:cxnSpMk id="11" creationId="{C7CD3109-857B-7FF3-51A8-F2442F3DB129}"/>
-          </ac:cxnSpMkLst>
-        </pc:cxnChg>
-        <pc:cxnChg chg="mod">
-          <ac:chgData name="Gilbert, Neil" userId="37be9f5c-8f28-415b-96d6-624acf93bb3f" providerId="ADAL" clId="{BFDB9BAC-7AC1-4B77-8B85-CA2E7A00C51F}" dt="2024-11-06T18:03:13.622" v="442"/>
-          <ac:cxnSpMkLst>
-            <pc:docMk/>
-            <pc:sldMk cId="1508675758" sldId="257"/>
-            <ac:cxnSpMk id="12" creationId="{9F03B8E4-4EAE-A8E1-A828-AAE6FF1825B5}"/>
-          </ac:cxnSpMkLst>
-        </pc:cxnChg>
-        <pc:cxnChg chg="mod">
-          <ac:chgData name="Gilbert, Neil" userId="37be9f5c-8f28-415b-96d6-624acf93bb3f" providerId="ADAL" clId="{BFDB9BAC-7AC1-4B77-8B85-CA2E7A00C51F}" dt="2024-11-06T18:03:13.622" v="442"/>
-          <ac:cxnSpMkLst>
-            <pc:docMk/>
-            <pc:sldMk cId="1508675758" sldId="257"/>
-            <ac:cxnSpMk id="13" creationId="{07D35DBD-8889-A07F-7D42-B785068D3CCE}"/>
-          </ac:cxnSpMkLst>
-        </pc:cxnChg>
-        <pc:cxnChg chg="mod">
-          <ac:chgData name="Gilbert, Neil" userId="37be9f5c-8f28-415b-96d6-624acf93bb3f" providerId="ADAL" clId="{BFDB9BAC-7AC1-4B77-8B85-CA2E7A00C51F}" dt="2024-11-06T18:03:13.622" v="442"/>
-          <ac:cxnSpMkLst>
-            <pc:docMk/>
-            <pc:sldMk cId="1508675758" sldId="257"/>
-            <ac:cxnSpMk id="14" creationId="{69B7080B-5DBC-6239-B102-153C3ECEB5D5}"/>
-          </ac:cxnSpMkLst>
-        </pc:cxnChg>
       </pc:sldChg>
       <pc:sldChg chg="addSp modSp new del mod">
         <pc:chgData name="Gilbert, Neil" userId="37be9f5c-8f28-415b-96d6-624acf93bb3f" providerId="ADAL" clId="{BFDB9BAC-7AC1-4B77-8B85-CA2E7A00C51F}" dt="2024-11-06T18:26:00.437" v="720" actId="47"/>
@@ -1744,110 +560,54 @@
           <pc:docMk/>
           <pc:sldMk cId="3768758158" sldId="257"/>
         </pc:sldMkLst>
+      </pc:sldChg>
+    </pc:docChg>
+  </pc:docChgLst>
+  <pc:docChgLst>
+    <pc:chgData name="Gilbert, Neil" userId="37be9f5c-8f28-415b-96d6-624acf93bb3f" providerId="ADAL" clId="{524DC664-82EB-4B6F-B59A-EE28FC4DDA0B}"/>
+    <pc:docChg chg="modSld">
+      <pc:chgData name="Gilbert, Neil" userId="37be9f5c-8f28-415b-96d6-624acf93bb3f" providerId="ADAL" clId="{524DC664-82EB-4B6F-B59A-EE28FC4DDA0B}" dt="2024-12-09T18:03:13.921" v="5" actId="207"/>
+      <pc:docMkLst>
+        <pc:docMk/>
+      </pc:docMkLst>
+      <pc:sldChg chg="modSp mod">
+        <pc:chgData name="Gilbert, Neil" userId="37be9f5c-8f28-415b-96d6-624acf93bb3f" providerId="ADAL" clId="{524DC664-82EB-4B6F-B59A-EE28FC4DDA0B}" dt="2024-12-09T18:03:13.921" v="5" actId="207"/>
+        <pc:sldMkLst>
+          <pc:docMk/>
+          <pc:sldMk cId="2285614971" sldId="256"/>
+        </pc:sldMkLst>
         <pc:spChg chg="mod">
-          <ac:chgData name="Gilbert, Neil" userId="37be9f5c-8f28-415b-96d6-624acf93bb3f" providerId="ADAL" clId="{BFDB9BAC-7AC1-4B77-8B85-CA2E7A00C51F}" dt="2024-11-06T18:03:29.334" v="450"/>
+          <ac:chgData name="Gilbert, Neil" userId="37be9f5c-8f28-415b-96d6-624acf93bb3f" providerId="ADAL" clId="{524DC664-82EB-4B6F-B59A-EE28FC4DDA0B}" dt="2024-12-09T18:03:13.921" v="5" actId="207"/>
           <ac:spMkLst>
             <pc:docMk/>
-            <pc:sldMk cId="3768758158" sldId="257"/>
-            <ac:spMk id="6" creationId="{15D30A85-1D9E-B079-B968-C97141606251}"/>
+            <pc:sldMk cId="2285614971" sldId="256"/>
+            <ac:spMk id="160" creationId="{0DB05E49-117D-538A-0C75-667BFFB2682A}"/>
           </ac:spMkLst>
         </pc:spChg>
         <pc:spChg chg="mod">
-          <ac:chgData name="Gilbert, Neil" userId="37be9f5c-8f28-415b-96d6-624acf93bb3f" providerId="ADAL" clId="{BFDB9BAC-7AC1-4B77-8B85-CA2E7A00C51F}" dt="2024-11-06T18:03:29.334" v="450"/>
+          <ac:chgData name="Gilbert, Neil" userId="37be9f5c-8f28-415b-96d6-624acf93bb3f" providerId="ADAL" clId="{524DC664-82EB-4B6F-B59A-EE28FC4DDA0B}" dt="2024-12-09T18:02:45.425" v="0" actId="20577"/>
           <ac:spMkLst>
             <pc:docMk/>
-            <pc:sldMk cId="3768758158" sldId="257"/>
-            <ac:spMk id="7" creationId="{B68C4F9D-C87A-C606-F631-5082A20204B2}"/>
+            <pc:sldMk cId="2285614971" sldId="256"/>
+            <ac:spMk id="182" creationId="{56E40366-6E4B-10B3-C81D-52524A318F08}"/>
           </ac:spMkLst>
         </pc:spChg>
         <pc:spChg chg="mod">
-          <ac:chgData name="Gilbert, Neil" userId="37be9f5c-8f28-415b-96d6-624acf93bb3f" providerId="ADAL" clId="{BFDB9BAC-7AC1-4B77-8B85-CA2E7A00C51F}" dt="2024-11-06T18:03:29.334" v="450"/>
+          <ac:chgData name="Gilbert, Neil" userId="37be9f5c-8f28-415b-96d6-624acf93bb3f" providerId="ADAL" clId="{524DC664-82EB-4B6F-B59A-EE28FC4DDA0B}" dt="2024-12-09T18:02:48.388" v="2" actId="20577"/>
           <ac:spMkLst>
             <pc:docMk/>
-            <pc:sldMk cId="3768758158" sldId="257"/>
-            <ac:spMk id="8" creationId="{43B584BC-5BED-85CE-1B5A-82812A4BBAE1}"/>
+            <pc:sldMk cId="2285614971" sldId="256"/>
+            <ac:spMk id="183" creationId="{3080F696-CFCB-CE92-F1A5-E20D98F98F4E}"/>
           </ac:spMkLst>
         </pc:spChg>
-        <pc:grpChg chg="add mod">
-          <ac:chgData name="Gilbert, Neil" userId="37be9f5c-8f28-415b-96d6-624acf93bb3f" providerId="ADAL" clId="{BFDB9BAC-7AC1-4B77-8B85-CA2E7A00C51F}" dt="2024-11-06T18:03:29.334" v="450"/>
-          <ac:grpSpMkLst>
+        <pc:spChg chg="mod">
+          <ac:chgData name="Gilbert, Neil" userId="37be9f5c-8f28-415b-96d6-624acf93bb3f" providerId="ADAL" clId="{524DC664-82EB-4B6F-B59A-EE28FC4DDA0B}" dt="2024-12-09T18:02:50.824" v="4" actId="20577"/>
+          <ac:spMkLst>
             <pc:docMk/>
-            <pc:sldMk cId="3768758158" sldId="257"/>
-            <ac:grpSpMk id="2" creationId="{77F71BDB-AE3F-AD0C-2952-1775591D987D}"/>
-          </ac:grpSpMkLst>
-        </pc:grpChg>
-        <pc:grpChg chg="mod">
-          <ac:chgData name="Gilbert, Neil" userId="37be9f5c-8f28-415b-96d6-624acf93bb3f" providerId="ADAL" clId="{BFDB9BAC-7AC1-4B77-8B85-CA2E7A00C51F}" dt="2024-11-06T18:03:29.334" v="450"/>
-          <ac:grpSpMkLst>
-            <pc:docMk/>
-            <pc:sldMk cId="3768758158" sldId="257"/>
-            <ac:grpSpMk id="4" creationId="{3B053A2D-5A57-FFEF-B02A-53794BFC0C57}"/>
-          </ac:grpSpMkLst>
-        </pc:grpChg>
-        <pc:grpChg chg="mod">
-          <ac:chgData name="Gilbert, Neil" userId="37be9f5c-8f28-415b-96d6-624acf93bb3f" providerId="ADAL" clId="{BFDB9BAC-7AC1-4B77-8B85-CA2E7A00C51F}" dt="2024-11-06T18:03:29.334" v="450"/>
-          <ac:grpSpMkLst>
-            <pc:docMk/>
-            <pc:sldMk cId="3768758158" sldId="257"/>
-            <ac:grpSpMk id="5" creationId="{7CB3D72E-10A9-8C9B-9676-AFAD91D54501}"/>
-          </ac:grpSpMkLst>
-        </pc:grpChg>
-        <pc:cxnChg chg="mod">
-          <ac:chgData name="Gilbert, Neil" userId="37be9f5c-8f28-415b-96d6-624acf93bb3f" providerId="ADAL" clId="{BFDB9BAC-7AC1-4B77-8B85-CA2E7A00C51F}" dt="2024-11-06T18:03:29.334" v="450"/>
-          <ac:cxnSpMkLst>
-            <pc:docMk/>
-            <pc:sldMk cId="3768758158" sldId="257"/>
-            <ac:cxnSpMk id="3" creationId="{68DBD685-3904-FD1F-1B60-67381EB3BEC2}"/>
-          </ac:cxnSpMkLst>
-        </pc:cxnChg>
-        <pc:cxnChg chg="mod">
-          <ac:chgData name="Gilbert, Neil" userId="37be9f5c-8f28-415b-96d6-624acf93bb3f" providerId="ADAL" clId="{BFDB9BAC-7AC1-4B77-8B85-CA2E7A00C51F}" dt="2024-11-06T18:03:48.806" v="459" actId="1036"/>
-          <ac:cxnSpMkLst>
-            <pc:docMk/>
-            <pc:sldMk cId="3768758158" sldId="257"/>
-            <ac:cxnSpMk id="9" creationId="{376E4E59-B2CF-5237-32A6-F9A30ED432AB}"/>
-          </ac:cxnSpMkLst>
-        </pc:cxnChg>
-        <pc:cxnChg chg="mod">
-          <ac:chgData name="Gilbert, Neil" userId="37be9f5c-8f28-415b-96d6-624acf93bb3f" providerId="ADAL" clId="{BFDB9BAC-7AC1-4B77-8B85-CA2E7A00C51F}" dt="2024-11-06T18:03:29.334" v="450"/>
-          <ac:cxnSpMkLst>
-            <pc:docMk/>
-            <pc:sldMk cId="3768758158" sldId="257"/>
-            <ac:cxnSpMk id="10" creationId="{1F2FE140-6A93-3028-661E-10FA5236C287}"/>
-          </ac:cxnSpMkLst>
-        </pc:cxnChg>
-        <pc:cxnChg chg="mod">
-          <ac:chgData name="Gilbert, Neil" userId="37be9f5c-8f28-415b-96d6-624acf93bb3f" providerId="ADAL" clId="{BFDB9BAC-7AC1-4B77-8B85-CA2E7A00C51F}" dt="2024-11-06T18:03:29.334" v="450"/>
-          <ac:cxnSpMkLst>
-            <pc:docMk/>
-            <pc:sldMk cId="3768758158" sldId="257"/>
-            <ac:cxnSpMk id="11" creationId="{DCA0E5D1-DD5F-17EB-0923-C1660F09CDCC}"/>
-          </ac:cxnSpMkLst>
-        </pc:cxnChg>
-        <pc:cxnChg chg="mod">
-          <ac:chgData name="Gilbert, Neil" userId="37be9f5c-8f28-415b-96d6-624acf93bb3f" providerId="ADAL" clId="{BFDB9BAC-7AC1-4B77-8B85-CA2E7A00C51F}" dt="2024-11-06T18:03:29.334" v="450"/>
-          <ac:cxnSpMkLst>
-            <pc:docMk/>
-            <pc:sldMk cId="3768758158" sldId="257"/>
-            <ac:cxnSpMk id="12" creationId="{5DBC3446-3E03-8863-EE31-9113666B8F3C}"/>
-          </ac:cxnSpMkLst>
-        </pc:cxnChg>
-        <pc:cxnChg chg="mod">
-          <ac:chgData name="Gilbert, Neil" userId="37be9f5c-8f28-415b-96d6-624acf93bb3f" providerId="ADAL" clId="{BFDB9BAC-7AC1-4B77-8B85-CA2E7A00C51F}" dt="2024-11-06T18:03:29.334" v="450"/>
-          <ac:cxnSpMkLst>
-            <pc:docMk/>
-            <pc:sldMk cId="3768758158" sldId="257"/>
-            <ac:cxnSpMk id="13" creationId="{1F2DAED6-7B65-7C51-DBA4-2BFF0EDED17F}"/>
-          </ac:cxnSpMkLst>
-        </pc:cxnChg>
-        <pc:cxnChg chg="mod">
-          <ac:chgData name="Gilbert, Neil" userId="37be9f5c-8f28-415b-96d6-624acf93bb3f" providerId="ADAL" clId="{BFDB9BAC-7AC1-4B77-8B85-CA2E7A00C51F}" dt="2024-11-06T18:03:29.334" v="450"/>
-          <ac:cxnSpMkLst>
-            <pc:docMk/>
-            <pc:sldMk cId="3768758158" sldId="257"/>
-            <ac:cxnSpMk id="14" creationId="{F37C2B54-08D6-C708-AAC2-F8A441E9242B}"/>
-          </ac:cxnSpMkLst>
-        </pc:cxnChg>
+            <pc:sldMk cId="2285614971" sldId="256"/>
+            <ac:spMk id="184" creationId="{DB740122-2878-08AB-2A0F-E2229BA9C12B}"/>
+          </ac:spMkLst>
+        </pc:spChg>
       </pc:sldChg>
     </pc:docChg>
   </pc:docChgLst>
@@ -1985,7 +745,7 @@
           <a:p>
             <a:fld id="{BBBF4EB7-BB73-4F04-B77C-5ADB8CA8E26C}" type="datetimeFigureOut">
               <a:rPr lang="en-US" smtClean="0"/>
-              <a:t>11/20/2024</a:t>
+              <a:t>12/9/2024</a:t>
             </a:fld>
             <a:endParaRPr lang="en-US"/>
           </a:p>
@@ -2155,7 +915,7 @@
           <a:p>
             <a:fld id="{BBBF4EB7-BB73-4F04-B77C-5ADB8CA8E26C}" type="datetimeFigureOut">
               <a:rPr lang="en-US" smtClean="0"/>
-              <a:t>11/20/2024</a:t>
+              <a:t>12/9/2024</a:t>
             </a:fld>
             <a:endParaRPr lang="en-US"/>
           </a:p>
@@ -2335,7 +1095,7 @@
           <a:p>
             <a:fld id="{BBBF4EB7-BB73-4F04-B77C-5ADB8CA8E26C}" type="datetimeFigureOut">
               <a:rPr lang="en-US" smtClean="0"/>
-              <a:t>11/20/2024</a:t>
+              <a:t>12/9/2024</a:t>
             </a:fld>
             <a:endParaRPr lang="en-US"/>
           </a:p>
@@ -2505,7 +1265,7 @@
           <a:p>
             <a:fld id="{BBBF4EB7-BB73-4F04-B77C-5ADB8CA8E26C}" type="datetimeFigureOut">
               <a:rPr lang="en-US" smtClean="0"/>
-              <a:t>11/20/2024</a:t>
+              <a:t>12/9/2024</a:t>
             </a:fld>
             <a:endParaRPr lang="en-US"/>
           </a:p>
@@ -2751,7 +1511,7 @@
           <a:p>
             <a:fld id="{BBBF4EB7-BB73-4F04-B77C-5ADB8CA8E26C}" type="datetimeFigureOut">
               <a:rPr lang="en-US" smtClean="0"/>
-              <a:t>11/20/2024</a:t>
+              <a:t>12/9/2024</a:t>
             </a:fld>
             <a:endParaRPr lang="en-US"/>
           </a:p>
@@ -2983,7 +1743,7 @@
           <a:p>
             <a:fld id="{BBBF4EB7-BB73-4F04-B77C-5ADB8CA8E26C}" type="datetimeFigureOut">
               <a:rPr lang="en-US" smtClean="0"/>
-              <a:t>11/20/2024</a:t>
+              <a:t>12/9/2024</a:t>
             </a:fld>
             <a:endParaRPr lang="en-US"/>
           </a:p>
@@ -3350,7 +2110,7 @@
           <a:p>
             <a:fld id="{BBBF4EB7-BB73-4F04-B77C-5ADB8CA8E26C}" type="datetimeFigureOut">
               <a:rPr lang="en-US" smtClean="0"/>
-              <a:t>11/20/2024</a:t>
+              <a:t>12/9/2024</a:t>
             </a:fld>
             <a:endParaRPr lang="en-US"/>
           </a:p>
@@ -3468,7 +2228,7 @@
           <a:p>
             <a:fld id="{BBBF4EB7-BB73-4F04-B77C-5ADB8CA8E26C}" type="datetimeFigureOut">
               <a:rPr lang="en-US" smtClean="0"/>
-              <a:t>11/20/2024</a:t>
+              <a:t>12/9/2024</a:t>
             </a:fld>
             <a:endParaRPr lang="en-US"/>
           </a:p>
@@ -3563,7 +2323,7 @@
           <a:p>
             <a:fld id="{BBBF4EB7-BB73-4F04-B77C-5ADB8CA8E26C}" type="datetimeFigureOut">
               <a:rPr lang="en-US" smtClean="0"/>
-              <a:t>11/20/2024</a:t>
+              <a:t>12/9/2024</a:t>
             </a:fld>
             <a:endParaRPr lang="en-US"/>
           </a:p>
@@ -3840,7 +2600,7 @@
           <a:p>
             <a:fld id="{BBBF4EB7-BB73-4F04-B77C-5ADB8CA8E26C}" type="datetimeFigureOut">
               <a:rPr lang="en-US" smtClean="0"/>
-              <a:t>11/20/2024</a:t>
+              <a:t>12/9/2024</a:t>
             </a:fld>
             <a:endParaRPr lang="en-US"/>
           </a:p>
@@ -4097,7 +2857,7 @@
           <a:p>
             <a:fld id="{BBBF4EB7-BB73-4F04-B77C-5ADB8CA8E26C}" type="datetimeFigureOut">
               <a:rPr lang="en-US" smtClean="0"/>
-              <a:t>11/20/2024</a:t>
+              <a:t>12/9/2024</a:t>
             </a:fld>
             <a:endParaRPr lang="en-US"/>
           </a:p>
@@ -4310,7 +3070,7 @@
           <a:p>
             <a:fld id="{BBBF4EB7-BB73-4F04-B77C-5ADB8CA8E26C}" type="datetimeFigureOut">
               <a:rPr lang="en-US" smtClean="0"/>
-              <a:t>11/20/2024</a:t>
+              <a:t>12/9/2024</a:t>
             </a:fld>
             <a:endParaRPr lang="en-US"/>
           </a:p>
@@ -5774,7 +4534,7 @@
             <a:r>
               <a:rPr lang="en-US" sz="800" i="1" dirty="0">
                 <a:solidFill>
-                  <a:srgbClr val="F7C267"/>
+                  <a:srgbClr val="F4A820"/>
                 </a:solidFill>
               </a:rPr>
               <a:t>bright landscapes</a:t>
@@ -6835,7 +5595,7 @@
                   <a:schemeClr val="tx1"/>
                 </a:solidFill>
               </a:rPr>
-              <a:t>(a)</a:t>
+              <a:t>(A)</a:t>
             </a:r>
           </a:p>
         </p:txBody>
@@ -7169,7 +5929,7 @@
                   <a:schemeClr val="tx1"/>
                 </a:solidFill>
               </a:rPr>
-              <a:t>(b)</a:t>
+              <a:t>(B)</a:t>
             </a:r>
           </a:p>
         </p:txBody>
@@ -7226,7 +5986,7 @@
                   <a:schemeClr val="tx1"/>
                 </a:solidFill>
               </a:rPr>
-              <a:t>(c)</a:t>
+              <a:t>(C)</a:t>
             </a:r>
           </a:p>
         </p:txBody>

</xml_diff>

<commit_message>
updated figures for revision
</commit_message>
<xml_diff>
--- a/Results/Figures/figure_02.pptx
+++ b/Results/Figures/figure_02.pptx
@@ -123,8 +123,384 @@
 </p:presentation>
 </file>
 
+<file path=ppt/revisionInfo.xml><?xml version="1.0" encoding="utf-8"?>
+<p1510:revInfo xmlns:a="http://schemas.openxmlformats.org/drawingml/2006/main" xmlns:r="http://schemas.openxmlformats.org/officeDocument/2006/relationships" xmlns:p1510="http://schemas.microsoft.com/office/powerpoint/2015/10/main">
+  <p1510:revLst>
+    <p1510:client id="{248E61FA-0205-4482-A397-D2D102E0CACF}" v="9" dt="2025-03-18T22:46:56.540"/>
+  </p1510:revLst>
+</p1510:revInfo>
+</file>
+
 <file path=ppt/changesInfos/changesInfo1.xml><?xml version="1.0" encoding="utf-8"?>
 <pc:chgInfo xmlns:a="http://schemas.openxmlformats.org/drawingml/2006/main" xmlns:r="http://schemas.openxmlformats.org/officeDocument/2006/relationships" xmlns:ac="http://schemas.microsoft.com/office/drawing/2013/main/command" xmlns:pc="http://schemas.microsoft.com/office/powerpoint/2013/main/command">
+  <pc:docChgLst>
+    <pc:chgData name="Gilbert, Neil" userId="37be9f5c-8f28-415b-96d6-624acf93bb3f" providerId="ADAL" clId="{248E61FA-0205-4482-A397-D2D102E0CACF}"/>
+    <pc:docChg chg="undo custSel modSld">
+      <pc:chgData name="Gilbert, Neil" userId="37be9f5c-8f28-415b-96d6-624acf93bb3f" providerId="ADAL" clId="{248E61FA-0205-4482-A397-D2D102E0CACF}" dt="2025-03-18T22:49:19.417" v="188" actId="2711"/>
+      <pc:docMkLst>
+        <pc:docMk/>
+      </pc:docMkLst>
+      <pc:sldChg chg="addSp delSp modSp mod">
+        <pc:chgData name="Gilbert, Neil" userId="37be9f5c-8f28-415b-96d6-624acf93bb3f" providerId="ADAL" clId="{248E61FA-0205-4482-A397-D2D102E0CACF}" dt="2025-03-18T22:49:19.417" v="188" actId="2711"/>
+        <pc:sldMkLst>
+          <pc:docMk/>
+          <pc:sldMk cId="2285614971" sldId="256"/>
+        </pc:sldMkLst>
+        <pc:spChg chg="add del mod">
+          <ac:chgData name="Gilbert, Neil" userId="37be9f5c-8f28-415b-96d6-624acf93bb3f" providerId="ADAL" clId="{248E61FA-0205-4482-A397-D2D102E0CACF}" dt="2025-03-18T21:04:38.363" v="11" actId="478"/>
+          <ac:spMkLst>
+            <pc:docMk/>
+            <pc:sldMk cId="2285614971" sldId="256"/>
+            <ac:spMk id="4" creationId="{E622ED7B-EBA7-F81A-90F2-2D79D2425E3A}"/>
+          </ac:spMkLst>
+        </pc:spChg>
+        <pc:spChg chg="add mod ord">
+          <ac:chgData name="Gilbert, Neil" userId="37be9f5c-8f28-415b-96d6-624acf93bb3f" providerId="ADAL" clId="{248E61FA-0205-4482-A397-D2D102E0CACF}" dt="2025-03-18T21:09:52.874" v="88" actId="14100"/>
+          <ac:spMkLst>
+            <pc:docMk/>
+            <pc:sldMk cId="2285614971" sldId="256"/>
+            <ac:spMk id="5" creationId="{3BC7C386-3033-51E0-18B0-709F428E239A}"/>
+          </ac:spMkLst>
+        </pc:spChg>
+        <pc:spChg chg="add mod">
+          <ac:chgData name="Gilbert, Neil" userId="37be9f5c-8f28-415b-96d6-624acf93bb3f" providerId="ADAL" clId="{248E61FA-0205-4482-A397-D2D102E0CACF}" dt="2025-03-18T21:07:57.591" v="61" actId="1035"/>
+          <ac:spMkLst>
+            <pc:docMk/>
+            <pc:sldMk cId="2285614971" sldId="256"/>
+            <ac:spMk id="6" creationId="{319A71C7-3EA3-EE1F-FF1B-1A573F3214ED}"/>
+          </ac:spMkLst>
+        </pc:spChg>
+        <pc:spChg chg="add mod">
+          <ac:chgData name="Gilbert, Neil" userId="37be9f5c-8f28-415b-96d6-624acf93bb3f" providerId="ADAL" clId="{248E61FA-0205-4482-A397-D2D102E0CACF}" dt="2025-03-18T21:09:20.952" v="79" actId="1037"/>
+          <ac:spMkLst>
+            <pc:docMk/>
+            <pc:sldMk cId="2285614971" sldId="256"/>
+            <ac:spMk id="8" creationId="{E57B961B-925C-2DD6-6F82-B80BE340E434}"/>
+          </ac:spMkLst>
+        </pc:spChg>
+        <pc:spChg chg="add mod">
+          <ac:chgData name="Gilbert, Neil" userId="37be9f5c-8f28-415b-96d6-624acf93bb3f" providerId="ADAL" clId="{248E61FA-0205-4482-A397-D2D102E0CACF}" dt="2025-03-18T22:46:47.532" v="165" actId="1038"/>
+          <ac:spMkLst>
+            <pc:docMk/>
+            <pc:sldMk cId="2285614971" sldId="256"/>
+            <ac:spMk id="13" creationId="{E02DAF51-BB98-8F3D-89D8-27018DD02F30}"/>
+          </ac:spMkLst>
+        </pc:spChg>
+        <pc:spChg chg="add mod">
+          <ac:chgData name="Gilbert, Neil" userId="37be9f5c-8f28-415b-96d6-624acf93bb3f" providerId="ADAL" clId="{248E61FA-0205-4482-A397-D2D102E0CACF}" dt="2025-03-18T22:47:16.565" v="170" actId="1037"/>
+          <ac:spMkLst>
+            <pc:docMk/>
+            <pc:sldMk cId="2285614971" sldId="256"/>
+            <ac:spMk id="14" creationId="{58523974-3037-5A4F-BE6D-3C9D9EC84274}"/>
+          </ac:spMkLst>
+        </pc:spChg>
+        <pc:spChg chg="mod topLvl">
+          <ac:chgData name="Gilbert, Neil" userId="37be9f5c-8f28-415b-96d6-624acf93bb3f" providerId="ADAL" clId="{248E61FA-0205-4482-A397-D2D102E0CACF}" dt="2025-03-18T21:07:05.853" v="32" actId="165"/>
+          <ac:spMkLst>
+            <pc:docMk/>
+            <pc:sldMk cId="2285614971" sldId="256"/>
+            <ac:spMk id="146" creationId="{FB10D0CE-A40F-364A-FAB9-1CA8DE74656D}"/>
+          </ac:spMkLst>
+        </pc:spChg>
+        <pc:spChg chg="mod topLvl">
+          <ac:chgData name="Gilbert, Neil" userId="37be9f5c-8f28-415b-96d6-624acf93bb3f" providerId="ADAL" clId="{248E61FA-0205-4482-A397-D2D102E0CACF}" dt="2025-03-18T21:07:05.853" v="32" actId="165"/>
+          <ac:spMkLst>
+            <pc:docMk/>
+            <pc:sldMk cId="2285614971" sldId="256"/>
+            <ac:spMk id="147" creationId="{442C39E8-F06C-A9AE-594A-B6FDAF28A25A}"/>
+          </ac:spMkLst>
+        </pc:spChg>
+        <pc:spChg chg="mod topLvl">
+          <ac:chgData name="Gilbert, Neil" userId="37be9f5c-8f28-415b-96d6-624acf93bb3f" providerId="ADAL" clId="{248E61FA-0205-4482-A397-D2D102E0CACF}" dt="2025-03-18T21:07:05.853" v="32" actId="165"/>
+          <ac:spMkLst>
+            <pc:docMk/>
+            <pc:sldMk cId="2285614971" sldId="256"/>
+            <ac:spMk id="151" creationId="{37340C50-EBCF-47B5-D113-F9237E3BAE9E}"/>
+          </ac:spMkLst>
+        </pc:spChg>
+        <pc:spChg chg="mod topLvl">
+          <ac:chgData name="Gilbert, Neil" userId="37be9f5c-8f28-415b-96d6-624acf93bb3f" providerId="ADAL" clId="{248E61FA-0205-4482-A397-D2D102E0CACF}" dt="2025-03-18T21:09:24.409" v="80" actId="1038"/>
+          <ac:spMkLst>
+            <pc:docMk/>
+            <pc:sldMk cId="2285614971" sldId="256"/>
+            <ac:spMk id="153" creationId="{3933E569-1727-EB25-B730-A8538487E3D6}"/>
+          </ac:spMkLst>
+        </pc:spChg>
+        <pc:spChg chg="mod topLvl">
+          <ac:chgData name="Gilbert, Neil" userId="37be9f5c-8f28-415b-96d6-624acf93bb3f" providerId="ADAL" clId="{248E61FA-0205-4482-A397-D2D102E0CACF}" dt="2025-03-18T21:09:56.096" v="89" actId="1037"/>
+          <ac:spMkLst>
+            <pc:docMk/>
+            <pc:sldMk cId="2285614971" sldId="256"/>
+            <ac:spMk id="154" creationId="{4321748A-3B29-9708-220C-DF93B8764EDC}"/>
+          </ac:spMkLst>
+        </pc:spChg>
+        <pc:spChg chg="mod">
+          <ac:chgData name="Gilbert, Neil" userId="37be9f5c-8f28-415b-96d6-624acf93bb3f" providerId="ADAL" clId="{248E61FA-0205-4482-A397-D2D102E0CACF}" dt="2025-03-18T22:48:49.853" v="184" actId="1038"/>
+          <ac:spMkLst>
+            <pc:docMk/>
+            <pc:sldMk cId="2285614971" sldId="256"/>
+            <ac:spMk id="157" creationId="{4376EE0B-ED62-B1FB-3E1C-90CF93D5A3AA}"/>
+          </ac:spMkLst>
+        </pc:spChg>
+        <pc:spChg chg="mod">
+          <ac:chgData name="Gilbert, Neil" userId="37be9f5c-8f28-415b-96d6-624acf93bb3f" providerId="ADAL" clId="{248E61FA-0205-4482-A397-D2D102E0CACF}" dt="2025-03-18T22:48:22.475" v="178" actId="1035"/>
+          <ac:spMkLst>
+            <pc:docMk/>
+            <pc:sldMk cId="2285614971" sldId="256"/>
+            <ac:spMk id="159" creationId="{1F4BEDF8-FA5A-1B5A-2C4E-69C73CE5B547}"/>
+          </ac:spMkLst>
+        </pc:spChg>
+        <pc:spChg chg="mod">
+          <ac:chgData name="Gilbert, Neil" userId="37be9f5c-8f28-415b-96d6-624acf93bb3f" providerId="ADAL" clId="{248E61FA-0205-4482-A397-D2D102E0CACF}" dt="2025-03-18T22:48:37.115" v="180" actId="207"/>
+          <ac:spMkLst>
+            <pc:docMk/>
+            <pc:sldMk cId="2285614971" sldId="256"/>
+            <ac:spMk id="160" creationId="{0DB05E49-117D-538A-0C75-667BFFB2682A}"/>
+          </ac:spMkLst>
+        </pc:spChg>
+        <pc:spChg chg="mod topLvl">
+          <ac:chgData name="Gilbert, Neil" userId="37be9f5c-8f28-415b-96d6-624acf93bb3f" providerId="ADAL" clId="{248E61FA-0205-4482-A397-D2D102E0CACF}" dt="2025-03-18T22:49:04.167" v="185" actId="2711"/>
+          <ac:spMkLst>
+            <pc:docMk/>
+            <pc:sldMk cId="2285614971" sldId="256"/>
+            <ac:spMk id="161" creationId="{B1040277-1F46-26E9-C162-7A262F2FDB17}"/>
+          </ac:spMkLst>
+        </pc:spChg>
+        <pc:spChg chg="mod">
+          <ac:chgData name="Gilbert, Neil" userId="37be9f5c-8f28-415b-96d6-624acf93bb3f" providerId="ADAL" clId="{248E61FA-0205-4482-A397-D2D102E0CACF}" dt="2025-03-18T21:07:50.310" v="58" actId="1036"/>
+          <ac:spMkLst>
+            <pc:docMk/>
+            <pc:sldMk cId="2285614971" sldId="256"/>
+            <ac:spMk id="164" creationId="{2BADAB18-E642-C78F-5345-1762A49A3A65}"/>
+          </ac:spMkLst>
+        </pc:spChg>
+        <pc:spChg chg="mod">
+          <ac:chgData name="Gilbert, Neil" userId="37be9f5c-8f28-415b-96d6-624acf93bb3f" providerId="ADAL" clId="{248E61FA-0205-4482-A397-D2D102E0CACF}" dt="2025-03-18T21:05:04.130" v="17" actId="207"/>
+          <ac:spMkLst>
+            <pc:docMk/>
+            <pc:sldMk cId="2285614971" sldId="256"/>
+            <ac:spMk id="165" creationId="{BAA7BA02-0507-4778-EE94-5F61D2EB490A}"/>
+          </ac:spMkLst>
+        </pc:spChg>
+        <pc:spChg chg="mod">
+          <ac:chgData name="Gilbert, Neil" userId="37be9f5c-8f28-415b-96d6-624acf93bb3f" providerId="ADAL" clId="{248E61FA-0205-4482-A397-D2D102E0CACF}" dt="2025-03-18T22:48:14.722" v="171" actId="2711"/>
+          <ac:spMkLst>
+            <pc:docMk/>
+            <pc:sldMk cId="2285614971" sldId="256"/>
+            <ac:spMk id="171" creationId="{26FB3674-FE46-4300-7C19-CDDA729F0230}"/>
+          </ac:spMkLst>
+        </pc:spChg>
+        <pc:spChg chg="mod topLvl">
+          <ac:chgData name="Gilbert, Neil" userId="37be9f5c-8f28-415b-96d6-624acf93bb3f" providerId="ADAL" clId="{248E61FA-0205-4482-A397-D2D102E0CACF}" dt="2025-03-18T21:07:05.853" v="32" actId="165"/>
+          <ac:spMkLst>
+            <pc:docMk/>
+            <pc:sldMk cId="2285614971" sldId="256"/>
+            <ac:spMk id="175" creationId="{0F944584-22C4-18EF-5F1C-D75A84720551}"/>
+          </ac:spMkLst>
+        </pc:spChg>
+        <pc:spChg chg="mod topLvl">
+          <ac:chgData name="Gilbert, Neil" userId="37be9f5c-8f28-415b-96d6-624acf93bb3f" providerId="ADAL" clId="{248E61FA-0205-4482-A397-D2D102E0CACF}" dt="2025-03-18T22:49:09.916" v="186" actId="2711"/>
+          <ac:spMkLst>
+            <pc:docMk/>
+            <pc:sldMk cId="2285614971" sldId="256"/>
+            <ac:spMk id="182" creationId="{56E40366-6E4B-10B3-C81D-52524A318F08}"/>
+          </ac:spMkLst>
+        </pc:spChg>
+        <pc:spChg chg="mod ord topLvl">
+          <ac:chgData name="Gilbert, Neil" userId="37be9f5c-8f28-415b-96d6-624acf93bb3f" providerId="ADAL" clId="{248E61FA-0205-4482-A397-D2D102E0CACF}" dt="2025-03-18T22:49:14.240" v="187" actId="2711"/>
+          <ac:spMkLst>
+            <pc:docMk/>
+            <pc:sldMk cId="2285614971" sldId="256"/>
+            <ac:spMk id="183" creationId="{3080F696-CFCB-CE92-F1A5-E20D98F98F4E}"/>
+          </ac:spMkLst>
+        </pc:spChg>
+        <pc:spChg chg="mod ord topLvl">
+          <ac:chgData name="Gilbert, Neil" userId="37be9f5c-8f28-415b-96d6-624acf93bb3f" providerId="ADAL" clId="{248E61FA-0205-4482-A397-D2D102E0CACF}" dt="2025-03-18T22:49:19.417" v="188" actId="2711"/>
+          <ac:spMkLst>
+            <pc:docMk/>
+            <pc:sldMk cId="2285614971" sldId="256"/>
+            <ac:spMk id="184" creationId="{DB740122-2878-08AB-2A0F-E2229BA9C12B}"/>
+          </ac:spMkLst>
+        </pc:spChg>
+        <pc:grpChg chg="del ord">
+          <ac:chgData name="Gilbert, Neil" userId="37be9f5c-8f28-415b-96d6-624acf93bb3f" providerId="ADAL" clId="{248E61FA-0205-4482-A397-D2D102E0CACF}" dt="2025-03-18T22:46:02.367" v="151" actId="478"/>
+          <ac:grpSpMkLst>
+            <pc:docMk/>
+            <pc:sldMk cId="2285614971" sldId="256"/>
+            <ac:grpSpMk id="180" creationId="{FFF2867D-5E2F-F39C-3EBC-71EEA28CE4B1}"/>
+          </ac:grpSpMkLst>
+        </pc:grpChg>
+        <pc:picChg chg="del">
+          <ac:chgData name="Gilbert, Neil" userId="37be9f5c-8f28-415b-96d6-624acf93bb3f" providerId="ADAL" clId="{248E61FA-0205-4482-A397-D2D102E0CACF}" dt="2025-03-18T21:14:26.982" v="90" actId="478"/>
+          <ac:picMkLst>
+            <pc:docMk/>
+            <pc:sldMk cId="2285614971" sldId="256"/>
+            <ac:picMk id="3" creationId="{19794FE7-34CF-25F6-A90A-927CA02B1264}"/>
+          </ac:picMkLst>
+        </pc:picChg>
+        <pc:picChg chg="del">
+          <ac:chgData name="Gilbert, Neil" userId="37be9f5c-8f28-415b-96d6-624acf93bb3f" providerId="ADAL" clId="{248E61FA-0205-4482-A397-D2D102E0CACF}" dt="2025-03-18T21:14:27.911" v="91" actId="478"/>
+          <ac:picMkLst>
+            <pc:docMk/>
+            <pc:sldMk cId="2285614971" sldId="256"/>
+            <ac:picMk id="7" creationId="{6FDCAFE5-3255-51BB-6BB8-A593F9B8C4EE}"/>
+          </ac:picMkLst>
+        </pc:picChg>
+        <pc:picChg chg="add mod ord">
+          <ac:chgData name="Gilbert, Neil" userId="37be9f5c-8f28-415b-96d6-624acf93bb3f" providerId="ADAL" clId="{248E61FA-0205-4482-A397-D2D102E0CACF}" dt="2025-03-18T21:15:49.713" v="142" actId="1036"/>
+          <ac:picMkLst>
+            <pc:docMk/>
+            <pc:sldMk cId="2285614971" sldId="256"/>
+            <ac:picMk id="10" creationId="{D434B950-D443-34EB-E314-D26F0D49C3DE}"/>
+          </ac:picMkLst>
+        </pc:picChg>
+        <pc:picChg chg="add mod ord">
+          <ac:chgData name="Gilbert, Neil" userId="37be9f5c-8f28-415b-96d6-624acf93bb3f" providerId="ADAL" clId="{248E61FA-0205-4482-A397-D2D102E0CACF}" dt="2025-03-18T21:15:58.611" v="143" actId="1076"/>
+          <ac:picMkLst>
+            <pc:docMk/>
+            <pc:sldMk cId="2285614971" sldId="256"/>
+            <ac:picMk id="12" creationId="{048574B7-59D0-DEC8-91A8-50F46B5A1855}"/>
+          </ac:picMkLst>
+        </pc:picChg>
+        <pc:cxnChg chg="mod ord">
+          <ac:chgData name="Gilbert, Neil" userId="37be9f5c-8f28-415b-96d6-624acf93bb3f" providerId="ADAL" clId="{248E61FA-0205-4482-A397-D2D102E0CACF}" dt="2025-03-18T21:09:34.304" v="86" actId="1035"/>
+          <ac:cxnSpMkLst>
+            <pc:docMk/>
+            <pc:sldMk cId="2285614971" sldId="256"/>
+            <ac:cxnSpMk id="162" creationId="{A2A61796-95EF-283F-0D93-D61A0E5AA1FD}"/>
+          </ac:cxnSpMkLst>
+        </pc:cxnChg>
+        <pc:cxnChg chg="ord">
+          <ac:chgData name="Gilbert, Neil" userId="37be9f5c-8f28-415b-96d6-624acf93bb3f" providerId="ADAL" clId="{248E61FA-0205-4482-A397-D2D102E0CACF}" dt="2025-03-18T21:07:09.841" v="33" actId="166"/>
+          <ac:cxnSpMkLst>
+            <pc:docMk/>
+            <pc:sldMk cId="2285614971" sldId="256"/>
+            <ac:cxnSpMk id="166" creationId="{D5BC7A8F-F63A-BF49-FCC3-257B1F1E716C}"/>
+          </ac:cxnSpMkLst>
+        </pc:cxnChg>
+        <pc:cxnChg chg="ord">
+          <ac:chgData name="Gilbert, Neil" userId="37be9f5c-8f28-415b-96d6-624acf93bb3f" providerId="ADAL" clId="{248E61FA-0205-4482-A397-D2D102E0CACF}" dt="2025-03-18T21:07:36.314" v="55" actId="166"/>
+          <ac:cxnSpMkLst>
+            <pc:docMk/>
+            <pc:sldMk cId="2285614971" sldId="256"/>
+            <ac:cxnSpMk id="181" creationId="{BA388B67-597A-2F9D-5F6F-A1531825A236}"/>
+          </ac:cxnSpMkLst>
+        </pc:cxnChg>
+        <pc:cxnChg chg="mod">
+          <ac:chgData name="Gilbert, Neil" userId="37be9f5c-8f28-415b-96d6-624acf93bb3f" providerId="ADAL" clId="{248E61FA-0205-4482-A397-D2D102E0CACF}" dt="2025-03-18T21:20:04.552" v="148" actId="692"/>
+          <ac:cxnSpMkLst>
+            <pc:docMk/>
+            <pc:sldMk cId="2285614971" sldId="256"/>
+            <ac:cxnSpMk id="187" creationId="{9B959068-493F-D57C-3343-9CAEE7E3DC6F}"/>
+          </ac:cxnSpMkLst>
+        </pc:cxnChg>
+        <pc:cxnChg chg="mod">
+          <ac:chgData name="Gilbert, Neil" userId="37be9f5c-8f28-415b-96d6-624acf93bb3f" providerId="ADAL" clId="{248E61FA-0205-4482-A397-D2D102E0CACF}" dt="2025-03-18T21:20:04.552" v="148" actId="692"/>
+          <ac:cxnSpMkLst>
+            <pc:docMk/>
+            <pc:sldMk cId="2285614971" sldId="256"/>
+            <ac:cxnSpMk id="188" creationId="{E1FE11D0-39CA-DE6A-AFDA-FEFE5506D797}"/>
+          </ac:cxnSpMkLst>
+        </pc:cxnChg>
+      </pc:sldChg>
+    </pc:docChg>
+  </pc:docChgLst>
+  <pc:docChgLst>
+    <pc:chgData name="Gilbert, Neil" userId="37be9f5c-8f28-415b-96d6-624acf93bb3f" providerId="ADAL" clId="{E9D35510-1D96-4344-AE70-138BC7D5CDA3}"/>
+    <pc:docChg chg="modSld">
+      <pc:chgData name="Gilbert, Neil" userId="37be9f5c-8f28-415b-96d6-624acf93bb3f" providerId="ADAL" clId="{E9D35510-1D96-4344-AE70-138BC7D5CDA3}" dt="2025-02-13T18:50:56.085" v="0" actId="164"/>
+      <pc:docMkLst>
+        <pc:docMk/>
+      </pc:docMkLst>
+      <pc:sldChg chg="addSp modSp">
+        <pc:chgData name="Gilbert, Neil" userId="37be9f5c-8f28-415b-96d6-624acf93bb3f" providerId="ADAL" clId="{E9D35510-1D96-4344-AE70-138BC7D5CDA3}" dt="2025-02-13T18:50:56.085" v="0" actId="164"/>
+        <pc:sldMkLst>
+          <pc:docMk/>
+          <pc:sldMk cId="2285614971" sldId="256"/>
+        </pc:sldMkLst>
+        <pc:spChg chg="mod">
+          <ac:chgData name="Gilbert, Neil" userId="37be9f5c-8f28-415b-96d6-624acf93bb3f" providerId="ADAL" clId="{E9D35510-1D96-4344-AE70-138BC7D5CDA3}" dt="2025-02-13T18:50:56.085" v="0" actId="164"/>
+          <ac:spMkLst>
+            <pc:docMk/>
+            <pc:sldMk cId="2285614971" sldId="256"/>
+            <ac:spMk id="146" creationId="{FB10D0CE-A40F-364A-FAB9-1CA8DE74656D}"/>
+          </ac:spMkLst>
+        </pc:spChg>
+        <pc:spChg chg="mod">
+          <ac:chgData name="Gilbert, Neil" userId="37be9f5c-8f28-415b-96d6-624acf93bb3f" providerId="ADAL" clId="{E9D35510-1D96-4344-AE70-138BC7D5CDA3}" dt="2025-02-13T18:50:56.085" v="0" actId="164"/>
+          <ac:spMkLst>
+            <pc:docMk/>
+            <pc:sldMk cId="2285614971" sldId="256"/>
+            <ac:spMk id="147" creationId="{442C39E8-F06C-A9AE-594A-B6FDAF28A25A}"/>
+          </ac:spMkLst>
+        </pc:spChg>
+        <pc:spChg chg="mod">
+          <ac:chgData name="Gilbert, Neil" userId="37be9f5c-8f28-415b-96d6-624acf93bb3f" providerId="ADAL" clId="{E9D35510-1D96-4344-AE70-138BC7D5CDA3}" dt="2025-02-13T18:50:56.085" v="0" actId="164"/>
+          <ac:spMkLst>
+            <pc:docMk/>
+            <pc:sldMk cId="2285614971" sldId="256"/>
+            <ac:spMk id="153" creationId="{3933E569-1727-EB25-B730-A8538487E3D6}"/>
+          </ac:spMkLst>
+        </pc:spChg>
+        <pc:spChg chg="mod">
+          <ac:chgData name="Gilbert, Neil" userId="37be9f5c-8f28-415b-96d6-624acf93bb3f" providerId="ADAL" clId="{E9D35510-1D96-4344-AE70-138BC7D5CDA3}" dt="2025-02-13T18:50:56.085" v="0" actId="164"/>
+          <ac:spMkLst>
+            <pc:docMk/>
+            <pc:sldMk cId="2285614971" sldId="256"/>
+            <ac:spMk id="154" creationId="{4321748A-3B29-9708-220C-DF93B8764EDC}"/>
+          </ac:spMkLst>
+        </pc:spChg>
+        <pc:spChg chg="mod">
+          <ac:chgData name="Gilbert, Neil" userId="37be9f5c-8f28-415b-96d6-624acf93bb3f" providerId="ADAL" clId="{E9D35510-1D96-4344-AE70-138BC7D5CDA3}" dt="2025-02-13T18:50:56.085" v="0" actId="164"/>
+          <ac:spMkLst>
+            <pc:docMk/>
+            <pc:sldMk cId="2285614971" sldId="256"/>
+            <ac:spMk id="157" creationId="{4376EE0B-ED62-B1FB-3E1C-90CF93D5A3AA}"/>
+          </ac:spMkLst>
+        </pc:spChg>
+        <pc:spChg chg="mod">
+          <ac:chgData name="Gilbert, Neil" userId="37be9f5c-8f28-415b-96d6-624acf93bb3f" providerId="ADAL" clId="{E9D35510-1D96-4344-AE70-138BC7D5CDA3}" dt="2025-02-13T18:50:56.085" v="0" actId="164"/>
+          <ac:spMkLst>
+            <pc:docMk/>
+            <pc:sldMk cId="2285614971" sldId="256"/>
+            <ac:spMk id="159" creationId="{1F4BEDF8-FA5A-1B5A-2C4E-69C73CE5B547}"/>
+          </ac:spMkLst>
+        </pc:spChg>
+        <pc:spChg chg="mod">
+          <ac:chgData name="Gilbert, Neil" userId="37be9f5c-8f28-415b-96d6-624acf93bb3f" providerId="ADAL" clId="{E9D35510-1D96-4344-AE70-138BC7D5CDA3}" dt="2025-02-13T18:50:56.085" v="0" actId="164"/>
+          <ac:spMkLst>
+            <pc:docMk/>
+            <pc:sldMk cId="2285614971" sldId="256"/>
+            <ac:spMk id="160" creationId="{0DB05E49-117D-538A-0C75-667BFFB2682A}"/>
+          </ac:spMkLst>
+        </pc:spChg>
+        <pc:spChg chg="mod">
+          <ac:chgData name="Gilbert, Neil" userId="37be9f5c-8f28-415b-96d6-624acf93bb3f" providerId="ADAL" clId="{E9D35510-1D96-4344-AE70-138BC7D5CDA3}" dt="2025-02-13T18:50:56.085" v="0" actId="164"/>
+          <ac:spMkLst>
+            <pc:docMk/>
+            <pc:sldMk cId="2285614971" sldId="256"/>
+            <ac:spMk id="161" creationId="{B1040277-1F46-26E9-C162-7A262F2FDB17}"/>
+          </ac:spMkLst>
+        </pc:spChg>
+        <pc:spChg chg="mod">
+          <ac:chgData name="Gilbert, Neil" userId="37be9f5c-8f28-415b-96d6-624acf93bb3f" providerId="ADAL" clId="{E9D35510-1D96-4344-AE70-138BC7D5CDA3}" dt="2025-02-13T18:50:56.085" v="0" actId="164"/>
+          <ac:spMkLst>
+            <pc:docMk/>
+            <pc:sldMk cId="2285614971" sldId="256"/>
+            <ac:spMk id="164" creationId="{2BADAB18-E642-C78F-5345-1762A49A3A65}"/>
+          </ac:spMkLst>
+        </pc:spChg>
+        <pc:spChg chg="mod">
+          <ac:chgData name="Gilbert, Neil" userId="37be9f5c-8f28-415b-96d6-624acf93bb3f" providerId="ADAL" clId="{E9D35510-1D96-4344-AE70-138BC7D5CDA3}" dt="2025-02-13T18:50:56.085" v="0" actId="164"/>
+          <ac:spMkLst>
+            <pc:docMk/>
+            <pc:sldMk cId="2285614971" sldId="256"/>
+            <ac:spMk id="165" creationId="{BAA7BA02-0507-4778-EE94-5F61D2EB490A}"/>
+          </ac:spMkLst>
+        </pc:spChg>
+      </pc:sldChg>
+    </pc:docChg>
+  </pc:docChgLst>
   <pc:docChgLst>
     <pc:chgData name="Gilbert, Neil" userId="37be9f5c-8f28-415b-96d6-624acf93bb3f" providerId="ADAL" clId="{BFDB9BAC-7AC1-4B77-8B85-CA2E7A00C51F}"/>
     <pc:docChg chg="undo custSel addSld delSld modSld">
@@ -138,414 +514,6 @@
           <pc:docMk/>
           <pc:sldMk cId="2285614971" sldId="256"/>
         </pc:sldMkLst>
-        <pc:spChg chg="mod topLvl">
-          <ac:chgData name="Gilbert, Neil" userId="37be9f5c-8f28-415b-96d6-624acf93bb3f" providerId="ADAL" clId="{BFDB9BAC-7AC1-4B77-8B85-CA2E7A00C51F}" dt="2024-11-20T20:49:56.130" v="841" actId="165"/>
-          <ac:spMkLst>
-            <pc:docMk/>
-            <pc:sldMk cId="2285614971" sldId="256"/>
-            <ac:spMk id="146" creationId="{FB10D0CE-A40F-364A-FAB9-1CA8DE74656D}"/>
-          </ac:spMkLst>
-        </pc:spChg>
-        <pc:spChg chg="mod topLvl">
-          <ac:chgData name="Gilbert, Neil" userId="37be9f5c-8f28-415b-96d6-624acf93bb3f" providerId="ADAL" clId="{BFDB9BAC-7AC1-4B77-8B85-CA2E7A00C51F}" dt="2024-11-20T20:49:56.130" v="841" actId="165"/>
-          <ac:spMkLst>
-            <pc:docMk/>
-            <pc:sldMk cId="2285614971" sldId="256"/>
-            <ac:spMk id="147" creationId="{442C39E8-F06C-A9AE-594A-B6FDAF28A25A}"/>
-          </ac:spMkLst>
-        </pc:spChg>
-        <pc:spChg chg="mod topLvl">
-          <ac:chgData name="Gilbert, Neil" userId="37be9f5c-8f28-415b-96d6-624acf93bb3f" providerId="ADAL" clId="{BFDB9BAC-7AC1-4B77-8B85-CA2E7A00C51F}" dt="2024-11-20T20:49:56.130" v="841" actId="165"/>
-          <ac:spMkLst>
-            <pc:docMk/>
-            <pc:sldMk cId="2285614971" sldId="256"/>
-            <ac:spMk id="151" creationId="{37340C50-EBCF-47B5-D113-F9237E3BAE9E}"/>
-          </ac:spMkLst>
-        </pc:spChg>
-        <pc:spChg chg="mod topLvl">
-          <ac:chgData name="Gilbert, Neil" userId="37be9f5c-8f28-415b-96d6-624acf93bb3f" providerId="ADAL" clId="{BFDB9BAC-7AC1-4B77-8B85-CA2E7A00C51F}" dt="2024-11-20T20:49:56.130" v="841" actId="165"/>
-          <ac:spMkLst>
-            <pc:docMk/>
-            <pc:sldMk cId="2285614971" sldId="256"/>
-            <ac:spMk id="152" creationId="{FFDBEE1C-F456-EE0A-79D1-FB58B5B98AB9}"/>
-          </ac:spMkLst>
-        </pc:spChg>
-        <pc:spChg chg="mod topLvl">
-          <ac:chgData name="Gilbert, Neil" userId="37be9f5c-8f28-415b-96d6-624acf93bb3f" providerId="ADAL" clId="{BFDB9BAC-7AC1-4B77-8B85-CA2E7A00C51F}" dt="2024-11-20T20:49:56.130" v="841" actId="165"/>
-          <ac:spMkLst>
-            <pc:docMk/>
-            <pc:sldMk cId="2285614971" sldId="256"/>
-            <ac:spMk id="153" creationId="{3933E569-1727-EB25-B730-A8538487E3D6}"/>
-          </ac:spMkLst>
-        </pc:spChg>
-        <pc:spChg chg="mod topLvl">
-          <ac:chgData name="Gilbert, Neil" userId="37be9f5c-8f28-415b-96d6-624acf93bb3f" providerId="ADAL" clId="{BFDB9BAC-7AC1-4B77-8B85-CA2E7A00C51F}" dt="2024-11-20T20:49:56.130" v="841" actId="165"/>
-          <ac:spMkLst>
-            <pc:docMk/>
-            <pc:sldMk cId="2285614971" sldId="256"/>
-            <ac:spMk id="154" creationId="{4321748A-3B29-9708-220C-DF93B8764EDC}"/>
-          </ac:spMkLst>
-        </pc:spChg>
-        <pc:spChg chg="mod topLvl">
-          <ac:chgData name="Gilbert, Neil" userId="37be9f5c-8f28-415b-96d6-624acf93bb3f" providerId="ADAL" clId="{BFDB9BAC-7AC1-4B77-8B85-CA2E7A00C51F}" dt="2024-11-20T20:49:56.130" v="841" actId="165"/>
-          <ac:spMkLst>
-            <pc:docMk/>
-            <pc:sldMk cId="2285614971" sldId="256"/>
-            <ac:spMk id="157" creationId="{4376EE0B-ED62-B1FB-3E1C-90CF93D5A3AA}"/>
-          </ac:spMkLst>
-        </pc:spChg>
-        <pc:spChg chg="mod topLvl">
-          <ac:chgData name="Gilbert, Neil" userId="37be9f5c-8f28-415b-96d6-624acf93bb3f" providerId="ADAL" clId="{BFDB9BAC-7AC1-4B77-8B85-CA2E7A00C51F}" dt="2024-11-20T20:49:56.130" v="841" actId="165"/>
-          <ac:spMkLst>
-            <pc:docMk/>
-            <pc:sldMk cId="2285614971" sldId="256"/>
-            <ac:spMk id="159" creationId="{1F4BEDF8-FA5A-1B5A-2C4E-69C73CE5B547}"/>
-          </ac:spMkLst>
-        </pc:spChg>
-        <pc:spChg chg="mod topLvl">
-          <ac:chgData name="Gilbert, Neil" userId="37be9f5c-8f28-415b-96d6-624acf93bb3f" providerId="ADAL" clId="{BFDB9BAC-7AC1-4B77-8B85-CA2E7A00C51F}" dt="2024-11-20T20:49:56.130" v="841" actId="165"/>
-          <ac:spMkLst>
-            <pc:docMk/>
-            <pc:sldMk cId="2285614971" sldId="256"/>
-            <ac:spMk id="160" creationId="{0DB05E49-117D-538A-0C75-667BFFB2682A}"/>
-          </ac:spMkLst>
-        </pc:spChg>
-        <pc:spChg chg="mod topLvl">
-          <ac:chgData name="Gilbert, Neil" userId="37be9f5c-8f28-415b-96d6-624acf93bb3f" providerId="ADAL" clId="{BFDB9BAC-7AC1-4B77-8B85-CA2E7A00C51F}" dt="2024-11-20T20:49:56.130" v="841" actId="165"/>
-          <ac:spMkLst>
-            <pc:docMk/>
-            <pc:sldMk cId="2285614971" sldId="256"/>
-            <ac:spMk id="161" creationId="{B1040277-1F46-26E9-C162-7A262F2FDB17}"/>
-          </ac:spMkLst>
-        </pc:spChg>
-        <pc:spChg chg="mod topLvl">
-          <ac:chgData name="Gilbert, Neil" userId="37be9f5c-8f28-415b-96d6-624acf93bb3f" providerId="ADAL" clId="{BFDB9BAC-7AC1-4B77-8B85-CA2E7A00C51F}" dt="2024-11-20T20:49:56.130" v="841" actId="165"/>
-          <ac:spMkLst>
-            <pc:docMk/>
-            <pc:sldMk cId="2285614971" sldId="256"/>
-            <ac:spMk id="164" creationId="{2BADAB18-E642-C78F-5345-1762A49A3A65}"/>
-          </ac:spMkLst>
-        </pc:spChg>
-        <pc:spChg chg="mod topLvl">
-          <ac:chgData name="Gilbert, Neil" userId="37be9f5c-8f28-415b-96d6-624acf93bb3f" providerId="ADAL" clId="{BFDB9BAC-7AC1-4B77-8B85-CA2E7A00C51F}" dt="2024-11-20T20:49:56.130" v="841" actId="165"/>
-          <ac:spMkLst>
-            <pc:docMk/>
-            <pc:sldMk cId="2285614971" sldId="256"/>
-            <ac:spMk id="165" creationId="{BAA7BA02-0507-4778-EE94-5F61D2EB490A}"/>
-          </ac:spMkLst>
-        </pc:spChg>
-        <pc:spChg chg="mod topLvl">
-          <ac:chgData name="Gilbert, Neil" userId="37be9f5c-8f28-415b-96d6-624acf93bb3f" providerId="ADAL" clId="{BFDB9BAC-7AC1-4B77-8B85-CA2E7A00C51F}" dt="2024-11-20T20:49:56.130" v="841" actId="165"/>
-          <ac:spMkLst>
-            <pc:docMk/>
-            <pc:sldMk cId="2285614971" sldId="256"/>
-            <ac:spMk id="167" creationId="{9B09FEE0-B817-5238-BFAF-25952BA0B238}"/>
-          </ac:spMkLst>
-        </pc:spChg>
-        <pc:spChg chg="mod topLvl">
-          <ac:chgData name="Gilbert, Neil" userId="37be9f5c-8f28-415b-96d6-624acf93bb3f" providerId="ADAL" clId="{BFDB9BAC-7AC1-4B77-8B85-CA2E7A00C51F}" dt="2024-11-20T20:49:56.130" v="841" actId="165"/>
-          <ac:spMkLst>
-            <pc:docMk/>
-            <pc:sldMk cId="2285614971" sldId="256"/>
-            <ac:spMk id="168" creationId="{B6295314-0558-088E-B76E-26225A04402F}"/>
-          </ac:spMkLst>
-        </pc:spChg>
-        <pc:spChg chg="mod topLvl">
-          <ac:chgData name="Gilbert, Neil" userId="37be9f5c-8f28-415b-96d6-624acf93bb3f" providerId="ADAL" clId="{BFDB9BAC-7AC1-4B77-8B85-CA2E7A00C51F}" dt="2024-11-20T20:49:56.130" v="841" actId="165"/>
-          <ac:spMkLst>
-            <pc:docMk/>
-            <pc:sldMk cId="2285614971" sldId="256"/>
-            <ac:spMk id="171" creationId="{26FB3674-FE46-4300-7C19-CDDA729F0230}"/>
-          </ac:spMkLst>
-        </pc:spChg>
-        <pc:spChg chg="mod topLvl">
-          <ac:chgData name="Gilbert, Neil" userId="37be9f5c-8f28-415b-96d6-624acf93bb3f" providerId="ADAL" clId="{BFDB9BAC-7AC1-4B77-8B85-CA2E7A00C51F}" dt="2024-11-20T20:49:56.130" v="841" actId="165"/>
-          <ac:spMkLst>
-            <pc:docMk/>
-            <pc:sldMk cId="2285614971" sldId="256"/>
-            <ac:spMk id="175" creationId="{0F944584-22C4-18EF-5F1C-D75A84720551}"/>
-          </ac:spMkLst>
-        </pc:spChg>
-        <pc:spChg chg="mod topLvl">
-          <ac:chgData name="Gilbert, Neil" userId="37be9f5c-8f28-415b-96d6-624acf93bb3f" providerId="ADAL" clId="{BFDB9BAC-7AC1-4B77-8B85-CA2E7A00C51F}" dt="2024-11-20T20:49:56.130" v="841" actId="165"/>
-          <ac:spMkLst>
-            <pc:docMk/>
-            <pc:sldMk cId="2285614971" sldId="256"/>
-            <ac:spMk id="176" creationId="{D4FE6136-1522-8560-4BBC-2F06F9BDC6D7}"/>
-          </ac:spMkLst>
-        </pc:spChg>
-        <pc:spChg chg="mod topLvl">
-          <ac:chgData name="Gilbert, Neil" userId="37be9f5c-8f28-415b-96d6-624acf93bb3f" providerId="ADAL" clId="{BFDB9BAC-7AC1-4B77-8B85-CA2E7A00C51F}" dt="2024-11-20T20:49:56.130" v="841" actId="165"/>
-          <ac:spMkLst>
-            <pc:docMk/>
-            <pc:sldMk cId="2285614971" sldId="256"/>
-            <ac:spMk id="182" creationId="{56E40366-6E4B-10B3-C81D-52524A318F08}"/>
-          </ac:spMkLst>
-        </pc:spChg>
-        <pc:spChg chg="mod ord topLvl">
-          <ac:chgData name="Gilbert, Neil" userId="37be9f5c-8f28-415b-96d6-624acf93bb3f" providerId="ADAL" clId="{BFDB9BAC-7AC1-4B77-8B85-CA2E7A00C51F}" dt="2024-11-20T20:53:34.646" v="933" actId="166"/>
-          <ac:spMkLst>
-            <pc:docMk/>
-            <pc:sldMk cId="2285614971" sldId="256"/>
-            <ac:spMk id="183" creationId="{3080F696-CFCB-CE92-F1A5-E20D98F98F4E}"/>
-          </ac:spMkLst>
-        </pc:spChg>
-        <pc:spChg chg="mod ord topLvl">
-          <ac:chgData name="Gilbert, Neil" userId="37be9f5c-8f28-415b-96d6-624acf93bb3f" providerId="ADAL" clId="{BFDB9BAC-7AC1-4B77-8B85-CA2E7A00C51F}" dt="2024-11-20T20:53:38.933" v="934" actId="166"/>
-          <ac:spMkLst>
-            <pc:docMk/>
-            <pc:sldMk cId="2285614971" sldId="256"/>
-            <ac:spMk id="184" creationId="{DB740122-2878-08AB-2A0F-E2229BA9C12B}"/>
-          </ac:spMkLst>
-        </pc:spChg>
-        <pc:grpChg chg="mod topLvl">
-          <ac:chgData name="Gilbert, Neil" userId="37be9f5c-8f28-415b-96d6-624acf93bb3f" providerId="ADAL" clId="{BFDB9BAC-7AC1-4B77-8B85-CA2E7A00C51F}" dt="2024-11-20T20:49:56.130" v="841" actId="165"/>
-          <ac:grpSpMkLst>
-            <pc:docMk/>
-            <pc:sldMk cId="2285614971" sldId="256"/>
-            <ac:grpSpMk id="144" creationId="{A866FFF5-B59B-A8F0-361C-C0F06C9E22D3}"/>
-          </ac:grpSpMkLst>
-        </pc:grpChg>
-        <pc:grpChg chg="mod topLvl">
-          <ac:chgData name="Gilbert, Neil" userId="37be9f5c-8f28-415b-96d6-624acf93bb3f" providerId="ADAL" clId="{BFDB9BAC-7AC1-4B77-8B85-CA2E7A00C51F}" dt="2024-11-20T20:49:56.130" v="841" actId="165"/>
-          <ac:grpSpMkLst>
-            <pc:docMk/>
-            <pc:sldMk cId="2285614971" sldId="256"/>
-            <ac:grpSpMk id="145" creationId="{A24C37EC-CCCF-FFEE-4CEE-49DCD373A6E7}"/>
-          </ac:grpSpMkLst>
-        </pc:grpChg>
-        <pc:grpChg chg="mod topLvl">
-          <ac:chgData name="Gilbert, Neil" userId="37be9f5c-8f28-415b-96d6-624acf93bb3f" providerId="ADAL" clId="{BFDB9BAC-7AC1-4B77-8B85-CA2E7A00C51F}" dt="2024-11-20T20:49:56.130" v="841" actId="165"/>
-          <ac:grpSpMkLst>
-            <pc:docMk/>
-            <pc:sldMk cId="2285614971" sldId="256"/>
-            <ac:grpSpMk id="149" creationId="{189C055D-1A02-B252-66AF-3F915A0C839A}"/>
-          </ac:grpSpMkLst>
-        </pc:grpChg>
-        <pc:grpChg chg="mod topLvl">
-          <ac:chgData name="Gilbert, Neil" userId="37be9f5c-8f28-415b-96d6-624acf93bb3f" providerId="ADAL" clId="{BFDB9BAC-7AC1-4B77-8B85-CA2E7A00C51F}" dt="2024-11-20T20:49:56.130" v="841" actId="165"/>
-          <ac:grpSpMkLst>
-            <pc:docMk/>
-            <pc:sldMk cId="2285614971" sldId="256"/>
-            <ac:grpSpMk id="150" creationId="{91FB7F19-7D82-89AC-4AD8-EE3374D435A3}"/>
-          </ac:grpSpMkLst>
-        </pc:grpChg>
-        <pc:grpChg chg="mod ord topLvl">
-          <ac:chgData name="Gilbert, Neil" userId="37be9f5c-8f28-415b-96d6-624acf93bb3f" providerId="ADAL" clId="{BFDB9BAC-7AC1-4B77-8B85-CA2E7A00C51F}" dt="2024-11-20T20:53:10.200" v="920" actId="1037"/>
-          <ac:grpSpMkLst>
-            <pc:docMk/>
-            <pc:sldMk cId="2285614971" sldId="256"/>
-            <ac:grpSpMk id="180" creationId="{FFF2867D-5E2F-F39C-3EBC-71EEA28CE4B1}"/>
-          </ac:grpSpMkLst>
-        </pc:grpChg>
-        <pc:picChg chg="add mod ord">
-          <ac:chgData name="Gilbert, Neil" userId="37be9f5c-8f28-415b-96d6-624acf93bb3f" providerId="ADAL" clId="{BFDB9BAC-7AC1-4B77-8B85-CA2E7A00C51F}" dt="2024-11-20T20:50:15.628" v="856" actId="1038"/>
-          <ac:picMkLst>
-            <pc:docMk/>
-            <pc:sldMk cId="2285614971" sldId="256"/>
-            <ac:picMk id="3" creationId="{19794FE7-34CF-25F6-A90A-927CA02B1264}"/>
-          </ac:picMkLst>
-        </pc:picChg>
-        <pc:picChg chg="add mod">
-          <ac:chgData name="Gilbert, Neil" userId="37be9f5c-8f28-415b-96d6-624acf93bb3f" providerId="ADAL" clId="{BFDB9BAC-7AC1-4B77-8B85-CA2E7A00C51F}" dt="2024-11-20T20:52:48.654" v="896" actId="1076"/>
-          <ac:picMkLst>
-            <pc:docMk/>
-            <pc:sldMk cId="2285614971" sldId="256"/>
-            <ac:picMk id="7" creationId="{6FDCAFE5-3255-51BB-6BB8-A593F9B8C4EE}"/>
-          </ac:picMkLst>
-        </pc:picChg>
-        <pc:picChg chg="add mod modCrop">
-          <ac:chgData name="Gilbert, Neil" userId="37be9f5c-8f28-415b-96d6-624acf93bb3f" providerId="ADAL" clId="{BFDB9BAC-7AC1-4B77-8B85-CA2E7A00C51F}" dt="2024-11-06T18:39:05.051" v="753" actId="1076"/>
-          <ac:picMkLst>
-            <pc:docMk/>
-            <pc:sldMk cId="2285614971" sldId="256"/>
-            <ac:picMk id="200" creationId="{3BF6928C-B966-F3C2-4EE2-FA0F4110785F}"/>
-          </ac:picMkLst>
-        </pc:picChg>
-        <pc:cxnChg chg="mod topLvl">
-          <ac:chgData name="Gilbert, Neil" userId="37be9f5c-8f28-415b-96d6-624acf93bb3f" providerId="ADAL" clId="{BFDB9BAC-7AC1-4B77-8B85-CA2E7A00C51F}" dt="2024-11-20T20:49:56.130" v="841" actId="165"/>
-          <ac:cxnSpMkLst>
-            <pc:docMk/>
-            <pc:sldMk cId="2285614971" sldId="256"/>
-            <ac:cxnSpMk id="143" creationId="{C0DE42C2-B945-689C-0D29-3C9643E03BE5}"/>
-          </ac:cxnSpMkLst>
-        </pc:cxnChg>
-        <pc:cxnChg chg="mod topLvl">
-          <ac:chgData name="Gilbert, Neil" userId="37be9f5c-8f28-415b-96d6-624acf93bb3f" providerId="ADAL" clId="{BFDB9BAC-7AC1-4B77-8B85-CA2E7A00C51F}" dt="2024-11-20T20:49:56.130" v="841" actId="165"/>
-          <ac:cxnSpMkLst>
-            <pc:docMk/>
-            <pc:sldMk cId="2285614971" sldId="256"/>
-            <ac:cxnSpMk id="148" creationId="{44D2551E-188B-C0B7-EB79-92B8D01A2155}"/>
-          </ac:cxnSpMkLst>
-        </pc:cxnChg>
-        <pc:cxnChg chg="mod topLvl">
-          <ac:chgData name="Gilbert, Neil" userId="37be9f5c-8f28-415b-96d6-624acf93bb3f" providerId="ADAL" clId="{BFDB9BAC-7AC1-4B77-8B85-CA2E7A00C51F}" dt="2024-11-20T20:49:56.130" v="841" actId="165"/>
-          <ac:cxnSpMkLst>
-            <pc:docMk/>
-            <pc:sldMk cId="2285614971" sldId="256"/>
-            <ac:cxnSpMk id="158" creationId="{2ABE7146-F454-83F0-95C2-0B2F3BBCE5FA}"/>
-          </ac:cxnSpMkLst>
-        </pc:cxnChg>
-        <pc:cxnChg chg="mod topLvl">
-          <ac:chgData name="Gilbert, Neil" userId="37be9f5c-8f28-415b-96d6-624acf93bb3f" providerId="ADAL" clId="{BFDB9BAC-7AC1-4B77-8B85-CA2E7A00C51F}" dt="2024-11-20T20:49:56.130" v="841" actId="165"/>
-          <ac:cxnSpMkLst>
-            <pc:docMk/>
-            <pc:sldMk cId="2285614971" sldId="256"/>
-            <ac:cxnSpMk id="162" creationId="{A2A61796-95EF-283F-0D93-D61A0E5AA1FD}"/>
-          </ac:cxnSpMkLst>
-        </pc:cxnChg>
-        <pc:cxnChg chg="mod topLvl">
-          <ac:chgData name="Gilbert, Neil" userId="37be9f5c-8f28-415b-96d6-624acf93bb3f" providerId="ADAL" clId="{BFDB9BAC-7AC1-4B77-8B85-CA2E7A00C51F}" dt="2024-11-20T20:49:56.130" v="841" actId="165"/>
-          <ac:cxnSpMkLst>
-            <pc:docMk/>
-            <pc:sldMk cId="2285614971" sldId="256"/>
-            <ac:cxnSpMk id="163" creationId="{0AADFC74-E94A-C78C-27E0-0D404FF69DAE}"/>
-          </ac:cxnSpMkLst>
-        </pc:cxnChg>
-        <pc:cxnChg chg="mod topLvl">
-          <ac:chgData name="Gilbert, Neil" userId="37be9f5c-8f28-415b-96d6-624acf93bb3f" providerId="ADAL" clId="{BFDB9BAC-7AC1-4B77-8B85-CA2E7A00C51F}" dt="2024-11-20T20:49:56.130" v="841" actId="165"/>
-          <ac:cxnSpMkLst>
-            <pc:docMk/>
-            <pc:sldMk cId="2285614971" sldId="256"/>
-            <ac:cxnSpMk id="166" creationId="{D5BC7A8F-F63A-BF49-FCC3-257B1F1E716C}"/>
-          </ac:cxnSpMkLst>
-        </pc:cxnChg>
-        <pc:cxnChg chg="mod topLvl">
-          <ac:chgData name="Gilbert, Neil" userId="37be9f5c-8f28-415b-96d6-624acf93bb3f" providerId="ADAL" clId="{BFDB9BAC-7AC1-4B77-8B85-CA2E7A00C51F}" dt="2024-11-20T20:49:56.130" v="841" actId="165"/>
-          <ac:cxnSpMkLst>
-            <pc:docMk/>
-            <pc:sldMk cId="2285614971" sldId="256"/>
-            <ac:cxnSpMk id="169" creationId="{F79F486B-2696-818E-5379-BBCFF3A42B89}"/>
-          </ac:cxnSpMkLst>
-        </pc:cxnChg>
-        <pc:cxnChg chg="mod topLvl">
-          <ac:chgData name="Gilbert, Neil" userId="37be9f5c-8f28-415b-96d6-624acf93bb3f" providerId="ADAL" clId="{BFDB9BAC-7AC1-4B77-8B85-CA2E7A00C51F}" dt="2024-11-20T20:49:56.130" v="841" actId="165"/>
-          <ac:cxnSpMkLst>
-            <pc:docMk/>
-            <pc:sldMk cId="2285614971" sldId="256"/>
-            <ac:cxnSpMk id="170" creationId="{2F05BB78-52F8-70D2-A37D-19C96C1A10D6}"/>
-          </ac:cxnSpMkLst>
-        </pc:cxnChg>
-        <pc:cxnChg chg="mod topLvl">
-          <ac:chgData name="Gilbert, Neil" userId="37be9f5c-8f28-415b-96d6-624acf93bb3f" providerId="ADAL" clId="{BFDB9BAC-7AC1-4B77-8B85-CA2E7A00C51F}" dt="2024-11-20T20:49:56.130" v="841" actId="165"/>
-          <ac:cxnSpMkLst>
-            <pc:docMk/>
-            <pc:sldMk cId="2285614971" sldId="256"/>
-            <ac:cxnSpMk id="172" creationId="{6605E2DB-6664-5D03-F29D-7C94BB87516A}"/>
-          </ac:cxnSpMkLst>
-        </pc:cxnChg>
-        <pc:cxnChg chg="mod topLvl">
-          <ac:chgData name="Gilbert, Neil" userId="37be9f5c-8f28-415b-96d6-624acf93bb3f" providerId="ADAL" clId="{BFDB9BAC-7AC1-4B77-8B85-CA2E7A00C51F}" dt="2024-11-20T20:49:56.130" v="841" actId="165"/>
-          <ac:cxnSpMkLst>
-            <pc:docMk/>
-            <pc:sldMk cId="2285614971" sldId="256"/>
-            <ac:cxnSpMk id="173" creationId="{ABEFF8FA-058A-3CEC-F656-2A6DA3EE0092}"/>
-          </ac:cxnSpMkLst>
-        </pc:cxnChg>
-        <pc:cxnChg chg="mod topLvl">
-          <ac:chgData name="Gilbert, Neil" userId="37be9f5c-8f28-415b-96d6-624acf93bb3f" providerId="ADAL" clId="{BFDB9BAC-7AC1-4B77-8B85-CA2E7A00C51F}" dt="2024-11-20T20:49:56.130" v="841" actId="165"/>
-          <ac:cxnSpMkLst>
-            <pc:docMk/>
-            <pc:sldMk cId="2285614971" sldId="256"/>
-            <ac:cxnSpMk id="174" creationId="{8D5404AA-3D8E-AB62-C939-287851126F46}"/>
-          </ac:cxnSpMkLst>
-        </pc:cxnChg>
-        <pc:cxnChg chg="mod ord topLvl">
-          <ac:chgData name="Gilbert, Neil" userId="37be9f5c-8f28-415b-96d6-624acf93bb3f" providerId="ADAL" clId="{BFDB9BAC-7AC1-4B77-8B85-CA2E7A00C51F}" dt="2024-11-20T20:49:56.130" v="841" actId="165"/>
-          <ac:cxnSpMkLst>
-            <pc:docMk/>
-            <pc:sldMk cId="2285614971" sldId="256"/>
-            <ac:cxnSpMk id="177" creationId="{3D727A4C-679C-A522-31D2-068E1F8B2CB6}"/>
-          </ac:cxnSpMkLst>
-        </pc:cxnChg>
-        <pc:cxnChg chg="mod topLvl">
-          <ac:chgData name="Gilbert, Neil" userId="37be9f5c-8f28-415b-96d6-624acf93bb3f" providerId="ADAL" clId="{BFDB9BAC-7AC1-4B77-8B85-CA2E7A00C51F}" dt="2024-11-20T20:49:56.130" v="841" actId="165"/>
-          <ac:cxnSpMkLst>
-            <pc:docMk/>
-            <pc:sldMk cId="2285614971" sldId="256"/>
-            <ac:cxnSpMk id="181" creationId="{BA388B67-597A-2F9D-5F6F-A1531825A236}"/>
-          </ac:cxnSpMkLst>
-        </pc:cxnChg>
-        <pc:cxnChg chg="mod">
-          <ac:chgData name="Gilbert, Neil" userId="37be9f5c-8f28-415b-96d6-624acf93bb3f" providerId="ADAL" clId="{BFDB9BAC-7AC1-4B77-8B85-CA2E7A00C51F}" dt="2024-11-20T20:49:56.130" v="841" actId="165"/>
-          <ac:cxnSpMkLst>
-            <pc:docMk/>
-            <pc:sldMk cId="2285614971" sldId="256"/>
-            <ac:cxnSpMk id="187" creationId="{9B959068-493F-D57C-3343-9CAEE7E3DC6F}"/>
-          </ac:cxnSpMkLst>
-        </pc:cxnChg>
-        <pc:cxnChg chg="mod ord">
-          <ac:chgData name="Gilbert, Neil" userId="37be9f5c-8f28-415b-96d6-624acf93bb3f" providerId="ADAL" clId="{BFDB9BAC-7AC1-4B77-8B85-CA2E7A00C51F}" dt="2024-11-20T20:53:14.346" v="931" actId="1037"/>
-          <ac:cxnSpMkLst>
-            <pc:docMk/>
-            <pc:sldMk cId="2285614971" sldId="256"/>
-            <ac:cxnSpMk id="188" creationId="{E1FE11D0-39CA-DE6A-AFDA-FEFE5506D797}"/>
-          </ac:cxnSpMkLst>
-        </pc:cxnChg>
-        <pc:cxnChg chg="mod">
-          <ac:chgData name="Gilbert, Neil" userId="37be9f5c-8f28-415b-96d6-624acf93bb3f" providerId="ADAL" clId="{BFDB9BAC-7AC1-4B77-8B85-CA2E7A00C51F}" dt="2024-11-20T20:49:56.130" v="841" actId="165"/>
-          <ac:cxnSpMkLst>
-            <pc:docMk/>
-            <pc:sldMk cId="2285614971" sldId="256"/>
-            <ac:cxnSpMk id="189" creationId="{8F6BD69C-AC1D-5320-7DFE-F9FE30253B0C}"/>
-          </ac:cxnSpMkLst>
-        </pc:cxnChg>
-        <pc:cxnChg chg="mod">
-          <ac:chgData name="Gilbert, Neil" userId="37be9f5c-8f28-415b-96d6-624acf93bb3f" providerId="ADAL" clId="{BFDB9BAC-7AC1-4B77-8B85-CA2E7A00C51F}" dt="2024-11-20T20:49:56.130" v="841" actId="165"/>
-          <ac:cxnSpMkLst>
-            <pc:docMk/>
-            <pc:sldMk cId="2285614971" sldId="256"/>
-            <ac:cxnSpMk id="190" creationId="{8689201C-C159-74AA-F738-7538A64F9038}"/>
-          </ac:cxnSpMkLst>
-        </pc:cxnChg>
-        <pc:cxnChg chg="mod">
-          <ac:chgData name="Gilbert, Neil" userId="37be9f5c-8f28-415b-96d6-624acf93bb3f" providerId="ADAL" clId="{BFDB9BAC-7AC1-4B77-8B85-CA2E7A00C51F}" dt="2024-11-20T20:49:56.130" v="841" actId="165"/>
-          <ac:cxnSpMkLst>
-            <pc:docMk/>
-            <pc:sldMk cId="2285614971" sldId="256"/>
-            <ac:cxnSpMk id="191" creationId="{83F12579-99B9-2056-A946-F99CDA55613B}"/>
-          </ac:cxnSpMkLst>
-        </pc:cxnChg>
-        <pc:cxnChg chg="mod">
-          <ac:chgData name="Gilbert, Neil" userId="37be9f5c-8f28-415b-96d6-624acf93bb3f" providerId="ADAL" clId="{BFDB9BAC-7AC1-4B77-8B85-CA2E7A00C51F}" dt="2024-11-20T20:49:56.130" v="841" actId="165"/>
-          <ac:cxnSpMkLst>
-            <pc:docMk/>
-            <pc:sldMk cId="2285614971" sldId="256"/>
-            <ac:cxnSpMk id="192" creationId="{9C709318-886B-4317-0EBB-0599F5980B18}"/>
-          </ac:cxnSpMkLst>
-        </pc:cxnChg>
-        <pc:cxnChg chg="mod">
-          <ac:chgData name="Gilbert, Neil" userId="37be9f5c-8f28-415b-96d6-624acf93bb3f" providerId="ADAL" clId="{BFDB9BAC-7AC1-4B77-8B85-CA2E7A00C51F}" dt="2024-11-20T20:49:56.130" v="841" actId="165"/>
-          <ac:cxnSpMkLst>
-            <pc:docMk/>
-            <pc:sldMk cId="2285614971" sldId="256"/>
-            <ac:cxnSpMk id="193" creationId="{CDBCE974-006D-C86E-5185-3CB52BB96A35}"/>
-          </ac:cxnSpMkLst>
-        </pc:cxnChg>
-        <pc:cxnChg chg="mod">
-          <ac:chgData name="Gilbert, Neil" userId="37be9f5c-8f28-415b-96d6-624acf93bb3f" providerId="ADAL" clId="{BFDB9BAC-7AC1-4B77-8B85-CA2E7A00C51F}" dt="2024-11-20T20:49:56.130" v="841" actId="165"/>
-          <ac:cxnSpMkLst>
-            <pc:docMk/>
-            <pc:sldMk cId="2285614971" sldId="256"/>
-            <ac:cxnSpMk id="194" creationId="{756B5BD6-59D9-0E74-B13B-89F6CAD670FC}"/>
-          </ac:cxnSpMkLst>
-        </pc:cxnChg>
-        <pc:cxnChg chg="mod">
-          <ac:chgData name="Gilbert, Neil" userId="37be9f5c-8f28-415b-96d6-624acf93bb3f" providerId="ADAL" clId="{BFDB9BAC-7AC1-4B77-8B85-CA2E7A00C51F}" dt="2024-11-20T20:49:56.130" v="841" actId="165"/>
-          <ac:cxnSpMkLst>
-            <pc:docMk/>
-            <pc:sldMk cId="2285614971" sldId="256"/>
-            <ac:cxnSpMk id="195" creationId="{C13F27C8-41EF-5E99-CF70-49C62025876D}"/>
-          </ac:cxnSpMkLst>
-        </pc:cxnChg>
-        <pc:cxnChg chg="mod">
-          <ac:chgData name="Gilbert, Neil" userId="37be9f5c-8f28-415b-96d6-624acf93bb3f" providerId="ADAL" clId="{BFDB9BAC-7AC1-4B77-8B85-CA2E7A00C51F}" dt="2024-11-20T20:49:56.130" v="841" actId="165"/>
-          <ac:cxnSpMkLst>
-            <pc:docMk/>
-            <pc:sldMk cId="2285614971" sldId="256"/>
-            <ac:cxnSpMk id="196" creationId="{2064A4CC-5BD3-66BC-7E3C-E299C0B5FB12}"/>
-          </ac:cxnSpMkLst>
-        </pc:cxnChg>
       </pc:sldChg>
       <pc:sldChg chg="addSp modSp new del">
         <pc:chgData name="Gilbert, Neil" userId="37be9f5c-8f28-415b-96d6-624acf93bb3f" providerId="ADAL" clId="{BFDB9BAC-7AC1-4B77-8B85-CA2E7A00C51F}" dt="2024-11-06T18:03:19.975" v="446" actId="680"/>
@@ -576,38 +544,6 @@
           <pc:docMk/>
           <pc:sldMk cId="2285614971" sldId="256"/>
         </pc:sldMkLst>
-        <pc:spChg chg="mod">
-          <ac:chgData name="Gilbert, Neil" userId="37be9f5c-8f28-415b-96d6-624acf93bb3f" providerId="ADAL" clId="{524DC664-82EB-4B6F-B59A-EE28FC4DDA0B}" dt="2024-12-09T18:03:13.921" v="5" actId="207"/>
-          <ac:spMkLst>
-            <pc:docMk/>
-            <pc:sldMk cId="2285614971" sldId="256"/>
-            <ac:spMk id="160" creationId="{0DB05E49-117D-538A-0C75-667BFFB2682A}"/>
-          </ac:spMkLst>
-        </pc:spChg>
-        <pc:spChg chg="mod">
-          <ac:chgData name="Gilbert, Neil" userId="37be9f5c-8f28-415b-96d6-624acf93bb3f" providerId="ADAL" clId="{524DC664-82EB-4B6F-B59A-EE28FC4DDA0B}" dt="2024-12-09T18:02:45.425" v="0" actId="20577"/>
-          <ac:spMkLst>
-            <pc:docMk/>
-            <pc:sldMk cId="2285614971" sldId="256"/>
-            <ac:spMk id="182" creationId="{56E40366-6E4B-10B3-C81D-52524A318F08}"/>
-          </ac:spMkLst>
-        </pc:spChg>
-        <pc:spChg chg="mod">
-          <ac:chgData name="Gilbert, Neil" userId="37be9f5c-8f28-415b-96d6-624acf93bb3f" providerId="ADAL" clId="{524DC664-82EB-4B6F-B59A-EE28FC4DDA0B}" dt="2024-12-09T18:02:48.388" v="2" actId="20577"/>
-          <ac:spMkLst>
-            <pc:docMk/>
-            <pc:sldMk cId="2285614971" sldId="256"/>
-            <ac:spMk id="183" creationId="{3080F696-CFCB-CE92-F1A5-E20D98F98F4E}"/>
-          </ac:spMkLst>
-        </pc:spChg>
-        <pc:spChg chg="mod">
-          <ac:chgData name="Gilbert, Neil" userId="37be9f5c-8f28-415b-96d6-624acf93bb3f" providerId="ADAL" clId="{524DC664-82EB-4B6F-B59A-EE28FC4DDA0B}" dt="2024-12-09T18:02:50.824" v="4" actId="20577"/>
-          <ac:spMkLst>
-            <pc:docMk/>
-            <pc:sldMk cId="2285614971" sldId="256"/>
-            <ac:spMk id="184" creationId="{DB740122-2878-08AB-2A0F-E2229BA9C12B}"/>
-          </ac:spMkLst>
-        </pc:spChg>
       </pc:sldChg>
     </pc:docChg>
   </pc:docChgLst>
@@ -745,7 +681,7 @@
           <a:p>
             <a:fld id="{BBBF4EB7-BB73-4F04-B77C-5ADB8CA8E26C}" type="datetimeFigureOut">
               <a:rPr lang="en-US" smtClean="0"/>
-              <a:t>12/9/2024</a:t>
+              <a:t>3/18/2025</a:t>
             </a:fld>
             <a:endParaRPr lang="en-US"/>
           </a:p>
@@ -915,7 +851,7 @@
           <a:p>
             <a:fld id="{BBBF4EB7-BB73-4F04-B77C-5ADB8CA8E26C}" type="datetimeFigureOut">
               <a:rPr lang="en-US" smtClean="0"/>
-              <a:t>12/9/2024</a:t>
+              <a:t>3/18/2025</a:t>
             </a:fld>
             <a:endParaRPr lang="en-US"/>
           </a:p>
@@ -1095,7 +1031,7 @@
           <a:p>
             <a:fld id="{BBBF4EB7-BB73-4F04-B77C-5ADB8CA8E26C}" type="datetimeFigureOut">
               <a:rPr lang="en-US" smtClean="0"/>
-              <a:t>12/9/2024</a:t>
+              <a:t>3/18/2025</a:t>
             </a:fld>
             <a:endParaRPr lang="en-US"/>
           </a:p>
@@ -1265,7 +1201,7 @@
           <a:p>
             <a:fld id="{BBBF4EB7-BB73-4F04-B77C-5ADB8CA8E26C}" type="datetimeFigureOut">
               <a:rPr lang="en-US" smtClean="0"/>
-              <a:t>12/9/2024</a:t>
+              <a:t>3/18/2025</a:t>
             </a:fld>
             <a:endParaRPr lang="en-US"/>
           </a:p>
@@ -1511,7 +1447,7 @@
           <a:p>
             <a:fld id="{BBBF4EB7-BB73-4F04-B77C-5ADB8CA8E26C}" type="datetimeFigureOut">
               <a:rPr lang="en-US" smtClean="0"/>
-              <a:t>12/9/2024</a:t>
+              <a:t>3/18/2025</a:t>
             </a:fld>
             <a:endParaRPr lang="en-US"/>
           </a:p>
@@ -1743,7 +1679,7 @@
           <a:p>
             <a:fld id="{BBBF4EB7-BB73-4F04-B77C-5ADB8CA8E26C}" type="datetimeFigureOut">
               <a:rPr lang="en-US" smtClean="0"/>
-              <a:t>12/9/2024</a:t>
+              <a:t>3/18/2025</a:t>
             </a:fld>
             <a:endParaRPr lang="en-US"/>
           </a:p>
@@ -2110,7 +2046,7 @@
           <a:p>
             <a:fld id="{BBBF4EB7-BB73-4F04-B77C-5ADB8CA8E26C}" type="datetimeFigureOut">
               <a:rPr lang="en-US" smtClean="0"/>
-              <a:t>12/9/2024</a:t>
+              <a:t>3/18/2025</a:t>
             </a:fld>
             <a:endParaRPr lang="en-US"/>
           </a:p>
@@ -2228,7 +2164,7 @@
           <a:p>
             <a:fld id="{BBBF4EB7-BB73-4F04-B77C-5ADB8CA8E26C}" type="datetimeFigureOut">
               <a:rPr lang="en-US" smtClean="0"/>
-              <a:t>12/9/2024</a:t>
+              <a:t>3/18/2025</a:t>
             </a:fld>
             <a:endParaRPr lang="en-US"/>
           </a:p>
@@ -2323,7 +2259,7 @@
           <a:p>
             <a:fld id="{BBBF4EB7-BB73-4F04-B77C-5ADB8CA8E26C}" type="datetimeFigureOut">
               <a:rPr lang="en-US" smtClean="0"/>
-              <a:t>12/9/2024</a:t>
+              <a:t>3/18/2025</a:t>
             </a:fld>
             <a:endParaRPr lang="en-US"/>
           </a:p>
@@ -2600,7 +2536,7 @@
           <a:p>
             <a:fld id="{BBBF4EB7-BB73-4F04-B77C-5ADB8CA8E26C}" type="datetimeFigureOut">
               <a:rPr lang="en-US" smtClean="0"/>
-              <a:t>12/9/2024</a:t>
+              <a:t>3/18/2025</a:t>
             </a:fld>
             <a:endParaRPr lang="en-US"/>
           </a:p>
@@ -2857,7 +2793,7 @@
           <a:p>
             <a:fld id="{BBBF4EB7-BB73-4F04-B77C-5ADB8CA8E26C}" type="datetimeFigureOut">
               <a:rPr lang="en-US" smtClean="0"/>
-              <a:t>12/9/2024</a:t>
+              <a:t>3/18/2025</a:t>
             </a:fld>
             <a:endParaRPr lang="en-US"/>
           </a:p>
@@ -3070,7 +3006,7 @@
           <a:p>
             <a:fld id="{BBBF4EB7-BB73-4F04-B77C-5ADB8CA8E26C}" type="datetimeFigureOut">
               <a:rPr lang="en-US" smtClean="0"/>
-              <a:t>12/9/2024</a:t>
+              <a:t>3/18/2025</a:t>
             </a:fld>
             <a:endParaRPr lang="en-US"/>
           </a:p>
@@ -3475,6 +3411,64 @@
           <a:chExt cx="0" cy="0"/>
         </a:xfrm>
       </p:grpSpPr>
+      <p:sp>
+        <p:nvSpPr>
+          <p:cNvPr id="5" name="Rectangle 4">
+            <a:extLst>
+              <a:ext uri="{FF2B5EF4-FFF2-40B4-BE49-F238E27FC236}">
+                <a16:creationId xmlns:a16="http://schemas.microsoft.com/office/drawing/2014/main" id="{3BC7C386-3033-51E0-18B0-709F428E239A}"/>
+              </a:ext>
+            </a:extLst>
+          </p:cNvPr>
+          <p:cNvSpPr/>
+          <p:nvPr/>
+        </p:nvSpPr>
+        <p:spPr>
+          <a:xfrm>
+            <a:off x="1456127" y="282367"/>
+            <a:ext cx="2237814" cy="1127705"/>
+          </a:xfrm>
+          <a:prstGeom prst="rect">
+            <a:avLst/>
+          </a:prstGeom>
+          <a:solidFill>
+            <a:srgbClr val="D1B252">
+              <a:alpha val="20000"/>
+            </a:srgbClr>
+          </a:solidFill>
+          <a:ln>
+            <a:noFill/>
+          </a:ln>
+        </p:spPr>
+        <p:style>
+          <a:lnRef idx="2">
+            <a:schemeClr val="accent1">
+              <a:shade val="15000"/>
+            </a:schemeClr>
+          </a:lnRef>
+          <a:fillRef idx="1">
+            <a:schemeClr val="accent1"/>
+          </a:fillRef>
+          <a:effectRef idx="0">
+            <a:schemeClr val="accent1"/>
+          </a:effectRef>
+          <a:fontRef idx="minor">
+            <a:schemeClr val="lt1"/>
+          </a:fontRef>
+        </p:style>
+        <p:txBody>
+          <a:bodyPr rtlCol="0" anchor="ctr"/>
+          <a:lstStyle/>
+          <a:p>
+            <a:pPr algn="ctr"/>
+            <a:endParaRPr lang="en-US">
+              <a:solidFill>
+                <a:srgbClr val="9F2D55"/>
+              </a:solidFill>
+            </a:endParaRPr>
+          </a:p>
+        </p:txBody>
+      </p:sp>
       <p:cxnSp>
         <p:nvCxnSpPr>
           <p:cNvPr id="143" name="Straight Connector 142">
@@ -4231,14 +4225,14 @@
         </p:nvSpPr>
         <p:spPr>
           <a:xfrm>
-            <a:off x="3580744" y="278284"/>
-            <a:ext cx="226656" cy="226371"/>
+            <a:off x="3583125" y="278284"/>
+            <a:ext cx="112323" cy="226371"/>
           </a:xfrm>
           <a:prstGeom prst="rect">
             <a:avLst/>
           </a:prstGeom>
           <a:solidFill>
-            <a:schemeClr val="bg1"/>
+            <a:srgbClr val="F6F0DC"/>
           </a:solidFill>
           <a:ln>
             <a:noFill/>
@@ -4283,16 +4277,16 @@
         </p:nvSpPr>
         <p:spPr>
           <a:xfrm>
-            <a:off x="3695044" y="282696"/>
+            <a:off x="3692663" y="282696"/>
             <a:ext cx="1135704" cy="1127705"/>
           </a:xfrm>
           <a:prstGeom prst="rect">
             <a:avLst/>
           </a:prstGeom>
           <a:solidFill>
-            <a:schemeClr val="bg1">
-              <a:lumMod val="75000"/>
-            </a:schemeClr>
+            <a:srgbClr val="041D2C">
+              <a:alpha val="20000"/>
+            </a:srgbClr>
           </a:solidFill>
           <a:ln>
             <a:noFill/>
@@ -4341,8 +4335,8 @@
         </p:nvSpPr>
         <p:spPr>
           <a:xfrm>
-            <a:off x="3627219" y="722842"/>
-            <a:ext cx="1271354" cy="286344"/>
+            <a:off x="3597928" y="698054"/>
+            <a:ext cx="1315885" cy="311132"/>
           </a:xfrm>
           <a:prstGeom prst="rect">
             <a:avLst/>
@@ -4378,6 +4372,8 @@
                 <a:solidFill>
                   <a:srgbClr val="BB292C"/>
                 </a:solidFill>
+                <a:latin typeface="Arial" panose="020B0604020202020204" pitchFamily="34" charset="0"/>
+                <a:cs typeface="Arial" panose="020B0604020202020204" pitchFamily="34" charset="0"/>
               </a:rPr>
               <a:t>cessation of vocalization extended 32 min</a:t>
             </a:r>
@@ -4442,7 +4438,7 @@
         </p:nvSpPr>
         <p:spPr>
           <a:xfrm>
-            <a:off x="1562127" y="915808"/>
+            <a:off x="1600227" y="908188"/>
             <a:ext cx="1271354" cy="286344"/>
           </a:xfrm>
           <a:prstGeom prst="rect">
@@ -4479,6 +4475,8 @@
                 <a:solidFill>
                   <a:srgbClr val="5D6174"/>
                 </a:solidFill>
+                <a:latin typeface="Arial" panose="020B0604020202020204" pitchFamily="34" charset="0"/>
+                <a:cs typeface="Arial" panose="020B0604020202020204" pitchFamily="34" charset="0"/>
               </a:rPr>
               <a:t>dark landscapes</a:t>
             </a:r>
@@ -4534,8 +4532,10 @@
             <a:r>
               <a:rPr lang="en-US" sz="800" i="1" dirty="0">
                 <a:solidFill>
-                  <a:srgbClr val="F4A820"/>
+                  <a:srgbClr val="DF930B"/>
                 </a:solidFill>
+                <a:latin typeface="Arial" panose="020B0604020202020204" pitchFamily="34" charset="0"/>
+                <a:cs typeface="Arial" panose="020B0604020202020204" pitchFamily="34" charset="0"/>
               </a:rPr>
               <a:t>bright landscapes</a:t>
             </a:r>
@@ -4593,56 +4593,14 @@
                 <a:solidFill>
                   <a:schemeClr val="tx1"/>
                 </a:solidFill>
+                <a:latin typeface="Arial" panose="020B0604020202020204" pitchFamily="34" charset="0"/>
+                <a:cs typeface="Arial" panose="020B0604020202020204" pitchFamily="34" charset="0"/>
               </a:rPr>
               <a:t>Amount of vocalization</a:t>
             </a:r>
           </a:p>
         </p:txBody>
       </p:sp>
-      <p:cxnSp>
-        <p:nvCxnSpPr>
-          <p:cNvPr id="162" name="Straight Arrow Connector 161">
-            <a:extLst>
-              <a:ext uri="{FF2B5EF4-FFF2-40B4-BE49-F238E27FC236}">
-                <a16:creationId xmlns:a16="http://schemas.microsoft.com/office/drawing/2014/main" id="{A2A61796-95EF-283F-0D93-D61A0E5AA1FD}"/>
-              </a:ext>
-            </a:extLst>
-          </p:cNvPr>
-          <p:cNvCxnSpPr>
-            <a:cxnSpLocks/>
-          </p:cNvCxnSpPr>
-          <p:nvPr/>
-        </p:nvCxnSpPr>
-        <p:spPr>
-          <a:xfrm>
-            <a:off x="3695559" y="292215"/>
-            <a:ext cx="0" cy="91210"/>
-          </a:xfrm>
-          <a:prstGeom prst="straightConnector1">
-            <a:avLst/>
-          </a:prstGeom>
-          <a:ln w="12700">
-            <a:solidFill>
-              <a:schemeClr val="tx1"/>
-            </a:solidFill>
-            <a:tailEnd type="triangle" w="sm" len="sm"/>
-          </a:ln>
-        </p:spPr>
-        <p:style>
-          <a:lnRef idx="2">
-            <a:schemeClr val="accent1"/>
-          </a:lnRef>
-          <a:fillRef idx="0">
-            <a:schemeClr val="accent1"/>
-          </a:fillRef>
-          <a:effectRef idx="1">
-            <a:schemeClr val="accent1"/>
-          </a:effectRef>
-          <a:fontRef idx="minor">
-            <a:schemeClr val="tx1"/>
-          </a:fontRef>
-        </p:style>
-      </p:cxnSp>
       <p:cxnSp>
         <p:nvCxnSpPr>
           <p:cNvPr id="163" name="Straight Connector 162">
@@ -4700,14 +4658,14 @@
         </p:nvSpPr>
         <p:spPr>
           <a:xfrm>
-            <a:off x="1341734" y="281117"/>
-            <a:ext cx="226656" cy="226371"/>
+            <a:off x="1451377" y="281117"/>
+            <a:ext cx="104154" cy="226371"/>
           </a:xfrm>
           <a:prstGeom prst="rect">
             <a:avLst/>
           </a:prstGeom>
           <a:solidFill>
-            <a:schemeClr val="bg1"/>
+            <a:srgbClr val="F6F0DC"/>
           </a:solidFill>
           <a:ln>
             <a:noFill/>
@@ -4759,9 +4717,9 @@
             <a:avLst/>
           </a:prstGeom>
           <a:solidFill>
-            <a:schemeClr val="bg1">
-              <a:lumMod val="75000"/>
-            </a:schemeClr>
+            <a:srgbClr val="041D2C">
+              <a:alpha val="20000"/>
+            </a:srgbClr>
           </a:solidFill>
           <a:ln>
             <a:noFill/>
@@ -4796,50 +4754,6 @@
           </a:p>
         </p:txBody>
       </p:sp>
-      <p:cxnSp>
-        <p:nvCxnSpPr>
-          <p:cNvPr id="166" name="Straight Arrow Connector 165">
-            <a:extLst>
-              <a:ext uri="{FF2B5EF4-FFF2-40B4-BE49-F238E27FC236}">
-                <a16:creationId xmlns:a16="http://schemas.microsoft.com/office/drawing/2014/main" id="{D5BC7A8F-F63A-BF49-FCC3-257B1F1E716C}"/>
-              </a:ext>
-            </a:extLst>
-          </p:cNvPr>
-          <p:cNvCxnSpPr>
-            <a:cxnSpLocks/>
-          </p:cNvCxnSpPr>
-          <p:nvPr/>
-        </p:nvCxnSpPr>
-        <p:spPr>
-          <a:xfrm flipV="1">
-            <a:off x="1453374" y="293982"/>
-            <a:ext cx="0" cy="93879"/>
-          </a:xfrm>
-          <a:prstGeom prst="straightConnector1">
-            <a:avLst/>
-          </a:prstGeom>
-          <a:ln w="12700">
-            <a:solidFill>
-              <a:schemeClr val="tx1"/>
-            </a:solidFill>
-            <a:tailEnd type="triangle" w="sm" len="sm"/>
-          </a:ln>
-        </p:spPr>
-        <p:style>
-          <a:lnRef idx="2">
-            <a:schemeClr val="accent1"/>
-          </a:lnRef>
-          <a:fillRef idx="0">
-            <a:schemeClr val="accent1"/>
-          </a:fillRef>
-          <a:effectRef idx="1">
-            <a:schemeClr val="accent1"/>
-          </a:effectRef>
-          <a:fontRef idx="minor">
-            <a:schemeClr val="tx1"/>
-          </a:fontRef>
-        </p:style>
-      </p:cxnSp>
       <p:sp>
         <p:nvSpPr>
           <p:cNvPr id="167" name="Freeform: Shape 166">
@@ -5251,6 +5165,8 @@
                 <a:solidFill>
                   <a:srgbClr val="341648"/>
                 </a:solidFill>
+                <a:latin typeface="Arial" panose="020B0604020202020204" pitchFamily="34" charset="0"/>
+                <a:cs typeface="Arial" panose="020B0604020202020204" pitchFamily="34" charset="0"/>
               </a:rPr>
               <a:t>onset of vocalization advances 18 min</a:t>
             </a:r>
@@ -5500,6 +5416,239 @@
           </a:p>
         </p:txBody>
       </p:sp>
+      <p:sp>
+        <p:nvSpPr>
+          <p:cNvPr id="182" name="Rectangle 181">
+            <a:extLst>
+              <a:ext uri="{FF2B5EF4-FFF2-40B4-BE49-F238E27FC236}">
+                <a16:creationId xmlns:a16="http://schemas.microsoft.com/office/drawing/2014/main" id="{56E40366-6E4B-10B3-C81D-52524A318F08}"/>
+              </a:ext>
+            </a:extLst>
+          </p:cNvPr>
+          <p:cNvSpPr/>
+          <p:nvPr/>
+        </p:nvSpPr>
+        <p:spPr>
+          <a:xfrm>
+            <a:off x="48012" y="45720"/>
+            <a:ext cx="373866" cy="217994"/>
+          </a:xfrm>
+          <a:prstGeom prst="rect">
+            <a:avLst/>
+          </a:prstGeom>
+          <a:noFill/>
+          <a:ln>
+            <a:noFill/>
+          </a:ln>
+        </p:spPr>
+        <p:style>
+          <a:lnRef idx="2">
+            <a:schemeClr val="accent1">
+              <a:shade val="15000"/>
+            </a:schemeClr>
+          </a:lnRef>
+          <a:fillRef idx="1">
+            <a:schemeClr val="accent1"/>
+          </a:fillRef>
+          <a:effectRef idx="0">
+            <a:schemeClr val="accent1"/>
+          </a:effectRef>
+          <a:fontRef idx="minor">
+            <a:schemeClr val="lt1"/>
+          </a:fontRef>
+        </p:style>
+        <p:txBody>
+          <a:bodyPr rtlCol="0" anchor="ctr"/>
+          <a:lstStyle/>
+          <a:p>
+            <a:pPr algn="ctr"/>
+            <a:r>
+              <a:rPr lang="en-US" sz="1000" b="1" dirty="0">
+                <a:solidFill>
+                  <a:schemeClr val="tx1"/>
+                </a:solidFill>
+                <a:latin typeface="Arial" panose="020B0604020202020204" pitchFamily="34" charset="0"/>
+                <a:cs typeface="Arial" panose="020B0604020202020204" pitchFamily="34" charset="0"/>
+              </a:rPr>
+              <a:t>(A)</a:t>
+            </a:r>
+          </a:p>
+        </p:txBody>
+      </p:sp>
+      <p:cxnSp>
+        <p:nvCxnSpPr>
+          <p:cNvPr id="177" name="Straight Connector 176">
+            <a:extLst>
+              <a:ext uri="{FF2B5EF4-FFF2-40B4-BE49-F238E27FC236}">
+                <a16:creationId xmlns:a16="http://schemas.microsoft.com/office/drawing/2014/main" id="{3D727A4C-679C-A522-31D2-068E1F8B2CB6}"/>
+              </a:ext>
+            </a:extLst>
+          </p:cNvPr>
+          <p:cNvCxnSpPr>
+            <a:cxnSpLocks/>
+          </p:cNvCxnSpPr>
+          <p:nvPr/>
+        </p:nvCxnSpPr>
+        <p:spPr>
+          <a:xfrm>
+            <a:off x="320218" y="1411462"/>
+            <a:ext cx="4510529" cy="0"/>
+          </a:xfrm>
+          <a:prstGeom prst="line">
+            <a:avLst/>
+          </a:prstGeom>
+          <a:ln w="12700">
+            <a:solidFill>
+              <a:schemeClr val="tx1"/>
+            </a:solidFill>
+          </a:ln>
+        </p:spPr>
+        <p:style>
+          <a:lnRef idx="2">
+            <a:schemeClr val="accent1"/>
+          </a:lnRef>
+          <a:fillRef idx="0">
+            <a:schemeClr val="accent1"/>
+          </a:fillRef>
+          <a:effectRef idx="1">
+            <a:schemeClr val="accent1"/>
+          </a:effectRef>
+          <a:fontRef idx="minor">
+            <a:schemeClr val="tx1"/>
+          </a:fontRef>
+        </p:style>
+      </p:cxnSp>
+      <p:pic>
+        <p:nvPicPr>
+          <p:cNvPr id="200" name="Picture 199" descr="A black background with a black square&#10;&#10;Description automatically generated with medium confidence">
+            <a:extLst>
+              <a:ext uri="{FF2B5EF4-FFF2-40B4-BE49-F238E27FC236}">
+                <a16:creationId xmlns:a16="http://schemas.microsoft.com/office/drawing/2014/main" id="{3BF6928C-B966-F3C2-4EE2-FA0F4110785F}"/>
+              </a:ext>
+            </a:extLst>
+          </p:cNvPr>
+          <p:cNvPicPr>
+            <a:picLocks noChangeAspect="1"/>
+          </p:cNvPicPr>
+          <p:nvPr/>
+        </p:nvPicPr>
+        <p:blipFill>
+          <a:blip r:embed="rId2">
+            <a:extLst>
+              <a:ext uri="{28A0092B-C50C-407E-A947-70E740481C1C}">
+                <a14:useLocalDpi xmlns:a14="http://schemas.microsoft.com/office/drawing/2010/main" val="0"/>
+              </a:ext>
+            </a:extLst>
+          </a:blip>
+          <a:srcRect l="-9505" t="-27777" r="49780" b="28553"/>
+          <a:stretch/>
+        </p:blipFill>
+        <p:spPr>
+          <a:xfrm rot="254820">
+            <a:off x="2945317" y="322300"/>
+            <a:ext cx="515592" cy="457579"/>
+          </a:xfrm>
+          <a:prstGeom prst="ellipse">
+            <a:avLst/>
+          </a:prstGeom>
+        </p:spPr>
+      </p:pic>
+      <p:sp>
+        <p:nvSpPr>
+          <p:cNvPr id="6" name="Rectangle 5">
+            <a:extLst>
+              <a:ext uri="{FF2B5EF4-FFF2-40B4-BE49-F238E27FC236}">
+                <a16:creationId xmlns:a16="http://schemas.microsoft.com/office/drawing/2014/main" id="{319A71C7-3EA3-EE1F-FF1B-1A573F3214ED}"/>
+              </a:ext>
+            </a:extLst>
+          </p:cNvPr>
+          <p:cNvSpPr/>
+          <p:nvPr/>
+        </p:nvSpPr>
+        <p:spPr>
+          <a:xfrm>
+            <a:off x="1340188" y="284241"/>
+            <a:ext cx="114632" cy="226371"/>
+          </a:xfrm>
+          <a:prstGeom prst="rect">
+            <a:avLst/>
+          </a:prstGeom>
+          <a:solidFill>
+            <a:srgbClr val="CDD2D5"/>
+          </a:solidFill>
+          <a:ln>
+            <a:noFill/>
+          </a:ln>
+        </p:spPr>
+        <p:style>
+          <a:lnRef idx="2">
+            <a:schemeClr val="accent1">
+              <a:shade val="15000"/>
+            </a:schemeClr>
+          </a:lnRef>
+          <a:fillRef idx="1">
+            <a:schemeClr val="accent1"/>
+          </a:fillRef>
+          <a:effectRef idx="0">
+            <a:schemeClr val="accent1"/>
+          </a:effectRef>
+          <a:fontRef idx="minor">
+            <a:schemeClr val="lt1"/>
+          </a:fontRef>
+        </p:style>
+        <p:txBody>
+          <a:bodyPr rtlCol="0" anchor="ctr"/>
+          <a:lstStyle/>
+          <a:p>
+            <a:pPr algn="ctr"/>
+            <a:endParaRPr lang="en-US" dirty="0"/>
+          </a:p>
+        </p:txBody>
+      </p:sp>
+      <p:cxnSp>
+        <p:nvCxnSpPr>
+          <p:cNvPr id="166" name="Straight Arrow Connector 165">
+            <a:extLst>
+              <a:ext uri="{FF2B5EF4-FFF2-40B4-BE49-F238E27FC236}">
+                <a16:creationId xmlns:a16="http://schemas.microsoft.com/office/drawing/2014/main" id="{D5BC7A8F-F63A-BF49-FCC3-257B1F1E716C}"/>
+              </a:ext>
+            </a:extLst>
+          </p:cNvPr>
+          <p:cNvCxnSpPr>
+            <a:cxnSpLocks/>
+          </p:cNvCxnSpPr>
+          <p:nvPr/>
+        </p:nvCxnSpPr>
+        <p:spPr>
+          <a:xfrm flipV="1">
+            <a:off x="1453374" y="293982"/>
+            <a:ext cx="0" cy="93879"/>
+          </a:xfrm>
+          <a:prstGeom prst="straightConnector1">
+            <a:avLst/>
+          </a:prstGeom>
+          <a:ln w="12700">
+            <a:solidFill>
+              <a:schemeClr val="tx1"/>
+            </a:solidFill>
+            <a:tailEnd type="triangle" w="sm" len="sm"/>
+          </a:ln>
+        </p:spPr>
+        <p:style>
+          <a:lnRef idx="2">
+            <a:schemeClr val="accent1"/>
+          </a:lnRef>
+          <a:fillRef idx="0">
+            <a:schemeClr val="accent1"/>
+          </a:fillRef>
+          <a:effectRef idx="1">
+            <a:schemeClr val="accent1"/>
+          </a:effectRef>
+          <a:fontRef idx="minor">
+            <a:schemeClr val="tx1"/>
+          </a:fontRef>
+        </p:style>
+      </p:cxnSp>
       <p:cxnSp>
         <p:nvCxnSpPr>
           <p:cNvPr id="181" name="Straight Connector 180">
@@ -5545,10 +5694,10 @@
       </p:cxnSp>
       <p:sp>
         <p:nvSpPr>
-          <p:cNvPr id="182" name="Rectangle 181">
+          <p:cNvPr id="8" name="Rectangle 7">
             <a:extLst>
               <a:ext uri="{FF2B5EF4-FFF2-40B4-BE49-F238E27FC236}">
-                <a16:creationId xmlns:a16="http://schemas.microsoft.com/office/drawing/2014/main" id="{56E40366-6E4B-10B3-C81D-52524A318F08}"/>
+                <a16:creationId xmlns:a16="http://schemas.microsoft.com/office/drawing/2014/main" id="{E57B961B-925C-2DD6-6F82-B80BE340E434}"/>
               </a:ext>
             </a:extLst>
           </p:cNvPr>
@@ -5557,13 +5706,15 @@
         </p:nvSpPr>
         <p:spPr>
           <a:xfrm>
-            <a:off x="48012" y="45720"/>
-            <a:ext cx="373866" cy="217994"/>
+            <a:off x="3696814" y="279894"/>
+            <a:ext cx="112323" cy="226371"/>
           </a:xfrm>
           <a:prstGeom prst="rect">
             <a:avLst/>
           </a:prstGeom>
-          <a:noFill/>
+          <a:solidFill>
+            <a:srgbClr val="CDD2D5"/>
+          </a:solidFill>
           <a:ln>
             <a:noFill/>
           </a:ln>
@@ -5589,23 +5740,16 @@
           <a:lstStyle/>
           <a:p>
             <a:pPr algn="ctr"/>
-            <a:r>
-              <a:rPr lang="en-US" sz="1000" b="1" dirty="0">
-                <a:solidFill>
-                  <a:schemeClr val="tx1"/>
-                </a:solidFill>
-              </a:rPr>
-              <a:t>(A)</a:t>
-            </a:r>
+            <a:endParaRPr lang="en-US"/>
           </a:p>
         </p:txBody>
       </p:sp>
       <p:cxnSp>
         <p:nvCxnSpPr>
-          <p:cNvPr id="177" name="Straight Connector 176">
+          <p:cNvPr id="162" name="Straight Arrow Connector 161">
             <a:extLst>
               <a:ext uri="{FF2B5EF4-FFF2-40B4-BE49-F238E27FC236}">
-                <a16:creationId xmlns:a16="http://schemas.microsoft.com/office/drawing/2014/main" id="{3D727A4C-679C-A522-31D2-068E1F8B2CB6}"/>
+                <a16:creationId xmlns:a16="http://schemas.microsoft.com/office/drawing/2014/main" id="{A2A61796-95EF-283F-0D93-D61A0E5AA1FD}"/>
               </a:ext>
             </a:extLst>
           </p:cNvPr>
@@ -5616,16 +5760,17 @@
         </p:nvCxnSpPr>
         <p:spPr>
           <a:xfrm>
-            <a:off x="320218" y="1411462"/>
-            <a:ext cx="4510529" cy="0"/>
-          </a:xfrm>
-          <a:prstGeom prst="line">
+            <a:off x="3695559" y="277929"/>
+            <a:ext cx="0" cy="91210"/>
+          </a:xfrm>
+          <a:prstGeom prst="straightConnector1">
             <a:avLst/>
           </a:prstGeom>
           <a:ln w="12700">
             <a:solidFill>
               <a:schemeClr val="tx1"/>
             </a:solidFill>
+            <a:tailEnd type="triangle" w="sm" len="sm"/>
           </a:ln>
         </p:spPr>
         <p:style>
@@ -5645,46 +5790,10 @@
       </p:cxnSp>
       <p:pic>
         <p:nvPicPr>
-          <p:cNvPr id="3" name="Picture 2" descr="A graph with a red line&#10;&#10;Description automatically generated">
+          <p:cNvPr id="10" name="Picture 9" descr="A graph with a line&#10;&#10;AI-generated content may be incorrect.">
             <a:extLst>
               <a:ext uri="{FF2B5EF4-FFF2-40B4-BE49-F238E27FC236}">
-                <a16:creationId xmlns:a16="http://schemas.microsoft.com/office/drawing/2014/main" id="{19794FE7-34CF-25F6-A90A-927CA02B1264}"/>
-              </a:ext>
-            </a:extLst>
-          </p:cNvPr>
-          <p:cNvPicPr>
-            <a:picLocks noChangeAspect="1"/>
-          </p:cNvPicPr>
-          <p:nvPr/>
-        </p:nvPicPr>
-        <p:blipFill>
-          <a:blip r:embed="rId2">
-            <a:extLst>
-              <a:ext uri="{28A0092B-C50C-407E-A947-70E740481C1C}">
-                <a14:useLocalDpi xmlns:a14="http://schemas.microsoft.com/office/drawing/2010/main" val="0"/>
-              </a:ext>
-            </a:extLst>
-          </a:blip>
-          <a:stretch>
-            <a:fillRect/>
-          </a:stretch>
-        </p:blipFill>
-        <p:spPr>
-          <a:xfrm>
-            <a:off x="2580468" y="1706834"/>
-            <a:ext cx="2286005" cy="1828804"/>
-          </a:xfrm>
-          <a:prstGeom prst="rect">
-            <a:avLst/>
-          </a:prstGeom>
-        </p:spPr>
-      </p:pic>
-      <p:pic>
-        <p:nvPicPr>
-          <p:cNvPr id="200" name="Picture 199" descr="A black background with a black square&#10;&#10;Description automatically generated with medium confidence">
-            <a:extLst>
-              <a:ext uri="{FF2B5EF4-FFF2-40B4-BE49-F238E27FC236}">
-                <a16:creationId xmlns:a16="http://schemas.microsoft.com/office/drawing/2014/main" id="{3BF6928C-B966-F3C2-4EE2-FA0F4110785F}"/>
+                <a16:creationId xmlns:a16="http://schemas.microsoft.com/office/drawing/2014/main" id="{D434B950-D443-34EB-E314-D26F0D49C3DE}"/>
               </a:ext>
             </a:extLst>
           </p:cNvPr>
@@ -5701,25 +5810,85 @@
               </a:ext>
             </a:extLst>
           </a:blip>
-          <a:srcRect l="-9505" t="-27777" r="49780" b="28553"/>
-          <a:stretch/>
+          <a:stretch>
+            <a:fillRect/>
+          </a:stretch>
         </p:blipFill>
         <p:spPr>
-          <a:xfrm rot="254820">
-            <a:off x="2945317" y="322300"/>
-            <a:ext cx="515592" cy="457579"/>
-          </a:xfrm>
-          <a:prstGeom prst="ellipse">
+          <a:xfrm>
+            <a:off x="277711" y="1716359"/>
+            <a:ext cx="2286005" cy="1828804"/>
+          </a:xfrm>
+          <a:prstGeom prst="rect">
             <a:avLst/>
           </a:prstGeom>
         </p:spPr>
       </p:pic>
+      <p:sp>
+        <p:nvSpPr>
+          <p:cNvPr id="183" name="Rectangle 182">
+            <a:extLst>
+              <a:ext uri="{FF2B5EF4-FFF2-40B4-BE49-F238E27FC236}">
+                <a16:creationId xmlns:a16="http://schemas.microsoft.com/office/drawing/2014/main" id="{3080F696-CFCB-CE92-F1A5-E20D98F98F4E}"/>
+              </a:ext>
+            </a:extLst>
+          </p:cNvPr>
+          <p:cNvSpPr/>
+          <p:nvPr/>
+        </p:nvSpPr>
+        <p:spPr>
+          <a:xfrm>
+            <a:off x="45720" y="1568403"/>
+            <a:ext cx="373866" cy="217994"/>
+          </a:xfrm>
+          <a:prstGeom prst="rect">
+            <a:avLst/>
+          </a:prstGeom>
+          <a:noFill/>
+          <a:ln>
+            <a:noFill/>
+          </a:ln>
+        </p:spPr>
+        <p:style>
+          <a:lnRef idx="2">
+            <a:schemeClr val="accent1">
+              <a:shade val="15000"/>
+            </a:schemeClr>
+          </a:lnRef>
+          <a:fillRef idx="1">
+            <a:schemeClr val="accent1"/>
+          </a:fillRef>
+          <a:effectRef idx="0">
+            <a:schemeClr val="accent1"/>
+          </a:effectRef>
+          <a:fontRef idx="minor">
+            <a:schemeClr val="lt1"/>
+          </a:fontRef>
+        </p:style>
+        <p:txBody>
+          <a:bodyPr rtlCol="0" anchor="ctr"/>
+          <a:lstStyle/>
+          <a:p>
+            <a:pPr algn="ctr"/>
+            <a:r>
+              <a:rPr lang="en-US" sz="1000" b="1" dirty="0">
+                <a:solidFill>
+                  <a:schemeClr val="tx1"/>
+                </a:solidFill>
+                <a:latin typeface="Arial" panose="020B0604020202020204" pitchFamily="34" charset="0"/>
+                <a:cs typeface="Arial" panose="020B0604020202020204" pitchFamily="34" charset="0"/>
+              </a:rPr>
+              <a:t>(B)</a:t>
+            </a:r>
+          </a:p>
+        </p:txBody>
+      </p:sp>
       <p:pic>
         <p:nvPicPr>
-          <p:cNvPr id="7" name="Picture 6" descr="A graph with a line&#10;&#10;Description automatically generated">
+          <p:cNvPr id="12" name="Picture 11" descr="A graph with a red line&#10;&#10;AI-generated content may be incorrect.">
             <a:extLst>
               <a:ext uri="{FF2B5EF4-FFF2-40B4-BE49-F238E27FC236}">
-                <a16:creationId xmlns:a16="http://schemas.microsoft.com/office/drawing/2014/main" id="{6FDCAFE5-3255-51BB-6BB8-A593F9B8C4EE}"/>
+                <a16:creationId xmlns:a16="http://schemas.microsoft.com/office/drawing/2014/main" id="{048574B7-59D0-DEC8-91A8-50F46B5A1855}"/>
               </a:ext>
             </a:extLst>
           </p:cNvPr>
@@ -5742,7 +5911,7 @@
         </p:blipFill>
         <p:spPr>
           <a:xfrm>
-            <a:off x="282101" y="1709928"/>
+            <a:off x="2586758" y="1719072"/>
             <a:ext cx="2286005" cy="1828804"/>
           </a:xfrm>
           <a:prstGeom prst="rect">
@@ -5750,139 +5919,12 @@
           </a:prstGeom>
         </p:spPr>
       </p:pic>
-      <p:grpSp>
-        <p:nvGrpSpPr>
-          <p:cNvPr id="180" name="Group 179">
+      <p:sp>
+        <p:nvSpPr>
+          <p:cNvPr id="184" name="Rectangle 183">
             <a:extLst>
               <a:ext uri="{FF2B5EF4-FFF2-40B4-BE49-F238E27FC236}">
-                <a16:creationId xmlns:a16="http://schemas.microsoft.com/office/drawing/2014/main" id="{FFF2867D-5E2F-F39C-3EBC-71EEA28CE4B1}"/>
-              </a:ext>
-            </a:extLst>
-          </p:cNvPr>
-          <p:cNvGrpSpPr/>
-          <p:nvPr/>
-        </p:nvGrpSpPr>
-        <p:grpSpPr>
-          <a:xfrm>
-            <a:off x="742386" y="3162155"/>
-            <a:ext cx="4095417" cy="12208"/>
-            <a:chOff x="1587097" y="6005728"/>
-            <a:chExt cx="4095417" cy="12208"/>
-          </a:xfrm>
-        </p:grpSpPr>
-        <p:cxnSp>
-          <p:nvCxnSpPr>
-            <p:cNvPr id="187" name="Straight Arrow Connector 186">
-              <a:extLst>
-                <a:ext uri="{FF2B5EF4-FFF2-40B4-BE49-F238E27FC236}">
-                  <a16:creationId xmlns:a16="http://schemas.microsoft.com/office/drawing/2014/main" id="{9B959068-493F-D57C-3343-9CAEE7E3DC6F}"/>
-                </a:ext>
-              </a:extLst>
-            </p:cNvPr>
-            <p:cNvCxnSpPr>
-              <a:cxnSpLocks/>
-            </p:cNvCxnSpPr>
-            <p:nvPr/>
-          </p:nvCxnSpPr>
-          <p:spPr>
-            <a:xfrm>
-              <a:off x="1587097" y="6017936"/>
-              <a:ext cx="1805455" cy="0"/>
-            </a:xfrm>
-            <a:prstGeom prst="straightConnector1">
-              <a:avLst/>
-            </a:prstGeom>
-            <a:ln w="25400">
-              <a:gradFill flip="none" rotWithShape="1">
-                <a:gsLst>
-                  <a:gs pos="0">
-                    <a:srgbClr val="5D6174"/>
-                  </a:gs>
-                  <a:gs pos="100000">
-                    <a:srgbClr val="F7C267"/>
-                  </a:gs>
-                </a:gsLst>
-                <a:lin ang="0" scaled="1"/>
-                <a:tileRect/>
-              </a:gradFill>
-              <a:tailEnd type="none"/>
-            </a:ln>
-          </p:spPr>
-          <p:style>
-            <a:lnRef idx="2">
-              <a:schemeClr val="accent1"/>
-            </a:lnRef>
-            <a:fillRef idx="0">
-              <a:schemeClr val="accent1"/>
-            </a:fillRef>
-            <a:effectRef idx="1">
-              <a:schemeClr val="accent1"/>
-            </a:effectRef>
-            <a:fontRef idx="minor">
-              <a:schemeClr val="tx1"/>
-            </a:fontRef>
-          </p:style>
-        </p:cxnSp>
-        <p:cxnSp>
-          <p:nvCxnSpPr>
-            <p:cNvPr id="188" name="Straight Arrow Connector 187">
-              <a:extLst>
-                <a:ext uri="{FF2B5EF4-FFF2-40B4-BE49-F238E27FC236}">
-                  <a16:creationId xmlns:a16="http://schemas.microsoft.com/office/drawing/2014/main" id="{E1FE11D0-39CA-DE6A-AFDA-FEFE5506D797}"/>
-                </a:ext>
-              </a:extLst>
-            </p:cNvPr>
-            <p:cNvCxnSpPr>
-              <a:cxnSpLocks/>
-            </p:cNvCxnSpPr>
-            <p:nvPr/>
-          </p:nvCxnSpPr>
-          <p:spPr>
-            <a:xfrm>
-              <a:off x="3877059" y="6005728"/>
-              <a:ext cx="1805455" cy="0"/>
-            </a:xfrm>
-            <a:prstGeom prst="straightConnector1">
-              <a:avLst/>
-            </a:prstGeom>
-            <a:ln w="25400">
-              <a:gradFill flip="none" rotWithShape="1">
-                <a:gsLst>
-                  <a:gs pos="0">
-                    <a:srgbClr val="5D6174"/>
-                  </a:gs>
-                  <a:gs pos="100000">
-                    <a:srgbClr val="F7C267"/>
-                  </a:gs>
-                </a:gsLst>
-                <a:lin ang="0" scaled="1"/>
-                <a:tileRect/>
-              </a:gradFill>
-              <a:tailEnd type="none"/>
-            </a:ln>
-          </p:spPr>
-          <p:style>
-            <a:lnRef idx="2">
-              <a:schemeClr val="accent1"/>
-            </a:lnRef>
-            <a:fillRef idx="0">
-              <a:schemeClr val="accent1"/>
-            </a:fillRef>
-            <a:effectRef idx="1">
-              <a:schemeClr val="accent1"/>
-            </a:effectRef>
-            <a:fontRef idx="minor">
-              <a:schemeClr val="tx1"/>
-            </a:fontRef>
-          </p:style>
-        </p:cxnSp>
-      </p:grpSp>
-      <p:sp>
-        <p:nvSpPr>
-          <p:cNvPr id="183" name="Rectangle 182">
-            <a:extLst>
-              <a:ext uri="{FF2B5EF4-FFF2-40B4-BE49-F238E27FC236}">
-                <a16:creationId xmlns:a16="http://schemas.microsoft.com/office/drawing/2014/main" id="{3080F696-CFCB-CE92-F1A5-E20D98F98F4E}"/>
+                <a16:creationId xmlns:a16="http://schemas.microsoft.com/office/drawing/2014/main" id="{DB740122-2878-08AB-2A0F-E2229BA9C12B}"/>
               </a:ext>
             </a:extLst>
           </p:cNvPr>
@@ -5891,7 +5933,7 @@
         </p:nvSpPr>
         <p:spPr>
           <a:xfrm>
-            <a:off x="45720" y="1568403"/>
+            <a:off x="2395775" y="1568403"/>
             <a:ext cx="373866" cy="217994"/>
           </a:xfrm>
           <a:prstGeom prst="rect">
@@ -5928,18 +5970,20 @@
                 <a:solidFill>
                   <a:schemeClr val="tx1"/>
                 </a:solidFill>
+                <a:latin typeface="Arial" panose="020B0604020202020204" pitchFamily="34" charset="0"/>
+                <a:cs typeface="Arial" panose="020B0604020202020204" pitchFamily="34" charset="0"/>
               </a:rPr>
-              <a:t>(B)</a:t>
-            </a:r>
-          </a:p>
-        </p:txBody>
-      </p:sp>
-      <p:sp>
-        <p:nvSpPr>
-          <p:cNvPr id="184" name="Rectangle 183">
+              <a:t>(C)</a:t>
+            </a:r>
+          </a:p>
+        </p:txBody>
+      </p:sp>
+      <p:sp>
+        <p:nvSpPr>
+          <p:cNvPr id="13" name="Rectangle 12">
             <a:extLst>
               <a:ext uri="{FF2B5EF4-FFF2-40B4-BE49-F238E27FC236}">
-                <a16:creationId xmlns:a16="http://schemas.microsoft.com/office/drawing/2014/main" id="{DB740122-2878-08AB-2A0F-E2229BA9C12B}"/>
+                <a16:creationId xmlns:a16="http://schemas.microsoft.com/office/drawing/2014/main" id="{E02DAF51-BB98-8F3D-89D8-27018DD02F30}"/>
               </a:ext>
             </a:extLst>
           </p:cNvPr>
@@ -5948,15 +5992,28 @@
         </p:nvSpPr>
         <p:spPr>
           <a:xfrm>
-            <a:off x="2395775" y="1568403"/>
-            <a:ext cx="373866" cy="217994"/>
+            <a:off x="745497" y="3168373"/>
+            <a:ext cx="1753228" cy="27432"/>
           </a:xfrm>
           <a:prstGeom prst="rect">
             <a:avLst/>
           </a:prstGeom>
-          <a:noFill/>
-          <a:ln>
-            <a:noFill/>
+          <a:gradFill>
+            <a:gsLst>
+              <a:gs pos="0">
+                <a:srgbClr val="24213D"/>
+              </a:gs>
+              <a:gs pos="100000">
+                <a:srgbClr val="F2DEBB"/>
+              </a:gs>
+            </a:gsLst>
+            <a:lin ang="0" scaled="1"/>
+          </a:gradFill>
+          <a:ln w="0">
+            <a:solidFill>
+              <a:schemeClr val="tx1"/>
+            </a:solidFill>
+            <a:prstDash val="dash"/>
           </a:ln>
         </p:spPr>
         <p:style>
@@ -5980,14 +6037,70 @@
           <a:lstStyle/>
           <a:p>
             <a:pPr algn="ctr"/>
-            <a:r>
-              <a:rPr lang="en-US" sz="1000" b="1" dirty="0">
-                <a:solidFill>
-                  <a:schemeClr val="tx1"/>
-                </a:solidFill>
-              </a:rPr>
-              <a:t>(C)</a:t>
-            </a:r>
+            <a:endParaRPr lang="en-US"/>
+          </a:p>
+        </p:txBody>
+      </p:sp>
+      <p:sp>
+        <p:nvSpPr>
+          <p:cNvPr id="14" name="Rectangle 13">
+            <a:extLst>
+              <a:ext uri="{FF2B5EF4-FFF2-40B4-BE49-F238E27FC236}">
+                <a16:creationId xmlns:a16="http://schemas.microsoft.com/office/drawing/2014/main" id="{58523974-3037-5A4F-BE6D-3C9D9EC84274}"/>
+              </a:ext>
+            </a:extLst>
+          </p:cNvPr>
+          <p:cNvSpPr/>
+          <p:nvPr/>
+        </p:nvSpPr>
+        <p:spPr>
+          <a:xfrm>
+            <a:off x="3026738" y="3168372"/>
+            <a:ext cx="1796865" cy="27432"/>
+          </a:xfrm>
+          <a:prstGeom prst="rect">
+            <a:avLst/>
+          </a:prstGeom>
+          <a:gradFill>
+            <a:gsLst>
+              <a:gs pos="0">
+                <a:srgbClr val="24213D"/>
+              </a:gs>
+              <a:gs pos="100000">
+                <a:srgbClr val="F2DEBB"/>
+              </a:gs>
+            </a:gsLst>
+            <a:lin ang="0" scaled="1"/>
+          </a:gradFill>
+          <a:ln w="0">
+            <a:solidFill>
+              <a:schemeClr val="tx1"/>
+            </a:solidFill>
+            <a:prstDash val="dash"/>
+          </a:ln>
+        </p:spPr>
+        <p:style>
+          <a:lnRef idx="2">
+            <a:schemeClr val="accent1">
+              <a:shade val="15000"/>
+            </a:schemeClr>
+          </a:lnRef>
+          <a:fillRef idx="1">
+            <a:schemeClr val="accent1"/>
+          </a:fillRef>
+          <a:effectRef idx="0">
+            <a:schemeClr val="accent1"/>
+          </a:effectRef>
+          <a:fontRef idx="minor">
+            <a:schemeClr val="lt1"/>
+          </a:fontRef>
+        </p:style>
+        <p:txBody>
+          <a:bodyPr rtlCol="0" anchor="ctr"/>
+          <a:lstStyle/>
+          <a:p>
+            <a:pPr algn="ctr"/>
+            <a:endParaRPr lang="en-US"/>
           </a:p>
         </p:txBody>
       </p:sp>

</xml_diff>